<commit_message>
20210830 2136 tlw87 EOD updates.
</commit_message>
<xml_diff>
--- a/docs/AMT.pptx
+++ b/docs/AMT.pptx
@@ -10,6 +10,7 @@
     <p:sldId id="272" r:id="rId4"/>
     <p:sldId id="274" r:id="rId5"/>
     <p:sldId id="273" r:id="rId6"/>
+    <p:sldId id="276" r:id="rId7"/>
   </p:sldIdLst>
   <p:sldSz cx="12192000" cy="6858000"/>
   <p:notesSz cx="6858000" cy="9144000"/>
@@ -138,7 +139,7 @@
           <p:cNvPr id="2" name="Title 1">
             <a:extLst>
               <a:ext uri="{FF2B5EF4-FFF2-40B4-BE49-F238E27FC236}">
-                <a16:creationId xmlns="" xmlns:a16="http://schemas.microsoft.com/office/drawing/2014/main" id="{67106D7E-D400-44F1-9A1A-D68CE501C73D}"/>
+                <a16:creationId xmlns:a16="http://schemas.microsoft.com/office/drawing/2014/main" id="{67106D7E-D400-44F1-9A1A-D68CE501C73D}"/>
               </a:ext>
             </a:extLst>
           </p:cNvPr>
@@ -175,7 +176,7 @@
           <p:cNvPr id="3" name="Subtitle 2">
             <a:extLst>
               <a:ext uri="{FF2B5EF4-FFF2-40B4-BE49-F238E27FC236}">
-                <a16:creationId xmlns="" xmlns:a16="http://schemas.microsoft.com/office/drawing/2014/main" id="{A5FDE527-E621-4639-A0C7-E1E9B0DFBCEC}"/>
+                <a16:creationId xmlns:a16="http://schemas.microsoft.com/office/drawing/2014/main" id="{A5FDE527-E621-4639-A0C7-E1E9B0DFBCEC}"/>
               </a:ext>
             </a:extLst>
           </p:cNvPr>
@@ -245,7 +246,7 @@
           <p:cNvPr id="4" name="Date Placeholder 3">
             <a:extLst>
               <a:ext uri="{FF2B5EF4-FFF2-40B4-BE49-F238E27FC236}">
-                <a16:creationId xmlns="" xmlns:a16="http://schemas.microsoft.com/office/drawing/2014/main" id="{E109CE88-B989-4109-89C8-36F7C245DB1C}"/>
+                <a16:creationId xmlns:a16="http://schemas.microsoft.com/office/drawing/2014/main" id="{E109CE88-B989-4109-89C8-36F7C245DB1C}"/>
               </a:ext>
             </a:extLst>
           </p:cNvPr>
@@ -274,7 +275,7 @@
           <p:cNvPr id="5" name="Footer Placeholder 4">
             <a:extLst>
               <a:ext uri="{FF2B5EF4-FFF2-40B4-BE49-F238E27FC236}">
-                <a16:creationId xmlns="" xmlns:a16="http://schemas.microsoft.com/office/drawing/2014/main" id="{0841498F-B991-43D3-B408-CC35D8EFCF37}"/>
+                <a16:creationId xmlns:a16="http://schemas.microsoft.com/office/drawing/2014/main" id="{0841498F-B991-43D3-B408-CC35D8EFCF37}"/>
               </a:ext>
             </a:extLst>
           </p:cNvPr>
@@ -299,7 +300,7 @@
           <p:cNvPr id="6" name="Slide Number Placeholder 5">
             <a:extLst>
               <a:ext uri="{FF2B5EF4-FFF2-40B4-BE49-F238E27FC236}">
-                <a16:creationId xmlns="" xmlns:a16="http://schemas.microsoft.com/office/drawing/2014/main" id="{01754CB8-17B1-45A0-AE7D-755EAA1B69D8}"/>
+                <a16:creationId xmlns:a16="http://schemas.microsoft.com/office/drawing/2014/main" id="{01754CB8-17B1-45A0-AE7D-755EAA1B69D8}"/>
               </a:ext>
             </a:extLst>
           </p:cNvPr>
@@ -358,7 +359,7 @@
           <p:cNvPr id="2" name="Title 1">
             <a:extLst>
               <a:ext uri="{FF2B5EF4-FFF2-40B4-BE49-F238E27FC236}">
-                <a16:creationId xmlns="" xmlns:a16="http://schemas.microsoft.com/office/drawing/2014/main" id="{E7A7B055-5DC2-440D-83C1-CAAE8E9A8E14}"/>
+                <a16:creationId xmlns:a16="http://schemas.microsoft.com/office/drawing/2014/main" id="{E7A7B055-5DC2-440D-83C1-CAAE8E9A8E14}"/>
               </a:ext>
             </a:extLst>
           </p:cNvPr>
@@ -386,7 +387,7 @@
           <p:cNvPr id="3" name="Vertical Text Placeholder 2">
             <a:extLst>
               <a:ext uri="{FF2B5EF4-FFF2-40B4-BE49-F238E27FC236}">
-                <a16:creationId xmlns="" xmlns:a16="http://schemas.microsoft.com/office/drawing/2014/main" id="{65710707-423D-4F9D-A49D-6C764C562553}"/>
+                <a16:creationId xmlns:a16="http://schemas.microsoft.com/office/drawing/2014/main" id="{65710707-423D-4F9D-A49D-6C764C562553}"/>
               </a:ext>
             </a:extLst>
           </p:cNvPr>
@@ -443,7 +444,7 @@
           <p:cNvPr id="4" name="Date Placeholder 3">
             <a:extLst>
               <a:ext uri="{FF2B5EF4-FFF2-40B4-BE49-F238E27FC236}">
-                <a16:creationId xmlns="" xmlns:a16="http://schemas.microsoft.com/office/drawing/2014/main" id="{98B6F7EF-D1BE-4437-85F3-99626E37E4EF}"/>
+                <a16:creationId xmlns:a16="http://schemas.microsoft.com/office/drawing/2014/main" id="{98B6F7EF-D1BE-4437-85F3-99626E37E4EF}"/>
               </a:ext>
             </a:extLst>
           </p:cNvPr>
@@ -472,7 +473,7 @@
           <p:cNvPr id="5" name="Footer Placeholder 4">
             <a:extLst>
               <a:ext uri="{FF2B5EF4-FFF2-40B4-BE49-F238E27FC236}">
-                <a16:creationId xmlns="" xmlns:a16="http://schemas.microsoft.com/office/drawing/2014/main" id="{D890AA9B-E479-4209-B245-83608F3D4013}"/>
+                <a16:creationId xmlns:a16="http://schemas.microsoft.com/office/drawing/2014/main" id="{D890AA9B-E479-4209-B245-83608F3D4013}"/>
               </a:ext>
             </a:extLst>
           </p:cNvPr>
@@ -497,7 +498,7 @@
           <p:cNvPr id="6" name="Slide Number Placeholder 5">
             <a:extLst>
               <a:ext uri="{FF2B5EF4-FFF2-40B4-BE49-F238E27FC236}">
-                <a16:creationId xmlns="" xmlns:a16="http://schemas.microsoft.com/office/drawing/2014/main" id="{0E4976E4-E15A-4296-A430-633D2BB9142B}"/>
+                <a16:creationId xmlns:a16="http://schemas.microsoft.com/office/drawing/2014/main" id="{0E4976E4-E15A-4296-A430-633D2BB9142B}"/>
               </a:ext>
             </a:extLst>
           </p:cNvPr>
@@ -556,7 +557,7 @@
           <p:cNvPr id="2" name="Vertical Title 1">
             <a:extLst>
               <a:ext uri="{FF2B5EF4-FFF2-40B4-BE49-F238E27FC236}">
-                <a16:creationId xmlns="" xmlns:a16="http://schemas.microsoft.com/office/drawing/2014/main" id="{66F63CF5-8DEE-4BB2-A2A5-5C16FEBE1AD5}"/>
+                <a16:creationId xmlns:a16="http://schemas.microsoft.com/office/drawing/2014/main" id="{66F63CF5-8DEE-4BB2-A2A5-5C16FEBE1AD5}"/>
               </a:ext>
             </a:extLst>
           </p:cNvPr>
@@ -589,7 +590,7 @@
           <p:cNvPr id="3" name="Vertical Text Placeholder 2">
             <a:extLst>
               <a:ext uri="{FF2B5EF4-FFF2-40B4-BE49-F238E27FC236}">
-                <a16:creationId xmlns="" xmlns:a16="http://schemas.microsoft.com/office/drawing/2014/main" id="{E0D5EBA5-94AF-4373-B032-A40FF73C7575}"/>
+                <a16:creationId xmlns:a16="http://schemas.microsoft.com/office/drawing/2014/main" id="{E0D5EBA5-94AF-4373-B032-A40FF73C7575}"/>
               </a:ext>
             </a:extLst>
           </p:cNvPr>
@@ -651,7 +652,7 @@
           <p:cNvPr id="4" name="Date Placeholder 3">
             <a:extLst>
               <a:ext uri="{FF2B5EF4-FFF2-40B4-BE49-F238E27FC236}">
-                <a16:creationId xmlns="" xmlns:a16="http://schemas.microsoft.com/office/drawing/2014/main" id="{7426B8E1-6758-4F5E-B618-96641332600B}"/>
+                <a16:creationId xmlns:a16="http://schemas.microsoft.com/office/drawing/2014/main" id="{7426B8E1-6758-4F5E-B618-96641332600B}"/>
               </a:ext>
             </a:extLst>
           </p:cNvPr>
@@ -680,7 +681,7 @@
           <p:cNvPr id="5" name="Footer Placeholder 4">
             <a:extLst>
               <a:ext uri="{FF2B5EF4-FFF2-40B4-BE49-F238E27FC236}">
-                <a16:creationId xmlns="" xmlns:a16="http://schemas.microsoft.com/office/drawing/2014/main" id="{F65E330E-2A7E-482D-AE0F-70EA5A29958B}"/>
+                <a16:creationId xmlns:a16="http://schemas.microsoft.com/office/drawing/2014/main" id="{F65E330E-2A7E-482D-AE0F-70EA5A29958B}"/>
               </a:ext>
             </a:extLst>
           </p:cNvPr>
@@ -705,7 +706,7 @@
           <p:cNvPr id="6" name="Slide Number Placeholder 5">
             <a:extLst>
               <a:ext uri="{FF2B5EF4-FFF2-40B4-BE49-F238E27FC236}">
-                <a16:creationId xmlns="" xmlns:a16="http://schemas.microsoft.com/office/drawing/2014/main" id="{B8000005-FC38-4A6C-9D09-7945EFA08160}"/>
+                <a16:creationId xmlns:a16="http://schemas.microsoft.com/office/drawing/2014/main" id="{B8000005-FC38-4A6C-9D09-7945EFA08160}"/>
               </a:ext>
             </a:extLst>
           </p:cNvPr>
@@ -764,7 +765,7 @@
           <p:cNvPr id="2" name="Title 1">
             <a:extLst>
               <a:ext uri="{FF2B5EF4-FFF2-40B4-BE49-F238E27FC236}">
-                <a16:creationId xmlns="" xmlns:a16="http://schemas.microsoft.com/office/drawing/2014/main" id="{91D0002C-766B-44B4-A24C-BE6DE6C7BA4C}"/>
+                <a16:creationId xmlns:a16="http://schemas.microsoft.com/office/drawing/2014/main" id="{91D0002C-766B-44B4-A24C-BE6DE6C7BA4C}"/>
               </a:ext>
             </a:extLst>
           </p:cNvPr>
@@ -792,7 +793,7 @@
           <p:cNvPr id="3" name="Content Placeholder 2">
             <a:extLst>
               <a:ext uri="{FF2B5EF4-FFF2-40B4-BE49-F238E27FC236}">
-                <a16:creationId xmlns="" xmlns:a16="http://schemas.microsoft.com/office/drawing/2014/main" id="{3455BAA9-6C7B-4874-AD76-BD466F64802D}"/>
+                <a16:creationId xmlns:a16="http://schemas.microsoft.com/office/drawing/2014/main" id="{3455BAA9-6C7B-4874-AD76-BD466F64802D}"/>
               </a:ext>
             </a:extLst>
           </p:cNvPr>
@@ -849,7 +850,7 @@
           <p:cNvPr id="4" name="Date Placeholder 3">
             <a:extLst>
               <a:ext uri="{FF2B5EF4-FFF2-40B4-BE49-F238E27FC236}">
-                <a16:creationId xmlns="" xmlns:a16="http://schemas.microsoft.com/office/drawing/2014/main" id="{8776BDAF-D8F2-4A61-904D-094BB4545702}"/>
+                <a16:creationId xmlns:a16="http://schemas.microsoft.com/office/drawing/2014/main" id="{8776BDAF-D8F2-4A61-904D-094BB4545702}"/>
               </a:ext>
             </a:extLst>
           </p:cNvPr>
@@ -878,7 +879,7 @@
           <p:cNvPr id="5" name="Footer Placeholder 4">
             <a:extLst>
               <a:ext uri="{FF2B5EF4-FFF2-40B4-BE49-F238E27FC236}">
-                <a16:creationId xmlns="" xmlns:a16="http://schemas.microsoft.com/office/drawing/2014/main" id="{F89C5665-4384-4706-9BD2-9F42B05C96BC}"/>
+                <a16:creationId xmlns:a16="http://schemas.microsoft.com/office/drawing/2014/main" id="{F89C5665-4384-4706-9BD2-9F42B05C96BC}"/>
               </a:ext>
             </a:extLst>
           </p:cNvPr>
@@ -903,7 +904,7 @@
           <p:cNvPr id="6" name="Slide Number Placeholder 5">
             <a:extLst>
               <a:ext uri="{FF2B5EF4-FFF2-40B4-BE49-F238E27FC236}">
-                <a16:creationId xmlns="" xmlns:a16="http://schemas.microsoft.com/office/drawing/2014/main" id="{7DCAD73E-CAB3-4BA7-905E-D203691D0418}"/>
+                <a16:creationId xmlns:a16="http://schemas.microsoft.com/office/drawing/2014/main" id="{7DCAD73E-CAB3-4BA7-905E-D203691D0418}"/>
               </a:ext>
             </a:extLst>
           </p:cNvPr>
@@ -962,7 +963,7 @@
           <p:cNvPr id="2" name="Title 1">
             <a:extLst>
               <a:ext uri="{FF2B5EF4-FFF2-40B4-BE49-F238E27FC236}">
-                <a16:creationId xmlns="" xmlns:a16="http://schemas.microsoft.com/office/drawing/2014/main" id="{A9880706-F7FA-4EC3-A022-9D6C7CEC3692}"/>
+                <a16:creationId xmlns:a16="http://schemas.microsoft.com/office/drawing/2014/main" id="{A9880706-F7FA-4EC3-A022-9D6C7CEC3692}"/>
               </a:ext>
             </a:extLst>
           </p:cNvPr>
@@ -999,7 +1000,7 @@
           <p:cNvPr id="3" name="Text Placeholder 2">
             <a:extLst>
               <a:ext uri="{FF2B5EF4-FFF2-40B4-BE49-F238E27FC236}">
-                <a16:creationId xmlns="" xmlns:a16="http://schemas.microsoft.com/office/drawing/2014/main" id="{FA8A65D0-3DF5-448D-82EC-A967682A0DED}"/>
+                <a16:creationId xmlns:a16="http://schemas.microsoft.com/office/drawing/2014/main" id="{FA8A65D0-3DF5-448D-82EC-A967682A0DED}"/>
               </a:ext>
             </a:extLst>
           </p:cNvPr>
@@ -1124,7 +1125,7 @@
           <p:cNvPr id="4" name="Date Placeholder 3">
             <a:extLst>
               <a:ext uri="{FF2B5EF4-FFF2-40B4-BE49-F238E27FC236}">
-                <a16:creationId xmlns="" xmlns:a16="http://schemas.microsoft.com/office/drawing/2014/main" id="{600EA68C-01A6-487D-9D6E-1D1B4EAC0440}"/>
+                <a16:creationId xmlns:a16="http://schemas.microsoft.com/office/drawing/2014/main" id="{600EA68C-01A6-487D-9D6E-1D1B4EAC0440}"/>
               </a:ext>
             </a:extLst>
           </p:cNvPr>
@@ -1153,7 +1154,7 @@
           <p:cNvPr id="5" name="Footer Placeholder 4">
             <a:extLst>
               <a:ext uri="{FF2B5EF4-FFF2-40B4-BE49-F238E27FC236}">
-                <a16:creationId xmlns="" xmlns:a16="http://schemas.microsoft.com/office/drawing/2014/main" id="{6E6527CB-4FFD-4569-A82C-5EDC311B2CF6}"/>
+                <a16:creationId xmlns:a16="http://schemas.microsoft.com/office/drawing/2014/main" id="{6E6527CB-4FFD-4569-A82C-5EDC311B2CF6}"/>
               </a:ext>
             </a:extLst>
           </p:cNvPr>
@@ -1178,7 +1179,7 @@
           <p:cNvPr id="6" name="Slide Number Placeholder 5">
             <a:extLst>
               <a:ext uri="{FF2B5EF4-FFF2-40B4-BE49-F238E27FC236}">
-                <a16:creationId xmlns="" xmlns:a16="http://schemas.microsoft.com/office/drawing/2014/main" id="{24B19E5B-5A98-4381-A01D-01F81FD65792}"/>
+                <a16:creationId xmlns:a16="http://schemas.microsoft.com/office/drawing/2014/main" id="{24B19E5B-5A98-4381-A01D-01F81FD65792}"/>
               </a:ext>
             </a:extLst>
           </p:cNvPr>
@@ -1237,7 +1238,7 @@
           <p:cNvPr id="2" name="Title 1">
             <a:extLst>
               <a:ext uri="{FF2B5EF4-FFF2-40B4-BE49-F238E27FC236}">
-                <a16:creationId xmlns="" xmlns:a16="http://schemas.microsoft.com/office/drawing/2014/main" id="{63228B71-E923-4431-B8D2-FAE724678940}"/>
+                <a16:creationId xmlns:a16="http://schemas.microsoft.com/office/drawing/2014/main" id="{63228B71-E923-4431-B8D2-FAE724678940}"/>
               </a:ext>
             </a:extLst>
           </p:cNvPr>
@@ -1265,7 +1266,7 @@
           <p:cNvPr id="3" name="Content Placeholder 2">
             <a:extLst>
               <a:ext uri="{FF2B5EF4-FFF2-40B4-BE49-F238E27FC236}">
-                <a16:creationId xmlns="" xmlns:a16="http://schemas.microsoft.com/office/drawing/2014/main" id="{B18895E9-B7FF-4A00-955B-206CF8C73E43}"/>
+                <a16:creationId xmlns:a16="http://schemas.microsoft.com/office/drawing/2014/main" id="{B18895E9-B7FF-4A00-955B-206CF8C73E43}"/>
               </a:ext>
             </a:extLst>
           </p:cNvPr>
@@ -1327,7 +1328,7 @@
           <p:cNvPr id="4" name="Content Placeholder 3">
             <a:extLst>
               <a:ext uri="{FF2B5EF4-FFF2-40B4-BE49-F238E27FC236}">
-                <a16:creationId xmlns="" xmlns:a16="http://schemas.microsoft.com/office/drawing/2014/main" id="{DA813955-E3B9-44BC-8E1D-139269C8B48A}"/>
+                <a16:creationId xmlns:a16="http://schemas.microsoft.com/office/drawing/2014/main" id="{DA813955-E3B9-44BC-8E1D-139269C8B48A}"/>
               </a:ext>
             </a:extLst>
           </p:cNvPr>
@@ -1389,7 +1390,7 @@
           <p:cNvPr id="5" name="Date Placeholder 4">
             <a:extLst>
               <a:ext uri="{FF2B5EF4-FFF2-40B4-BE49-F238E27FC236}">
-                <a16:creationId xmlns="" xmlns:a16="http://schemas.microsoft.com/office/drawing/2014/main" id="{7E9B8EF5-28D5-4C4E-A2AB-EEA30D75DAFE}"/>
+                <a16:creationId xmlns:a16="http://schemas.microsoft.com/office/drawing/2014/main" id="{7E9B8EF5-28D5-4C4E-A2AB-EEA30D75DAFE}"/>
               </a:ext>
             </a:extLst>
           </p:cNvPr>
@@ -1418,7 +1419,7 @@
           <p:cNvPr id="6" name="Footer Placeholder 5">
             <a:extLst>
               <a:ext uri="{FF2B5EF4-FFF2-40B4-BE49-F238E27FC236}">
-                <a16:creationId xmlns="" xmlns:a16="http://schemas.microsoft.com/office/drawing/2014/main" id="{5723E678-8CB4-4335-AA04-6BD391748717}"/>
+                <a16:creationId xmlns:a16="http://schemas.microsoft.com/office/drawing/2014/main" id="{5723E678-8CB4-4335-AA04-6BD391748717}"/>
               </a:ext>
             </a:extLst>
           </p:cNvPr>
@@ -1443,7 +1444,7 @@
           <p:cNvPr id="7" name="Slide Number Placeholder 6">
             <a:extLst>
               <a:ext uri="{FF2B5EF4-FFF2-40B4-BE49-F238E27FC236}">
-                <a16:creationId xmlns="" xmlns:a16="http://schemas.microsoft.com/office/drawing/2014/main" id="{887B5567-9F4D-4AE1-92D8-769C9F7EA4F0}"/>
+                <a16:creationId xmlns:a16="http://schemas.microsoft.com/office/drawing/2014/main" id="{887B5567-9F4D-4AE1-92D8-769C9F7EA4F0}"/>
               </a:ext>
             </a:extLst>
           </p:cNvPr>
@@ -1502,7 +1503,7 @@
           <p:cNvPr id="2" name="Title 1">
             <a:extLst>
               <a:ext uri="{FF2B5EF4-FFF2-40B4-BE49-F238E27FC236}">
-                <a16:creationId xmlns="" xmlns:a16="http://schemas.microsoft.com/office/drawing/2014/main" id="{A40320A9-7C0C-45B4-BF2B-3B53B5686EBB}"/>
+                <a16:creationId xmlns:a16="http://schemas.microsoft.com/office/drawing/2014/main" id="{A40320A9-7C0C-45B4-BF2B-3B53B5686EBB}"/>
               </a:ext>
             </a:extLst>
           </p:cNvPr>
@@ -1535,7 +1536,7 @@
           <p:cNvPr id="3" name="Text Placeholder 2">
             <a:extLst>
               <a:ext uri="{FF2B5EF4-FFF2-40B4-BE49-F238E27FC236}">
-                <a16:creationId xmlns="" xmlns:a16="http://schemas.microsoft.com/office/drawing/2014/main" id="{8C440DE1-7DD6-4B1C-B961-CD2079B51F03}"/>
+                <a16:creationId xmlns:a16="http://schemas.microsoft.com/office/drawing/2014/main" id="{8C440DE1-7DD6-4B1C-B961-CD2079B51F03}"/>
               </a:ext>
             </a:extLst>
           </p:cNvPr>
@@ -1606,7 +1607,7 @@
           <p:cNvPr id="4" name="Content Placeholder 3">
             <a:extLst>
               <a:ext uri="{FF2B5EF4-FFF2-40B4-BE49-F238E27FC236}">
-                <a16:creationId xmlns="" xmlns:a16="http://schemas.microsoft.com/office/drawing/2014/main" id="{6FAFE840-CC9A-4D89-B05F-159EF756B427}"/>
+                <a16:creationId xmlns:a16="http://schemas.microsoft.com/office/drawing/2014/main" id="{6FAFE840-CC9A-4D89-B05F-159EF756B427}"/>
               </a:ext>
             </a:extLst>
           </p:cNvPr>
@@ -1668,7 +1669,7 @@
           <p:cNvPr id="5" name="Text Placeholder 4">
             <a:extLst>
               <a:ext uri="{FF2B5EF4-FFF2-40B4-BE49-F238E27FC236}">
-                <a16:creationId xmlns="" xmlns:a16="http://schemas.microsoft.com/office/drawing/2014/main" id="{4B87AADC-3401-48C6-98F6-0AB60F6DF9BE}"/>
+                <a16:creationId xmlns:a16="http://schemas.microsoft.com/office/drawing/2014/main" id="{4B87AADC-3401-48C6-98F6-0AB60F6DF9BE}"/>
               </a:ext>
             </a:extLst>
           </p:cNvPr>
@@ -1739,7 +1740,7 @@
           <p:cNvPr id="6" name="Content Placeholder 5">
             <a:extLst>
               <a:ext uri="{FF2B5EF4-FFF2-40B4-BE49-F238E27FC236}">
-                <a16:creationId xmlns="" xmlns:a16="http://schemas.microsoft.com/office/drawing/2014/main" id="{34BCF1A4-FB52-4DCD-80BC-324BA41C33CD}"/>
+                <a16:creationId xmlns:a16="http://schemas.microsoft.com/office/drawing/2014/main" id="{34BCF1A4-FB52-4DCD-80BC-324BA41C33CD}"/>
               </a:ext>
             </a:extLst>
           </p:cNvPr>
@@ -1801,7 +1802,7 @@
           <p:cNvPr id="7" name="Date Placeholder 6">
             <a:extLst>
               <a:ext uri="{FF2B5EF4-FFF2-40B4-BE49-F238E27FC236}">
-                <a16:creationId xmlns="" xmlns:a16="http://schemas.microsoft.com/office/drawing/2014/main" id="{8CFD4208-60E7-48B1-8CD0-717D5E26B827}"/>
+                <a16:creationId xmlns:a16="http://schemas.microsoft.com/office/drawing/2014/main" id="{8CFD4208-60E7-48B1-8CD0-717D5E26B827}"/>
               </a:ext>
             </a:extLst>
           </p:cNvPr>
@@ -1830,7 +1831,7 @@
           <p:cNvPr id="8" name="Footer Placeholder 7">
             <a:extLst>
               <a:ext uri="{FF2B5EF4-FFF2-40B4-BE49-F238E27FC236}">
-                <a16:creationId xmlns="" xmlns:a16="http://schemas.microsoft.com/office/drawing/2014/main" id="{94E429D1-BEB1-4D8A-91F2-CD4F80157F8D}"/>
+                <a16:creationId xmlns:a16="http://schemas.microsoft.com/office/drawing/2014/main" id="{94E429D1-BEB1-4D8A-91F2-CD4F80157F8D}"/>
               </a:ext>
             </a:extLst>
           </p:cNvPr>
@@ -1855,7 +1856,7 @@
           <p:cNvPr id="9" name="Slide Number Placeholder 8">
             <a:extLst>
               <a:ext uri="{FF2B5EF4-FFF2-40B4-BE49-F238E27FC236}">
-                <a16:creationId xmlns="" xmlns:a16="http://schemas.microsoft.com/office/drawing/2014/main" id="{6F17C19C-8370-4118-A8FC-5DDA6F84230F}"/>
+                <a16:creationId xmlns:a16="http://schemas.microsoft.com/office/drawing/2014/main" id="{6F17C19C-8370-4118-A8FC-5DDA6F84230F}"/>
               </a:ext>
             </a:extLst>
           </p:cNvPr>
@@ -1914,7 +1915,7 @@
           <p:cNvPr id="2" name="Title 1">
             <a:extLst>
               <a:ext uri="{FF2B5EF4-FFF2-40B4-BE49-F238E27FC236}">
-                <a16:creationId xmlns="" xmlns:a16="http://schemas.microsoft.com/office/drawing/2014/main" id="{252CBF36-7F99-45A9-BC35-BD2EC260CBF0}"/>
+                <a16:creationId xmlns:a16="http://schemas.microsoft.com/office/drawing/2014/main" id="{252CBF36-7F99-45A9-BC35-BD2EC260CBF0}"/>
               </a:ext>
             </a:extLst>
           </p:cNvPr>
@@ -1942,7 +1943,7 @@
           <p:cNvPr id="3" name="Date Placeholder 2">
             <a:extLst>
               <a:ext uri="{FF2B5EF4-FFF2-40B4-BE49-F238E27FC236}">
-                <a16:creationId xmlns="" xmlns:a16="http://schemas.microsoft.com/office/drawing/2014/main" id="{0D6F5F83-F07E-4501-B86B-9F96CD43993C}"/>
+                <a16:creationId xmlns:a16="http://schemas.microsoft.com/office/drawing/2014/main" id="{0D6F5F83-F07E-4501-B86B-9F96CD43993C}"/>
               </a:ext>
             </a:extLst>
           </p:cNvPr>
@@ -1971,7 +1972,7 @@
           <p:cNvPr id="4" name="Footer Placeholder 3">
             <a:extLst>
               <a:ext uri="{FF2B5EF4-FFF2-40B4-BE49-F238E27FC236}">
-                <a16:creationId xmlns="" xmlns:a16="http://schemas.microsoft.com/office/drawing/2014/main" id="{2861989B-F8E9-41FD-8E16-687424BCC266}"/>
+                <a16:creationId xmlns:a16="http://schemas.microsoft.com/office/drawing/2014/main" id="{2861989B-F8E9-41FD-8E16-687424BCC266}"/>
               </a:ext>
             </a:extLst>
           </p:cNvPr>
@@ -1996,7 +1997,7 @@
           <p:cNvPr id="5" name="Slide Number Placeholder 4">
             <a:extLst>
               <a:ext uri="{FF2B5EF4-FFF2-40B4-BE49-F238E27FC236}">
-                <a16:creationId xmlns="" xmlns:a16="http://schemas.microsoft.com/office/drawing/2014/main" id="{2026B6D7-7832-4815-95CE-5CEC39502825}"/>
+                <a16:creationId xmlns:a16="http://schemas.microsoft.com/office/drawing/2014/main" id="{2026B6D7-7832-4815-95CE-5CEC39502825}"/>
               </a:ext>
             </a:extLst>
           </p:cNvPr>
@@ -2055,7 +2056,7 @@
           <p:cNvPr id="2" name="Date Placeholder 1">
             <a:extLst>
               <a:ext uri="{FF2B5EF4-FFF2-40B4-BE49-F238E27FC236}">
-                <a16:creationId xmlns="" xmlns:a16="http://schemas.microsoft.com/office/drawing/2014/main" id="{9877919A-C4B6-46FD-A08A-9A4B867FE01A}"/>
+                <a16:creationId xmlns:a16="http://schemas.microsoft.com/office/drawing/2014/main" id="{9877919A-C4B6-46FD-A08A-9A4B867FE01A}"/>
               </a:ext>
             </a:extLst>
           </p:cNvPr>
@@ -2084,7 +2085,7 @@
           <p:cNvPr id="3" name="Footer Placeholder 2">
             <a:extLst>
               <a:ext uri="{FF2B5EF4-FFF2-40B4-BE49-F238E27FC236}">
-                <a16:creationId xmlns="" xmlns:a16="http://schemas.microsoft.com/office/drawing/2014/main" id="{9118539E-383C-4F1C-86F2-14C533A7E9FB}"/>
+                <a16:creationId xmlns:a16="http://schemas.microsoft.com/office/drawing/2014/main" id="{9118539E-383C-4F1C-86F2-14C533A7E9FB}"/>
               </a:ext>
             </a:extLst>
           </p:cNvPr>
@@ -2109,7 +2110,7 @@
           <p:cNvPr id="4" name="Slide Number Placeholder 3">
             <a:extLst>
               <a:ext uri="{FF2B5EF4-FFF2-40B4-BE49-F238E27FC236}">
-                <a16:creationId xmlns="" xmlns:a16="http://schemas.microsoft.com/office/drawing/2014/main" id="{C9A6D4E1-CA83-4214-9942-9E4617AA89BF}"/>
+                <a16:creationId xmlns:a16="http://schemas.microsoft.com/office/drawing/2014/main" id="{C9A6D4E1-CA83-4214-9942-9E4617AA89BF}"/>
               </a:ext>
             </a:extLst>
           </p:cNvPr>
@@ -2168,7 +2169,7 @@
           <p:cNvPr id="2" name="Title 1">
             <a:extLst>
               <a:ext uri="{FF2B5EF4-FFF2-40B4-BE49-F238E27FC236}">
-                <a16:creationId xmlns="" xmlns:a16="http://schemas.microsoft.com/office/drawing/2014/main" id="{046EF9B5-7A2A-4225-8817-86D028D6950C}"/>
+                <a16:creationId xmlns:a16="http://schemas.microsoft.com/office/drawing/2014/main" id="{046EF9B5-7A2A-4225-8817-86D028D6950C}"/>
               </a:ext>
             </a:extLst>
           </p:cNvPr>
@@ -2205,7 +2206,7 @@
           <p:cNvPr id="3" name="Content Placeholder 2">
             <a:extLst>
               <a:ext uri="{FF2B5EF4-FFF2-40B4-BE49-F238E27FC236}">
-                <a16:creationId xmlns="" xmlns:a16="http://schemas.microsoft.com/office/drawing/2014/main" id="{8667C390-5297-41E8-A403-22856007B051}"/>
+                <a16:creationId xmlns:a16="http://schemas.microsoft.com/office/drawing/2014/main" id="{8667C390-5297-41E8-A403-22856007B051}"/>
               </a:ext>
             </a:extLst>
           </p:cNvPr>
@@ -2295,7 +2296,7 @@
           <p:cNvPr id="4" name="Text Placeholder 3">
             <a:extLst>
               <a:ext uri="{FF2B5EF4-FFF2-40B4-BE49-F238E27FC236}">
-                <a16:creationId xmlns="" xmlns:a16="http://schemas.microsoft.com/office/drawing/2014/main" id="{8D0D2F7D-D6CD-4AB1-A3EA-CBFD2A2B3703}"/>
+                <a16:creationId xmlns:a16="http://schemas.microsoft.com/office/drawing/2014/main" id="{8D0D2F7D-D6CD-4AB1-A3EA-CBFD2A2B3703}"/>
               </a:ext>
             </a:extLst>
           </p:cNvPr>
@@ -2366,7 +2367,7 @@
           <p:cNvPr id="5" name="Date Placeholder 4">
             <a:extLst>
               <a:ext uri="{FF2B5EF4-FFF2-40B4-BE49-F238E27FC236}">
-                <a16:creationId xmlns="" xmlns:a16="http://schemas.microsoft.com/office/drawing/2014/main" id="{E17A441D-4FA7-4110-BF24-165CD3C3DAD7}"/>
+                <a16:creationId xmlns:a16="http://schemas.microsoft.com/office/drawing/2014/main" id="{E17A441D-4FA7-4110-BF24-165CD3C3DAD7}"/>
               </a:ext>
             </a:extLst>
           </p:cNvPr>
@@ -2395,7 +2396,7 @@
           <p:cNvPr id="6" name="Footer Placeholder 5">
             <a:extLst>
               <a:ext uri="{FF2B5EF4-FFF2-40B4-BE49-F238E27FC236}">
-                <a16:creationId xmlns="" xmlns:a16="http://schemas.microsoft.com/office/drawing/2014/main" id="{346102C5-5AE3-43CF-A686-1AB72B0790AB}"/>
+                <a16:creationId xmlns:a16="http://schemas.microsoft.com/office/drawing/2014/main" id="{346102C5-5AE3-43CF-A686-1AB72B0790AB}"/>
               </a:ext>
             </a:extLst>
           </p:cNvPr>
@@ -2420,7 +2421,7 @@
           <p:cNvPr id="7" name="Slide Number Placeholder 6">
             <a:extLst>
               <a:ext uri="{FF2B5EF4-FFF2-40B4-BE49-F238E27FC236}">
-                <a16:creationId xmlns="" xmlns:a16="http://schemas.microsoft.com/office/drawing/2014/main" id="{5528B3F7-462C-4500-8836-B3E5CD8DA61A}"/>
+                <a16:creationId xmlns:a16="http://schemas.microsoft.com/office/drawing/2014/main" id="{5528B3F7-462C-4500-8836-B3E5CD8DA61A}"/>
               </a:ext>
             </a:extLst>
           </p:cNvPr>
@@ -2479,7 +2480,7 @@
           <p:cNvPr id="2" name="Title 1">
             <a:extLst>
               <a:ext uri="{FF2B5EF4-FFF2-40B4-BE49-F238E27FC236}">
-                <a16:creationId xmlns="" xmlns:a16="http://schemas.microsoft.com/office/drawing/2014/main" id="{4BA10E59-DA48-4690-A956-9EB8E4E11EE5}"/>
+                <a16:creationId xmlns:a16="http://schemas.microsoft.com/office/drawing/2014/main" id="{4BA10E59-DA48-4690-A956-9EB8E4E11EE5}"/>
               </a:ext>
             </a:extLst>
           </p:cNvPr>
@@ -2516,7 +2517,7 @@
           <p:cNvPr id="3" name="Picture Placeholder 2">
             <a:extLst>
               <a:ext uri="{FF2B5EF4-FFF2-40B4-BE49-F238E27FC236}">
-                <a16:creationId xmlns="" xmlns:a16="http://schemas.microsoft.com/office/drawing/2014/main" id="{AC7AFE1E-67D1-4106-97CA-98302D42CC4D}"/>
+                <a16:creationId xmlns:a16="http://schemas.microsoft.com/office/drawing/2014/main" id="{AC7AFE1E-67D1-4106-97CA-98302D42CC4D}"/>
               </a:ext>
             </a:extLst>
           </p:cNvPr>
@@ -2583,7 +2584,7 @@
           <p:cNvPr id="4" name="Text Placeholder 3">
             <a:extLst>
               <a:ext uri="{FF2B5EF4-FFF2-40B4-BE49-F238E27FC236}">
-                <a16:creationId xmlns="" xmlns:a16="http://schemas.microsoft.com/office/drawing/2014/main" id="{67D8D73B-3D4D-42A7-9A3C-1D508E8A9B45}"/>
+                <a16:creationId xmlns:a16="http://schemas.microsoft.com/office/drawing/2014/main" id="{67D8D73B-3D4D-42A7-9A3C-1D508E8A9B45}"/>
               </a:ext>
             </a:extLst>
           </p:cNvPr>
@@ -2654,7 +2655,7 @@
           <p:cNvPr id="5" name="Date Placeholder 4">
             <a:extLst>
               <a:ext uri="{FF2B5EF4-FFF2-40B4-BE49-F238E27FC236}">
-                <a16:creationId xmlns="" xmlns:a16="http://schemas.microsoft.com/office/drawing/2014/main" id="{48C8945E-A47A-42A2-9DF6-CA6D5002F65F}"/>
+                <a16:creationId xmlns:a16="http://schemas.microsoft.com/office/drawing/2014/main" id="{48C8945E-A47A-42A2-9DF6-CA6D5002F65F}"/>
               </a:ext>
             </a:extLst>
           </p:cNvPr>
@@ -2683,7 +2684,7 @@
           <p:cNvPr id="6" name="Footer Placeholder 5">
             <a:extLst>
               <a:ext uri="{FF2B5EF4-FFF2-40B4-BE49-F238E27FC236}">
-                <a16:creationId xmlns="" xmlns:a16="http://schemas.microsoft.com/office/drawing/2014/main" id="{EB000DB4-2747-4297-B400-42A539FBDB42}"/>
+                <a16:creationId xmlns:a16="http://schemas.microsoft.com/office/drawing/2014/main" id="{EB000DB4-2747-4297-B400-42A539FBDB42}"/>
               </a:ext>
             </a:extLst>
           </p:cNvPr>
@@ -2708,7 +2709,7 @@
           <p:cNvPr id="7" name="Slide Number Placeholder 6">
             <a:extLst>
               <a:ext uri="{FF2B5EF4-FFF2-40B4-BE49-F238E27FC236}">
-                <a16:creationId xmlns="" xmlns:a16="http://schemas.microsoft.com/office/drawing/2014/main" id="{5BAD9222-F141-4803-AF73-E2DD92E2ABBC}"/>
+                <a16:creationId xmlns:a16="http://schemas.microsoft.com/office/drawing/2014/main" id="{5BAD9222-F141-4803-AF73-E2DD92E2ABBC}"/>
               </a:ext>
             </a:extLst>
           </p:cNvPr>
@@ -2772,7 +2773,7 @@
           <p:cNvPr id="2" name="Title Placeholder 1">
             <a:extLst>
               <a:ext uri="{FF2B5EF4-FFF2-40B4-BE49-F238E27FC236}">
-                <a16:creationId xmlns="" xmlns:a16="http://schemas.microsoft.com/office/drawing/2014/main" id="{5BF9D404-795C-4EA4-AD01-26740519239C}"/>
+                <a16:creationId xmlns:a16="http://schemas.microsoft.com/office/drawing/2014/main" id="{5BF9D404-795C-4EA4-AD01-26740519239C}"/>
               </a:ext>
             </a:extLst>
           </p:cNvPr>
@@ -2810,7 +2811,7 @@
           <p:cNvPr id="3" name="Text Placeholder 2">
             <a:extLst>
               <a:ext uri="{FF2B5EF4-FFF2-40B4-BE49-F238E27FC236}">
-                <a16:creationId xmlns="" xmlns:a16="http://schemas.microsoft.com/office/drawing/2014/main" id="{DE3FEC7B-48F8-4348-9BC6-68F83B859EE9}"/>
+                <a16:creationId xmlns:a16="http://schemas.microsoft.com/office/drawing/2014/main" id="{DE3FEC7B-48F8-4348-9BC6-68F83B859EE9}"/>
               </a:ext>
             </a:extLst>
           </p:cNvPr>
@@ -2877,7 +2878,7 @@
           <p:cNvPr id="4" name="Date Placeholder 3">
             <a:extLst>
               <a:ext uri="{FF2B5EF4-FFF2-40B4-BE49-F238E27FC236}">
-                <a16:creationId xmlns="" xmlns:a16="http://schemas.microsoft.com/office/drawing/2014/main" id="{31CA1A1D-E2F5-4161-A025-7B911965C2FE}"/>
+                <a16:creationId xmlns:a16="http://schemas.microsoft.com/office/drawing/2014/main" id="{31CA1A1D-E2F5-4161-A025-7B911965C2FE}"/>
               </a:ext>
             </a:extLst>
           </p:cNvPr>
@@ -2924,7 +2925,7 @@
           <p:cNvPr id="5" name="Footer Placeholder 4">
             <a:extLst>
               <a:ext uri="{FF2B5EF4-FFF2-40B4-BE49-F238E27FC236}">
-                <a16:creationId xmlns="" xmlns:a16="http://schemas.microsoft.com/office/drawing/2014/main" id="{43C7B926-18F3-4C13-AB92-764E10D324FB}"/>
+                <a16:creationId xmlns:a16="http://schemas.microsoft.com/office/drawing/2014/main" id="{43C7B926-18F3-4C13-AB92-764E10D324FB}"/>
               </a:ext>
             </a:extLst>
           </p:cNvPr>
@@ -2967,7 +2968,7 @@
           <p:cNvPr id="6" name="Slide Number Placeholder 5">
             <a:extLst>
               <a:ext uri="{FF2B5EF4-FFF2-40B4-BE49-F238E27FC236}">
-                <a16:creationId xmlns="" xmlns:a16="http://schemas.microsoft.com/office/drawing/2014/main" id="{734FA846-3BF6-46FD-80CF-34B300D244C0}"/>
+                <a16:creationId xmlns:a16="http://schemas.microsoft.com/office/drawing/2014/main" id="{734FA846-3BF6-46FD-80CF-34B300D244C0}"/>
               </a:ext>
             </a:extLst>
           </p:cNvPr>
@@ -3387,7 +3388,7 @@
               <a:buChar char="•"/>
             </a:pPr>
             <a:r>
-              <a:rPr lang="en-US" dirty="0" smtClean="0"/>
+              <a:rPr lang="en-US" dirty="0"/>
               <a:t>Team Members</a:t>
             </a:r>
           </a:p>
@@ -3397,55 +3398,45 @@
               <a:buChar char="•"/>
             </a:pPr>
             <a:r>
-              <a:rPr lang="en-US" dirty="0" smtClean="0"/>
+              <a:rPr lang="en-US" dirty="0"/>
               <a:t>Antonio Pierre</a:t>
             </a:r>
+          </a:p>
+          <a:p>
+            <a:pPr marL="800100" lvl="1" indent="-342900" algn="l">
+              <a:buFont typeface="Arial" panose="020B0604020202020204" pitchFamily="34" charset="0"/>
+              <a:buChar char="•"/>
+            </a:pPr>
+            <a:r>
+              <a:rPr lang="en-US" dirty="0"/>
+              <a:t>Matthew Rho</a:t>
+            </a:r>
+          </a:p>
+          <a:p>
+            <a:pPr marL="800100" lvl="1" indent="-342900" algn="l">
+              <a:buFont typeface="Arial" panose="020B0604020202020204" pitchFamily="34" charset="0"/>
+              <a:buChar char="•"/>
+            </a:pPr>
+            <a:r>
+              <a:rPr lang="en-US" dirty="0"/>
+              <a:t>Tom Weikel</a:t>
+            </a:r>
+          </a:p>
+          <a:p>
+            <a:pPr marL="342900" indent="-342900" algn="l">
+              <a:buFont typeface="Arial" panose="020B0604020202020204" pitchFamily="34" charset="0"/>
+              <a:buChar char="•"/>
+            </a:pPr>
             <a:endParaRPr lang="en-US" dirty="0"/>
           </a:p>
           <a:p>
-            <a:pPr marL="800100" lvl="1" indent="-342900" algn="l">
-              <a:buFont typeface="Arial" panose="020B0604020202020204" pitchFamily="34" charset="0"/>
-              <a:buChar char="•"/>
-            </a:pPr>
-            <a:r>
-              <a:rPr lang="en-US" dirty="0" smtClean="0"/>
-              <a:t>Matthew Rho</a:t>
-            </a:r>
-            <a:endParaRPr lang="en-US" dirty="0"/>
-          </a:p>
-          <a:p>
-            <a:pPr marL="800100" lvl="1" indent="-342900" algn="l">
-              <a:buFont typeface="Arial" panose="020B0604020202020204" pitchFamily="34" charset="0"/>
-              <a:buChar char="•"/>
-            </a:pPr>
-            <a:r>
-              <a:rPr lang="en-US" dirty="0" smtClean="0"/>
-              <a:t>Tom Weikel</a:t>
-            </a:r>
-          </a:p>
-          <a:p>
             <a:pPr marL="342900" indent="-342900" algn="l">
               <a:buFont typeface="Arial" panose="020B0604020202020204" pitchFamily="34" charset="0"/>
               <a:buChar char="•"/>
             </a:pPr>
-            <a:endParaRPr lang="en-US" dirty="0" smtClean="0"/>
-          </a:p>
-          <a:p>
-            <a:pPr marL="342900" indent="-342900" algn="l">
-              <a:buFont typeface="Arial" panose="020B0604020202020204" pitchFamily="34" charset="0"/>
-              <a:buChar char="•"/>
-            </a:pPr>
-            <a:r>
-              <a:rPr lang="en-US" dirty="0" smtClean="0"/>
-              <a:t>Have </a:t>
-            </a:r>
-            <a:r>
-              <a:rPr lang="en-US" dirty="0"/>
-              <a:t>a team </a:t>
-            </a:r>
-            <a:r>
-              <a:rPr lang="en-US" dirty="0" smtClean="0"/>
-              <a:t>name: Team Power: </a:t>
+            <a:r>
+              <a:rPr lang="en-US" dirty="0"/>
+              <a:t>Have a team name: Team Power: </a:t>
             </a:r>
             <a:r>
               <a:rPr lang="en-US" dirty="0" err="1"/>
@@ -3453,11 +3444,7 @@
             </a:r>
             <a:r>
               <a:rPr lang="en-US" dirty="0"/>
-              <a:t> </a:t>
-            </a:r>
-            <a:r>
-              <a:rPr lang="en-US" dirty="0" smtClean="0"/>
-              <a:t>Rangers Coffee System</a:t>
+              <a:t> Rangers Coffee System</a:t>
             </a:r>
           </a:p>
           <a:p>
@@ -3466,7 +3453,7 @@
               <a:buChar char="•"/>
             </a:pPr>
             <a:r>
-              <a:rPr lang="en-US" dirty="0" smtClean="0"/>
+              <a:rPr lang="en-US" dirty="0"/>
               <a:t>Slogan: “Power Brewed to Power Through”</a:t>
             </a:r>
           </a:p>
@@ -3475,7 +3462,7 @@
               <a:buFont typeface="Arial" panose="020B0604020202020204" pitchFamily="34" charset="0"/>
               <a:buChar char="•"/>
             </a:pPr>
-            <a:endParaRPr lang="en-US" dirty="0" smtClean="0"/>
+            <a:endParaRPr lang="en-US" dirty="0"/>
           </a:p>
           <a:p>
             <a:pPr marL="342900" indent="-342900" algn="l">
@@ -3483,28 +3470,8 @@
               <a:buChar char="•"/>
             </a:pPr>
             <a:r>
-              <a:rPr lang="en-US" dirty="0" smtClean="0"/>
-              <a:t>Aromatic Mountain Technologies (AMT) is an online coffee store that allows customers and employees to buy coffee beans, ground coffee, syrups, coffee accessory and apparel.  AMT makes use of an external free API </a:t>
-            </a:r>
-            <a:r>
-              <a:rPr lang="en-US" dirty="0" smtClean="0"/>
-              <a:t>possibly </a:t>
-            </a:r>
-            <a:r>
-              <a:rPr lang="en-US" dirty="0" smtClean="0"/>
-              <a:t>to </a:t>
-            </a:r>
-            <a:r>
-              <a:rPr lang="en-US" dirty="0" smtClean="0"/>
-              <a:t>do payment </a:t>
-            </a:r>
-            <a:r>
-              <a:rPr lang="en-US" dirty="0" smtClean="0"/>
-              <a:t>processing and/or shopping cart API.  </a:t>
-            </a:r>
-            <a:r>
-              <a:rPr lang="en-US" dirty="0" smtClean="0"/>
-              <a:t>AMT has internal RESTful APIs that are consumed by the client web pages.</a:t>
+              <a:rPr lang="en-US" dirty="0"/>
+              <a:t>Aromatic Mountain Technologies (AMT) is an online coffee store that allows customers and employees to buy coffee beans, ground coffee, syrups, coffee accessory and apparel.  AMT makes use of an external free API possibly to do payment processing and/or shopping cart API.  AMT has internal RESTful APIs that are consumed by the client web pages.</a:t>
             </a:r>
           </a:p>
           <a:p>
@@ -3512,7 +3479,7 @@
               <a:buFont typeface="Arial" panose="020B0604020202020204" pitchFamily="34" charset="0"/>
               <a:buChar char="•"/>
             </a:pPr>
-            <a:endParaRPr lang="en-US" dirty="0" smtClean="0"/>
+            <a:endParaRPr lang="en-US" dirty="0"/>
           </a:p>
           <a:p>
             <a:pPr marL="342900" indent="-342900" algn="l">
@@ -3520,7 +3487,7 @@
               <a:buChar char="•"/>
             </a:pPr>
             <a:r>
-              <a:rPr lang="en-US" dirty="0" smtClean="0"/>
+              <a:rPr lang="en-US" dirty="0"/>
               <a:t>Thought process</a:t>
             </a:r>
           </a:p>
@@ -3530,7 +3497,7 @@
               <a:buChar char="•"/>
             </a:pPr>
             <a:r>
-              <a:rPr lang="en-US" dirty="0" smtClean="0"/>
+              <a:rPr lang="en-US" dirty="0"/>
               <a:t>Client server / login / endpoints / roles</a:t>
             </a:r>
           </a:p>
@@ -3540,7 +3507,7 @@
               <a:buChar char="•"/>
             </a:pPr>
             <a:r>
-              <a:rPr lang="en-US" dirty="0" smtClean="0"/>
+              <a:rPr lang="en-US" dirty="0"/>
               <a:t>Online Store (Like Amazon)</a:t>
             </a:r>
           </a:p>
@@ -3550,7 +3517,7 @@
               <a:buChar char="•"/>
             </a:pPr>
             <a:r>
-              <a:rPr lang="en-US" dirty="0" smtClean="0"/>
+              <a:rPr lang="en-US" dirty="0"/>
               <a:t>Customers</a:t>
             </a:r>
           </a:p>
@@ -3560,7 +3527,7 @@
               <a:buChar char="•"/>
             </a:pPr>
             <a:r>
-              <a:rPr lang="en-US" dirty="0" smtClean="0"/>
+              <a:rPr lang="en-US" dirty="0"/>
               <a:t>Admin</a:t>
             </a:r>
           </a:p>
@@ -3570,7 +3537,7 @@
               <a:buChar char="•"/>
             </a:pPr>
             <a:r>
-              <a:rPr lang="en-US" dirty="0" smtClean="0"/>
+              <a:rPr lang="en-US" dirty="0"/>
               <a:t>Employee (access to some but not all Admin areas)</a:t>
             </a:r>
           </a:p>
@@ -3580,7 +3547,7 @@
               <a:buChar char="•"/>
             </a:pPr>
             <a:r>
-              <a:rPr lang="en-US" dirty="0" smtClean="0"/>
+              <a:rPr lang="en-US" dirty="0"/>
               <a:t>Product pages (One related products, like a Starbucks Coffee and related items)</a:t>
             </a:r>
           </a:p>
@@ -3590,15 +3557,15 @@
               <a:buChar char="•"/>
             </a:pPr>
             <a:r>
-              <a:rPr lang="en-US" dirty="0" smtClean="0"/>
+              <a:rPr lang="en-US" dirty="0"/>
               <a:t>Payment process (store payment info [credit cards, </a:t>
             </a:r>
             <a:r>
-              <a:rPr lang="en-US" dirty="0" err="1" smtClean="0"/>
+              <a:rPr lang="en-US" dirty="0" err="1"/>
               <a:t>paypal</a:t>
             </a:r>
             <a:r>
-              <a:rPr lang="en-US" dirty="0" smtClean="0"/>
+              <a:rPr lang="en-US" dirty="0"/>
               <a:t>, electronic transfer])</a:t>
             </a:r>
           </a:p>
@@ -3618,7 +3585,7 @@
               <a:buFont typeface="Arial" panose="020B0604020202020204" pitchFamily="34" charset="0"/>
               <a:buChar char="•"/>
             </a:pPr>
-            <a:endParaRPr lang="en-US" dirty="0" smtClean="0"/>
+            <a:endParaRPr lang="en-US" dirty="0"/>
           </a:p>
           <a:p>
             <a:pPr marL="342900" indent="-342900" algn="l">
@@ -3716,7 +3683,7 @@
               <a:buChar char="•"/>
             </a:pPr>
             <a:r>
-              <a:rPr lang="en-US" dirty="0" smtClean="0"/>
+              <a:rPr lang="en-US" dirty="0"/>
               <a:t>User Stories</a:t>
             </a:r>
           </a:p>
@@ -3726,7 +3693,7 @@
               <a:buChar char="•"/>
             </a:pPr>
             <a:r>
-              <a:rPr lang="en-US" dirty="0" smtClean="0"/>
+              <a:rPr lang="en-US" dirty="0"/>
               <a:t>View Catalog</a:t>
             </a:r>
           </a:p>
@@ -3736,7 +3703,7 @@
               <a:buChar char="•"/>
             </a:pPr>
             <a:r>
-              <a:rPr lang="en-US" dirty="0" smtClean="0"/>
+              <a:rPr lang="en-US" dirty="0"/>
               <a:t>Add to shopping cart</a:t>
             </a:r>
           </a:p>
@@ -3746,7 +3713,7 @@
               <a:buChar char="•"/>
             </a:pPr>
             <a:r>
-              <a:rPr lang="en-US" dirty="0" smtClean="0"/>
+              <a:rPr lang="en-US" dirty="0"/>
               <a:t>Checkout (login)</a:t>
             </a:r>
           </a:p>
@@ -3756,7 +3723,7 @@
               <a:buChar char="•"/>
             </a:pPr>
             <a:r>
-              <a:rPr lang="en-US" dirty="0" smtClean="0"/>
+              <a:rPr lang="en-US" dirty="0"/>
               <a:t>Admin user stories (controls publishing catalog)</a:t>
             </a:r>
           </a:p>
@@ -3766,7 +3733,7 @@
               <a:buChar char="•"/>
             </a:pPr>
             <a:r>
-              <a:rPr lang="en-US" dirty="0" smtClean="0"/>
+              <a:rPr lang="en-US" dirty="0"/>
               <a:t>As an Admin controls publishing of Employee catalog items and pages</a:t>
             </a:r>
           </a:p>
@@ -3776,7 +3743,7 @@
               <a:buChar char="•"/>
             </a:pPr>
             <a:r>
-              <a:rPr lang="en-US" dirty="0" smtClean="0"/>
+              <a:rPr lang="en-US" dirty="0"/>
               <a:t>Employee (in employee role and as customers) user stories</a:t>
             </a:r>
           </a:p>
@@ -3786,7 +3753,7 @@
               <a:buChar char="•"/>
             </a:pPr>
             <a:r>
-              <a:rPr lang="en-US" dirty="0" smtClean="0"/>
+              <a:rPr lang="en-US" dirty="0"/>
               <a:t>As an employee I can create catalog items / pages</a:t>
             </a:r>
           </a:p>
@@ -3796,7 +3763,7 @@
               <a:buChar char="•"/>
             </a:pPr>
             <a:r>
-              <a:rPr lang="en-US" dirty="0" smtClean="0"/>
+              <a:rPr lang="en-US" dirty="0"/>
               <a:t>As an employee I provide customer support (contact us support, online chat)</a:t>
             </a:r>
           </a:p>
@@ -3806,7 +3773,7 @@
               <a:buChar char="•"/>
             </a:pPr>
             <a:r>
-              <a:rPr lang="en-US" dirty="0" smtClean="0"/>
+              <a:rPr lang="en-US" dirty="0"/>
               <a:t>As an employee buying from the catalog I want to use my company discount benefits</a:t>
             </a:r>
           </a:p>
@@ -3816,7 +3783,7 @@
               <a:buChar char="•"/>
             </a:pPr>
             <a:r>
-              <a:rPr lang="en-US" dirty="0" smtClean="0"/>
+              <a:rPr lang="en-US" dirty="0"/>
               <a:t>Customer</a:t>
             </a:r>
           </a:p>
@@ -3826,7 +3793,7 @@
               <a:buChar char="•"/>
             </a:pPr>
             <a:r>
-              <a:rPr lang="en-US" dirty="0" smtClean="0"/>
+              <a:rPr lang="en-US" dirty="0"/>
               <a:t>As a Customer I want to view the online catalog</a:t>
             </a:r>
           </a:p>
@@ -3836,7 +3803,7 @@
               <a:buChar char="•"/>
             </a:pPr>
             <a:r>
-              <a:rPr lang="en-US" dirty="0" smtClean="0"/>
+              <a:rPr lang="en-US" dirty="0"/>
               <a:t>As a Customer I want to buy from the online catalog</a:t>
             </a:r>
           </a:p>
@@ -3846,7 +3813,7 @@
               <a:buChar char="•"/>
             </a:pPr>
             <a:r>
-              <a:rPr lang="en-US" dirty="0" smtClean="0"/>
+              <a:rPr lang="en-US" dirty="0"/>
               <a:t>As a Customer I want to create and use a secure account to make my purchases</a:t>
             </a:r>
           </a:p>
@@ -3855,7 +3822,7 @@
               <a:buFont typeface="Arial" panose="020B0604020202020204" pitchFamily="34" charset="0"/>
               <a:buChar char="•"/>
             </a:pPr>
-            <a:endParaRPr lang="en-US" dirty="0" smtClean="0"/>
+            <a:endParaRPr lang="en-US" dirty="0"/>
           </a:p>
           <a:p>
             <a:pPr marL="342900" indent="-342900" algn="l">
@@ -3873,7 +3840,7 @@
               <a:buFont typeface="Arial" panose="020B0604020202020204" pitchFamily="34" charset="0"/>
               <a:buChar char="•"/>
             </a:pPr>
-            <a:endParaRPr lang="en-US" dirty="0" smtClean="0"/>
+            <a:endParaRPr lang="en-US" dirty="0"/>
           </a:p>
           <a:p>
             <a:pPr marL="342900" indent="-342900" algn="l">
@@ -3939,13 +3906,8 @@
             <a:pPr algn="l"/>
             <a:r>
               <a:rPr lang="en-US" sz="2800" dirty="0"/>
-              <a:t>Aromatic Mountain Technologies (AMT) </a:t>
-            </a:r>
-            <a:r>
-              <a:rPr lang="en-US" sz="2800" dirty="0" smtClean="0"/>
-              <a:t>Basic Requirements</a:t>
-            </a:r>
-            <a:endParaRPr lang="en-US" sz="2800" dirty="0"/>
+              <a:t>Aromatic Mountain Technologies (AMT) Basic Requirements</a:t>
+            </a:r>
           </a:p>
         </p:txBody>
       </p:sp>
@@ -4263,13 +4225,8 @@
             </a:pPr>
             <a:r>
               <a:rPr lang="en-US" dirty="0"/>
-              <a:t>E2E tests don't contribute to code coverage since we are automating actual browser actions and not running tests that are directly interacting with our code like in the case of integration or unit </a:t>
-            </a:r>
-            <a:r>
-              <a:rPr lang="en-US" dirty="0" smtClean="0"/>
-              <a:t>tests</a:t>
-            </a:r>
-            <a:endParaRPr lang="en-US" dirty="0"/>
+              <a:t>E2E tests don't contribute to code coverage since we are automating actual browser actions and not running tests that are directly interacting with our code like in the case of integration or unit tests</a:t>
+            </a:r>
           </a:p>
         </p:txBody>
       </p:sp>
@@ -4370,7 +4327,7 @@
               <a:buChar char="•"/>
             </a:pPr>
             <a:r>
-              <a:rPr lang="en-US" dirty="0" smtClean="0"/>
+              <a:rPr lang="en-US" dirty="0"/>
               <a:t>Frontend</a:t>
             </a:r>
           </a:p>
@@ -4380,22 +4337,22 @@
               <a:buChar char="•"/>
             </a:pPr>
             <a:r>
-              <a:rPr lang="en-US" dirty="0" smtClean="0"/>
+              <a:rPr lang="en-US" dirty="0"/>
               <a:t>You </a:t>
             </a:r>
             <a:r>
-              <a:rPr lang="en-US" b="1" dirty="0" smtClean="0"/>
+              <a:rPr lang="en-US" b="1" dirty="0"/>
               <a:t>should</a:t>
             </a:r>
             <a:r>
-              <a:rPr lang="en-US" dirty="0" smtClean="0"/>
+              <a:rPr lang="en-US" dirty="0"/>
               <a:t> be using </a:t>
             </a:r>
             <a:r>
-              <a:rPr lang="en-US" b="1" dirty="0" smtClean="0"/>
+              <a:rPr lang="en-US" b="1" dirty="0"/>
               <a:t>Angular</a:t>
             </a:r>
-            <a:endParaRPr lang="en-US" dirty="0" smtClean="0"/>
+            <a:endParaRPr lang="en-US" dirty="0"/>
           </a:p>
           <a:p>
             <a:pPr marL="800100" lvl="1" indent="-342900" algn="l">
@@ -4403,15 +4360,15 @@
               <a:buChar char="•"/>
             </a:pPr>
             <a:r>
-              <a:rPr lang="en-US" dirty="0" smtClean="0"/>
+              <a:rPr lang="en-US" dirty="0"/>
               <a:t>You </a:t>
             </a:r>
             <a:r>
-              <a:rPr lang="en-US" b="1" dirty="0" smtClean="0"/>
+              <a:rPr lang="en-US" b="1" dirty="0"/>
               <a:t>must</a:t>
             </a:r>
             <a:r>
-              <a:rPr lang="en-US" dirty="0" smtClean="0"/>
+              <a:rPr lang="en-US" dirty="0"/>
               <a:t> consume your RESTful API backend</a:t>
             </a:r>
           </a:p>
@@ -4421,10 +4378,10 @@
               <a:buChar char="•"/>
             </a:pPr>
             <a:r>
-              <a:rPr lang="en-US" b="1" dirty="0" smtClean="0"/>
+              <a:rPr lang="en-US" b="1" dirty="0"/>
               <a:t>You must also consume a second, external REST API</a:t>
             </a:r>
-            <a:endParaRPr lang="en-US" dirty="0" smtClean="0"/>
+            <a:endParaRPr lang="en-US" dirty="0"/>
           </a:p>
           <a:p>
             <a:pPr marL="1200150" lvl="2" indent="-285750" algn="l">
@@ -4432,7 +4389,7 @@
               <a:buChar char="•"/>
             </a:pPr>
             <a:r>
-              <a:rPr lang="en-US" dirty="0" smtClean="0"/>
+              <a:rPr lang="en-US" dirty="0"/>
               <a:t>Please make sure the API you want to use is free and working</a:t>
             </a:r>
           </a:p>
@@ -4442,7 +4399,7 @@
               <a:buChar char="•"/>
             </a:pPr>
             <a:r>
-              <a:rPr lang="en-US" dirty="0" smtClean="0"/>
+              <a:rPr lang="en-US" dirty="0"/>
               <a:t>That way, you do not scramble to revise your project idea when you realize the API either does not work or costs money to use</a:t>
             </a:r>
           </a:p>
@@ -4452,12 +4409,8 @@
               <a:buChar char="•"/>
             </a:pPr>
             <a:r>
-              <a:rPr lang="en-US" dirty="0" smtClean="0"/>
-              <a:t>AWS </a:t>
-            </a:r>
-            <a:r>
-              <a:rPr lang="en-US" dirty="0"/>
-              <a:t>Deployment (Frontend + Backend)</a:t>
+              <a:rPr lang="en-US" dirty="0"/>
+              <a:t>AWS Deployment (Frontend + Backend)</a:t>
             </a:r>
           </a:p>
           <a:p>
@@ -4618,13 +4571,8 @@
             <a:pPr algn="l"/>
             <a:r>
               <a:rPr lang="en-US" sz="2800" dirty="0"/>
-              <a:t>Aromatic Mountain Technologies (AMT) </a:t>
-            </a:r>
-            <a:r>
-              <a:rPr lang="en-US" sz="2800" dirty="0" smtClean="0"/>
-              <a:t>Basic Requirements Continued</a:t>
-            </a:r>
-            <a:endParaRPr lang="en-US" sz="2800" dirty="0"/>
+              <a:t>Aromatic Mountain Technologies (AMT) Basic Requirements Continued</a:t>
+            </a:r>
           </a:p>
         </p:txBody>
       </p:sp>
@@ -4831,6 +4779,202 @@
     <p:extLst>
       <p:ext uri="{BB962C8B-B14F-4D97-AF65-F5344CB8AC3E}">
         <p14:creationId xmlns:p14="http://schemas.microsoft.com/office/powerpoint/2010/main" val="1222964998"/>
+      </p:ext>
+    </p:extLst>
+  </p:cSld>
+  <p:clrMapOvr>
+    <a:masterClrMapping/>
+  </p:clrMapOvr>
+</p:sld>
+</file>
+
+<file path=ppt/slides/slide6.xml><?xml version="1.0" encoding="utf-8"?>
+<p:sld xmlns:a="http://schemas.openxmlformats.org/drawingml/2006/main" xmlns:r="http://schemas.openxmlformats.org/officeDocument/2006/relationships" xmlns:p="http://schemas.openxmlformats.org/presentationml/2006/main">
+  <p:cSld>
+    <p:bg>
+      <p:bgPr>
+        <a:solidFill>
+          <a:schemeClr val="bg1"/>
+        </a:solidFill>
+        <a:effectLst/>
+      </p:bgPr>
+    </p:bg>
+    <p:spTree>
+      <p:nvGrpSpPr>
+        <p:cNvPr id="1" name=""/>
+        <p:cNvGrpSpPr/>
+        <p:nvPr/>
+      </p:nvGrpSpPr>
+      <p:grpSpPr>
+        <a:xfrm>
+          <a:off x="0" y="0"/>
+          <a:ext cx="0" cy="0"/>
+          <a:chOff x="0" y="0"/>
+          <a:chExt cx="0" cy="0"/>
+        </a:xfrm>
+      </p:grpSpPr>
+      <p:sp>
+        <p:nvSpPr>
+          <p:cNvPr id="10" name="Rectangle 9">
+            <a:extLst>
+              <a:ext uri="{FF2B5EF4-FFF2-40B4-BE49-F238E27FC236}">
+                <a16:creationId xmlns:a16="http://schemas.microsoft.com/office/drawing/2014/main" id="{32BC26D8-82FB-445E-AA49-62A77D7C1EE0}"/>
+              </a:ext>
+              <a:ext uri="{C183D7F6-B498-43B3-948B-1728B52AA6E4}">
+                <adec:decorative xmlns:adec="http://schemas.microsoft.com/office/drawing/2017/decorative" val="1"/>
+              </a:ext>
+            </a:extLst>
+          </p:cNvPr>
+          <p:cNvSpPr>
+            <a:spLocks noGrp="1" noRot="1" noChangeAspect="1" noMove="1" noResize="1" noEditPoints="1" noAdjustHandles="1" noChangeArrowheads="1" noChangeShapeType="1" noTextEdit="1"/>
+          </p:cNvSpPr>
+          <p:nvPr>
+            <p:extLst>
+              <p:ext uri="{386F3935-93C4-4BCD-93E2-E3B085C9AB24}">
+                <p16:designElem xmlns:p16="http://schemas.microsoft.com/office/powerpoint/2015/main" val="1"/>
+              </p:ext>
+            </p:extLst>
+          </p:nvPr>
+        </p:nvSpPr>
+        <p:spPr>
+          <a:xfrm>
+            <a:off x="0" y="0"/>
+            <a:ext cx="12192000" cy="6858000"/>
+          </a:xfrm>
+          <a:prstGeom prst="rect">
+            <a:avLst/>
+          </a:prstGeom>
+          <a:solidFill>
+            <a:srgbClr val="5A2B50"/>
+          </a:solidFill>
+          <a:ln>
+            <a:noFill/>
+          </a:ln>
+        </p:spPr>
+        <p:style>
+          <a:lnRef idx="2">
+            <a:schemeClr val="accent1">
+              <a:shade val="50000"/>
+            </a:schemeClr>
+          </a:lnRef>
+          <a:fillRef idx="1">
+            <a:schemeClr val="accent1"/>
+          </a:fillRef>
+          <a:effectRef idx="0">
+            <a:schemeClr val="accent1"/>
+          </a:effectRef>
+          <a:fontRef idx="minor">
+            <a:schemeClr val="lt1"/>
+          </a:fontRef>
+        </p:style>
+        <p:txBody>
+          <a:bodyPr rtlCol="0" anchor="ctr"/>
+          <a:lstStyle/>
+          <a:p>
+            <a:pPr algn="ctr"/>
+            <a:endParaRPr lang="en-US"/>
+          </a:p>
+        </p:txBody>
+      </p:sp>
+      <p:sp>
+        <p:nvSpPr>
+          <p:cNvPr id="23" name="Rectangle 11">
+            <a:extLst>
+              <a:ext uri="{FF2B5EF4-FFF2-40B4-BE49-F238E27FC236}">
+                <a16:creationId xmlns:a16="http://schemas.microsoft.com/office/drawing/2014/main" id="{CB44330D-EA18-4254-AA95-EB49948539B8}"/>
+              </a:ext>
+              <a:ext uri="{C183D7F6-B498-43B3-948B-1728B52AA6E4}">
+                <adec:decorative xmlns:adec="http://schemas.microsoft.com/office/drawing/2017/decorative" val="1"/>
+              </a:ext>
+            </a:extLst>
+          </p:cNvPr>
+          <p:cNvSpPr>
+            <a:spLocks noGrp="1" noRot="1" noChangeAspect="1" noMove="1" noResize="1" noEditPoints="1" noAdjustHandles="1" noChangeArrowheads="1" noChangeShapeType="1" noTextEdit="1"/>
+          </p:cNvSpPr>
+          <p:nvPr>
+            <p:extLst>
+              <p:ext uri="{386F3935-93C4-4BCD-93E2-E3B085C9AB24}">
+                <p16:designElem xmlns:p16="http://schemas.microsoft.com/office/powerpoint/2015/main" val="1"/>
+              </p:ext>
+            </p:extLst>
+          </p:nvPr>
+        </p:nvSpPr>
+        <p:spPr>
+          <a:xfrm>
+            <a:off x="477012" y="480060"/>
+            <a:ext cx="11237976" cy="5897880"/>
+          </a:xfrm>
+          <a:prstGeom prst="rect">
+            <a:avLst/>
+          </a:prstGeom>
+          <a:solidFill>
+            <a:srgbClr val="FFFFFF"/>
+          </a:solidFill>
+          <a:ln>
+            <a:noFill/>
+          </a:ln>
+        </p:spPr>
+        <p:style>
+          <a:lnRef idx="2">
+            <a:schemeClr val="accent1">
+              <a:shade val="50000"/>
+            </a:schemeClr>
+          </a:lnRef>
+          <a:fillRef idx="1">
+            <a:schemeClr val="accent1"/>
+          </a:fillRef>
+          <a:effectRef idx="0">
+            <a:schemeClr val="accent1"/>
+          </a:effectRef>
+          <a:fontRef idx="minor">
+            <a:schemeClr val="lt1"/>
+          </a:fontRef>
+        </p:style>
+        <p:txBody>
+          <a:bodyPr rtlCol="0" anchor="ctr"/>
+          <a:lstStyle/>
+          <a:p>
+            <a:pPr algn="ctr"/>
+            <a:endParaRPr lang="en-US"/>
+          </a:p>
+        </p:txBody>
+      </p:sp>
+      <p:pic>
+        <p:nvPicPr>
+          <p:cNvPr id="5" name="Content Placeholder 4">
+            <a:extLst>
+              <a:ext uri="{FF2B5EF4-FFF2-40B4-BE49-F238E27FC236}">
+                <a16:creationId xmlns:a16="http://schemas.microsoft.com/office/drawing/2014/main" id="{E15CE9C9-A3D0-4D7C-888D-ACF85E8DA2BE}"/>
+              </a:ext>
+            </a:extLst>
+          </p:cNvPr>
+          <p:cNvPicPr>
+            <a:picLocks noGrp="1" noChangeAspect="1"/>
+          </p:cNvPicPr>
+          <p:nvPr>
+            <p:ph idx="1"/>
+          </p:nvPr>
+        </p:nvPicPr>
+        <p:blipFill>
+          <a:blip r:embed="rId2"/>
+          <a:stretch>
+            <a:fillRect/>
+          </a:stretch>
+        </p:blipFill>
+        <p:spPr>
+          <a:xfrm>
+            <a:off x="1008268" y="643467"/>
+            <a:ext cx="10175464" cy="5571066"/>
+          </a:xfrm>
+          <a:prstGeom prst="rect">
+            <a:avLst/>
+          </a:prstGeom>
+        </p:spPr>
+      </p:pic>
+    </p:spTree>
+    <p:extLst>
+      <p:ext uri="{BB962C8B-B14F-4D97-AF65-F5344CB8AC3E}">
+        <p14:creationId xmlns:p14="http://schemas.microsoft.com/office/powerpoint/2010/main" val="2607150881"/>
       </p:ext>
     </p:extLst>
   </p:cSld>

</xml_diff>

<commit_message>
20210831 1623 tlw8748253: EOD updates.
</commit_message>
<xml_diff>
--- a/docs/AMT.pptx
+++ b/docs/AMT.pptx
@@ -139,7 +139,7 @@
           <p:cNvPr id="2" name="Title 1">
             <a:extLst>
               <a:ext uri="{FF2B5EF4-FFF2-40B4-BE49-F238E27FC236}">
-                <a16:creationId xmlns:a16="http://schemas.microsoft.com/office/drawing/2014/main" id="{67106D7E-D400-44F1-9A1A-D68CE501C73D}"/>
+                <a16:creationId xmlns:a16="http://schemas.microsoft.com/office/drawing/2014/main" xmlns="" id="{67106D7E-D400-44F1-9A1A-D68CE501C73D}"/>
               </a:ext>
             </a:extLst>
           </p:cNvPr>
@@ -176,7 +176,7 @@
           <p:cNvPr id="3" name="Subtitle 2">
             <a:extLst>
               <a:ext uri="{FF2B5EF4-FFF2-40B4-BE49-F238E27FC236}">
-                <a16:creationId xmlns:a16="http://schemas.microsoft.com/office/drawing/2014/main" id="{A5FDE527-E621-4639-A0C7-E1E9B0DFBCEC}"/>
+                <a16:creationId xmlns:a16="http://schemas.microsoft.com/office/drawing/2014/main" xmlns="" id="{A5FDE527-E621-4639-A0C7-E1E9B0DFBCEC}"/>
               </a:ext>
             </a:extLst>
           </p:cNvPr>
@@ -246,7 +246,7 @@
           <p:cNvPr id="4" name="Date Placeholder 3">
             <a:extLst>
               <a:ext uri="{FF2B5EF4-FFF2-40B4-BE49-F238E27FC236}">
-                <a16:creationId xmlns:a16="http://schemas.microsoft.com/office/drawing/2014/main" id="{E109CE88-B989-4109-89C8-36F7C245DB1C}"/>
+                <a16:creationId xmlns:a16="http://schemas.microsoft.com/office/drawing/2014/main" xmlns="" id="{E109CE88-B989-4109-89C8-36F7C245DB1C}"/>
               </a:ext>
             </a:extLst>
           </p:cNvPr>
@@ -264,7 +264,7 @@
           <a:p>
             <a:fld id="{6C733091-19F0-4DD7-90FE-000B4789B4CF}" type="datetimeFigureOut">
               <a:rPr lang="en-US" smtClean="0"/>
-              <a:t>8/30/2021</a:t>
+              <a:t>8/31/2021</a:t>
             </a:fld>
             <a:endParaRPr lang="en-US"/>
           </a:p>
@@ -275,7 +275,7 @@
           <p:cNvPr id="5" name="Footer Placeholder 4">
             <a:extLst>
               <a:ext uri="{FF2B5EF4-FFF2-40B4-BE49-F238E27FC236}">
-                <a16:creationId xmlns:a16="http://schemas.microsoft.com/office/drawing/2014/main" id="{0841498F-B991-43D3-B408-CC35D8EFCF37}"/>
+                <a16:creationId xmlns:a16="http://schemas.microsoft.com/office/drawing/2014/main" xmlns="" id="{0841498F-B991-43D3-B408-CC35D8EFCF37}"/>
               </a:ext>
             </a:extLst>
           </p:cNvPr>
@@ -300,7 +300,7 @@
           <p:cNvPr id="6" name="Slide Number Placeholder 5">
             <a:extLst>
               <a:ext uri="{FF2B5EF4-FFF2-40B4-BE49-F238E27FC236}">
-                <a16:creationId xmlns:a16="http://schemas.microsoft.com/office/drawing/2014/main" id="{01754CB8-17B1-45A0-AE7D-755EAA1B69D8}"/>
+                <a16:creationId xmlns:a16="http://schemas.microsoft.com/office/drawing/2014/main" xmlns="" id="{01754CB8-17B1-45A0-AE7D-755EAA1B69D8}"/>
               </a:ext>
             </a:extLst>
           </p:cNvPr>
@@ -359,7 +359,7 @@
           <p:cNvPr id="2" name="Title 1">
             <a:extLst>
               <a:ext uri="{FF2B5EF4-FFF2-40B4-BE49-F238E27FC236}">
-                <a16:creationId xmlns:a16="http://schemas.microsoft.com/office/drawing/2014/main" id="{E7A7B055-5DC2-440D-83C1-CAAE8E9A8E14}"/>
+                <a16:creationId xmlns:a16="http://schemas.microsoft.com/office/drawing/2014/main" xmlns="" id="{E7A7B055-5DC2-440D-83C1-CAAE8E9A8E14}"/>
               </a:ext>
             </a:extLst>
           </p:cNvPr>
@@ -387,7 +387,7 @@
           <p:cNvPr id="3" name="Vertical Text Placeholder 2">
             <a:extLst>
               <a:ext uri="{FF2B5EF4-FFF2-40B4-BE49-F238E27FC236}">
-                <a16:creationId xmlns:a16="http://schemas.microsoft.com/office/drawing/2014/main" id="{65710707-423D-4F9D-A49D-6C764C562553}"/>
+                <a16:creationId xmlns:a16="http://schemas.microsoft.com/office/drawing/2014/main" xmlns="" id="{65710707-423D-4F9D-A49D-6C764C562553}"/>
               </a:ext>
             </a:extLst>
           </p:cNvPr>
@@ -444,7 +444,7 @@
           <p:cNvPr id="4" name="Date Placeholder 3">
             <a:extLst>
               <a:ext uri="{FF2B5EF4-FFF2-40B4-BE49-F238E27FC236}">
-                <a16:creationId xmlns:a16="http://schemas.microsoft.com/office/drawing/2014/main" id="{98B6F7EF-D1BE-4437-85F3-99626E37E4EF}"/>
+                <a16:creationId xmlns:a16="http://schemas.microsoft.com/office/drawing/2014/main" xmlns="" id="{98B6F7EF-D1BE-4437-85F3-99626E37E4EF}"/>
               </a:ext>
             </a:extLst>
           </p:cNvPr>
@@ -462,7 +462,7 @@
           <a:p>
             <a:fld id="{6C733091-19F0-4DD7-90FE-000B4789B4CF}" type="datetimeFigureOut">
               <a:rPr lang="en-US" smtClean="0"/>
-              <a:t>8/30/2021</a:t>
+              <a:t>8/31/2021</a:t>
             </a:fld>
             <a:endParaRPr lang="en-US"/>
           </a:p>
@@ -473,7 +473,7 @@
           <p:cNvPr id="5" name="Footer Placeholder 4">
             <a:extLst>
               <a:ext uri="{FF2B5EF4-FFF2-40B4-BE49-F238E27FC236}">
-                <a16:creationId xmlns:a16="http://schemas.microsoft.com/office/drawing/2014/main" id="{D890AA9B-E479-4209-B245-83608F3D4013}"/>
+                <a16:creationId xmlns:a16="http://schemas.microsoft.com/office/drawing/2014/main" xmlns="" id="{D890AA9B-E479-4209-B245-83608F3D4013}"/>
               </a:ext>
             </a:extLst>
           </p:cNvPr>
@@ -498,7 +498,7 @@
           <p:cNvPr id="6" name="Slide Number Placeholder 5">
             <a:extLst>
               <a:ext uri="{FF2B5EF4-FFF2-40B4-BE49-F238E27FC236}">
-                <a16:creationId xmlns:a16="http://schemas.microsoft.com/office/drawing/2014/main" id="{0E4976E4-E15A-4296-A430-633D2BB9142B}"/>
+                <a16:creationId xmlns:a16="http://schemas.microsoft.com/office/drawing/2014/main" xmlns="" id="{0E4976E4-E15A-4296-A430-633D2BB9142B}"/>
               </a:ext>
             </a:extLst>
           </p:cNvPr>
@@ -557,7 +557,7 @@
           <p:cNvPr id="2" name="Vertical Title 1">
             <a:extLst>
               <a:ext uri="{FF2B5EF4-FFF2-40B4-BE49-F238E27FC236}">
-                <a16:creationId xmlns:a16="http://schemas.microsoft.com/office/drawing/2014/main" id="{66F63CF5-8DEE-4BB2-A2A5-5C16FEBE1AD5}"/>
+                <a16:creationId xmlns:a16="http://schemas.microsoft.com/office/drawing/2014/main" xmlns="" id="{66F63CF5-8DEE-4BB2-A2A5-5C16FEBE1AD5}"/>
               </a:ext>
             </a:extLst>
           </p:cNvPr>
@@ -590,7 +590,7 @@
           <p:cNvPr id="3" name="Vertical Text Placeholder 2">
             <a:extLst>
               <a:ext uri="{FF2B5EF4-FFF2-40B4-BE49-F238E27FC236}">
-                <a16:creationId xmlns:a16="http://schemas.microsoft.com/office/drawing/2014/main" id="{E0D5EBA5-94AF-4373-B032-A40FF73C7575}"/>
+                <a16:creationId xmlns:a16="http://schemas.microsoft.com/office/drawing/2014/main" xmlns="" id="{E0D5EBA5-94AF-4373-B032-A40FF73C7575}"/>
               </a:ext>
             </a:extLst>
           </p:cNvPr>
@@ -652,7 +652,7 @@
           <p:cNvPr id="4" name="Date Placeholder 3">
             <a:extLst>
               <a:ext uri="{FF2B5EF4-FFF2-40B4-BE49-F238E27FC236}">
-                <a16:creationId xmlns:a16="http://schemas.microsoft.com/office/drawing/2014/main" id="{7426B8E1-6758-4F5E-B618-96641332600B}"/>
+                <a16:creationId xmlns:a16="http://schemas.microsoft.com/office/drawing/2014/main" xmlns="" id="{7426B8E1-6758-4F5E-B618-96641332600B}"/>
               </a:ext>
             </a:extLst>
           </p:cNvPr>
@@ -670,7 +670,7 @@
           <a:p>
             <a:fld id="{6C733091-19F0-4DD7-90FE-000B4789B4CF}" type="datetimeFigureOut">
               <a:rPr lang="en-US" smtClean="0"/>
-              <a:t>8/30/2021</a:t>
+              <a:t>8/31/2021</a:t>
             </a:fld>
             <a:endParaRPr lang="en-US"/>
           </a:p>
@@ -681,7 +681,7 @@
           <p:cNvPr id="5" name="Footer Placeholder 4">
             <a:extLst>
               <a:ext uri="{FF2B5EF4-FFF2-40B4-BE49-F238E27FC236}">
-                <a16:creationId xmlns:a16="http://schemas.microsoft.com/office/drawing/2014/main" id="{F65E330E-2A7E-482D-AE0F-70EA5A29958B}"/>
+                <a16:creationId xmlns:a16="http://schemas.microsoft.com/office/drawing/2014/main" xmlns="" id="{F65E330E-2A7E-482D-AE0F-70EA5A29958B}"/>
               </a:ext>
             </a:extLst>
           </p:cNvPr>
@@ -706,7 +706,7 @@
           <p:cNvPr id="6" name="Slide Number Placeholder 5">
             <a:extLst>
               <a:ext uri="{FF2B5EF4-FFF2-40B4-BE49-F238E27FC236}">
-                <a16:creationId xmlns:a16="http://schemas.microsoft.com/office/drawing/2014/main" id="{B8000005-FC38-4A6C-9D09-7945EFA08160}"/>
+                <a16:creationId xmlns:a16="http://schemas.microsoft.com/office/drawing/2014/main" xmlns="" id="{B8000005-FC38-4A6C-9D09-7945EFA08160}"/>
               </a:ext>
             </a:extLst>
           </p:cNvPr>
@@ -765,7 +765,7 @@
           <p:cNvPr id="2" name="Title 1">
             <a:extLst>
               <a:ext uri="{FF2B5EF4-FFF2-40B4-BE49-F238E27FC236}">
-                <a16:creationId xmlns:a16="http://schemas.microsoft.com/office/drawing/2014/main" id="{91D0002C-766B-44B4-A24C-BE6DE6C7BA4C}"/>
+                <a16:creationId xmlns:a16="http://schemas.microsoft.com/office/drawing/2014/main" xmlns="" id="{91D0002C-766B-44B4-A24C-BE6DE6C7BA4C}"/>
               </a:ext>
             </a:extLst>
           </p:cNvPr>
@@ -793,7 +793,7 @@
           <p:cNvPr id="3" name="Content Placeholder 2">
             <a:extLst>
               <a:ext uri="{FF2B5EF4-FFF2-40B4-BE49-F238E27FC236}">
-                <a16:creationId xmlns:a16="http://schemas.microsoft.com/office/drawing/2014/main" id="{3455BAA9-6C7B-4874-AD76-BD466F64802D}"/>
+                <a16:creationId xmlns:a16="http://schemas.microsoft.com/office/drawing/2014/main" xmlns="" id="{3455BAA9-6C7B-4874-AD76-BD466F64802D}"/>
               </a:ext>
             </a:extLst>
           </p:cNvPr>
@@ -850,7 +850,7 @@
           <p:cNvPr id="4" name="Date Placeholder 3">
             <a:extLst>
               <a:ext uri="{FF2B5EF4-FFF2-40B4-BE49-F238E27FC236}">
-                <a16:creationId xmlns:a16="http://schemas.microsoft.com/office/drawing/2014/main" id="{8776BDAF-D8F2-4A61-904D-094BB4545702}"/>
+                <a16:creationId xmlns:a16="http://schemas.microsoft.com/office/drawing/2014/main" xmlns="" id="{8776BDAF-D8F2-4A61-904D-094BB4545702}"/>
               </a:ext>
             </a:extLst>
           </p:cNvPr>
@@ -868,7 +868,7 @@
           <a:p>
             <a:fld id="{6C733091-19F0-4DD7-90FE-000B4789B4CF}" type="datetimeFigureOut">
               <a:rPr lang="en-US" smtClean="0"/>
-              <a:t>8/30/2021</a:t>
+              <a:t>8/31/2021</a:t>
             </a:fld>
             <a:endParaRPr lang="en-US"/>
           </a:p>
@@ -879,7 +879,7 @@
           <p:cNvPr id="5" name="Footer Placeholder 4">
             <a:extLst>
               <a:ext uri="{FF2B5EF4-FFF2-40B4-BE49-F238E27FC236}">
-                <a16:creationId xmlns:a16="http://schemas.microsoft.com/office/drawing/2014/main" id="{F89C5665-4384-4706-9BD2-9F42B05C96BC}"/>
+                <a16:creationId xmlns:a16="http://schemas.microsoft.com/office/drawing/2014/main" xmlns="" id="{F89C5665-4384-4706-9BD2-9F42B05C96BC}"/>
               </a:ext>
             </a:extLst>
           </p:cNvPr>
@@ -904,7 +904,7 @@
           <p:cNvPr id="6" name="Slide Number Placeholder 5">
             <a:extLst>
               <a:ext uri="{FF2B5EF4-FFF2-40B4-BE49-F238E27FC236}">
-                <a16:creationId xmlns:a16="http://schemas.microsoft.com/office/drawing/2014/main" id="{7DCAD73E-CAB3-4BA7-905E-D203691D0418}"/>
+                <a16:creationId xmlns:a16="http://schemas.microsoft.com/office/drawing/2014/main" xmlns="" id="{7DCAD73E-CAB3-4BA7-905E-D203691D0418}"/>
               </a:ext>
             </a:extLst>
           </p:cNvPr>
@@ -963,7 +963,7 @@
           <p:cNvPr id="2" name="Title 1">
             <a:extLst>
               <a:ext uri="{FF2B5EF4-FFF2-40B4-BE49-F238E27FC236}">
-                <a16:creationId xmlns:a16="http://schemas.microsoft.com/office/drawing/2014/main" id="{A9880706-F7FA-4EC3-A022-9D6C7CEC3692}"/>
+                <a16:creationId xmlns:a16="http://schemas.microsoft.com/office/drawing/2014/main" xmlns="" id="{A9880706-F7FA-4EC3-A022-9D6C7CEC3692}"/>
               </a:ext>
             </a:extLst>
           </p:cNvPr>
@@ -1000,7 +1000,7 @@
           <p:cNvPr id="3" name="Text Placeholder 2">
             <a:extLst>
               <a:ext uri="{FF2B5EF4-FFF2-40B4-BE49-F238E27FC236}">
-                <a16:creationId xmlns:a16="http://schemas.microsoft.com/office/drawing/2014/main" id="{FA8A65D0-3DF5-448D-82EC-A967682A0DED}"/>
+                <a16:creationId xmlns:a16="http://schemas.microsoft.com/office/drawing/2014/main" xmlns="" id="{FA8A65D0-3DF5-448D-82EC-A967682A0DED}"/>
               </a:ext>
             </a:extLst>
           </p:cNvPr>
@@ -1125,7 +1125,7 @@
           <p:cNvPr id="4" name="Date Placeholder 3">
             <a:extLst>
               <a:ext uri="{FF2B5EF4-FFF2-40B4-BE49-F238E27FC236}">
-                <a16:creationId xmlns:a16="http://schemas.microsoft.com/office/drawing/2014/main" id="{600EA68C-01A6-487D-9D6E-1D1B4EAC0440}"/>
+                <a16:creationId xmlns:a16="http://schemas.microsoft.com/office/drawing/2014/main" xmlns="" id="{600EA68C-01A6-487D-9D6E-1D1B4EAC0440}"/>
               </a:ext>
             </a:extLst>
           </p:cNvPr>
@@ -1143,7 +1143,7 @@
           <a:p>
             <a:fld id="{6C733091-19F0-4DD7-90FE-000B4789B4CF}" type="datetimeFigureOut">
               <a:rPr lang="en-US" smtClean="0"/>
-              <a:t>8/30/2021</a:t>
+              <a:t>8/31/2021</a:t>
             </a:fld>
             <a:endParaRPr lang="en-US"/>
           </a:p>
@@ -1154,7 +1154,7 @@
           <p:cNvPr id="5" name="Footer Placeholder 4">
             <a:extLst>
               <a:ext uri="{FF2B5EF4-FFF2-40B4-BE49-F238E27FC236}">
-                <a16:creationId xmlns:a16="http://schemas.microsoft.com/office/drawing/2014/main" id="{6E6527CB-4FFD-4569-A82C-5EDC311B2CF6}"/>
+                <a16:creationId xmlns:a16="http://schemas.microsoft.com/office/drawing/2014/main" xmlns="" id="{6E6527CB-4FFD-4569-A82C-5EDC311B2CF6}"/>
               </a:ext>
             </a:extLst>
           </p:cNvPr>
@@ -1179,7 +1179,7 @@
           <p:cNvPr id="6" name="Slide Number Placeholder 5">
             <a:extLst>
               <a:ext uri="{FF2B5EF4-FFF2-40B4-BE49-F238E27FC236}">
-                <a16:creationId xmlns:a16="http://schemas.microsoft.com/office/drawing/2014/main" id="{24B19E5B-5A98-4381-A01D-01F81FD65792}"/>
+                <a16:creationId xmlns:a16="http://schemas.microsoft.com/office/drawing/2014/main" xmlns="" id="{24B19E5B-5A98-4381-A01D-01F81FD65792}"/>
               </a:ext>
             </a:extLst>
           </p:cNvPr>
@@ -1238,7 +1238,7 @@
           <p:cNvPr id="2" name="Title 1">
             <a:extLst>
               <a:ext uri="{FF2B5EF4-FFF2-40B4-BE49-F238E27FC236}">
-                <a16:creationId xmlns:a16="http://schemas.microsoft.com/office/drawing/2014/main" id="{63228B71-E923-4431-B8D2-FAE724678940}"/>
+                <a16:creationId xmlns:a16="http://schemas.microsoft.com/office/drawing/2014/main" xmlns="" id="{63228B71-E923-4431-B8D2-FAE724678940}"/>
               </a:ext>
             </a:extLst>
           </p:cNvPr>
@@ -1266,7 +1266,7 @@
           <p:cNvPr id="3" name="Content Placeholder 2">
             <a:extLst>
               <a:ext uri="{FF2B5EF4-FFF2-40B4-BE49-F238E27FC236}">
-                <a16:creationId xmlns:a16="http://schemas.microsoft.com/office/drawing/2014/main" id="{B18895E9-B7FF-4A00-955B-206CF8C73E43}"/>
+                <a16:creationId xmlns:a16="http://schemas.microsoft.com/office/drawing/2014/main" xmlns="" id="{B18895E9-B7FF-4A00-955B-206CF8C73E43}"/>
               </a:ext>
             </a:extLst>
           </p:cNvPr>
@@ -1328,7 +1328,7 @@
           <p:cNvPr id="4" name="Content Placeholder 3">
             <a:extLst>
               <a:ext uri="{FF2B5EF4-FFF2-40B4-BE49-F238E27FC236}">
-                <a16:creationId xmlns:a16="http://schemas.microsoft.com/office/drawing/2014/main" id="{DA813955-E3B9-44BC-8E1D-139269C8B48A}"/>
+                <a16:creationId xmlns:a16="http://schemas.microsoft.com/office/drawing/2014/main" xmlns="" id="{DA813955-E3B9-44BC-8E1D-139269C8B48A}"/>
               </a:ext>
             </a:extLst>
           </p:cNvPr>
@@ -1390,7 +1390,7 @@
           <p:cNvPr id="5" name="Date Placeholder 4">
             <a:extLst>
               <a:ext uri="{FF2B5EF4-FFF2-40B4-BE49-F238E27FC236}">
-                <a16:creationId xmlns:a16="http://schemas.microsoft.com/office/drawing/2014/main" id="{7E9B8EF5-28D5-4C4E-A2AB-EEA30D75DAFE}"/>
+                <a16:creationId xmlns:a16="http://schemas.microsoft.com/office/drawing/2014/main" xmlns="" id="{7E9B8EF5-28D5-4C4E-A2AB-EEA30D75DAFE}"/>
               </a:ext>
             </a:extLst>
           </p:cNvPr>
@@ -1408,7 +1408,7 @@
           <a:p>
             <a:fld id="{6C733091-19F0-4DD7-90FE-000B4789B4CF}" type="datetimeFigureOut">
               <a:rPr lang="en-US" smtClean="0"/>
-              <a:t>8/30/2021</a:t>
+              <a:t>8/31/2021</a:t>
             </a:fld>
             <a:endParaRPr lang="en-US"/>
           </a:p>
@@ -1419,7 +1419,7 @@
           <p:cNvPr id="6" name="Footer Placeholder 5">
             <a:extLst>
               <a:ext uri="{FF2B5EF4-FFF2-40B4-BE49-F238E27FC236}">
-                <a16:creationId xmlns:a16="http://schemas.microsoft.com/office/drawing/2014/main" id="{5723E678-8CB4-4335-AA04-6BD391748717}"/>
+                <a16:creationId xmlns:a16="http://schemas.microsoft.com/office/drawing/2014/main" xmlns="" id="{5723E678-8CB4-4335-AA04-6BD391748717}"/>
               </a:ext>
             </a:extLst>
           </p:cNvPr>
@@ -1444,7 +1444,7 @@
           <p:cNvPr id="7" name="Slide Number Placeholder 6">
             <a:extLst>
               <a:ext uri="{FF2B5EF4-FFF2-40B4-BE49-F238E27FC236}">
-                <a16:creationId xmlns:a16="http://schemas.microsoft.com/office/drawing/2014/main" id="{887B5567-9F4D-4AE1-92D8-769C9F7EA4F0}"/>
+                <a16:creationId xmlns:a16="http://schemas.microsoft.com/office/drawing/2014/main" xmlns="" id="{887B5567-9F4D-4AE1-92D8-769C9F7EA4F0}"/>
               </a:ext>
             </a:extLst>
           </p:cNvPr>
@@ -1503,7 +1503,7 @@
           <p:cNvPr id="2" name="Title 1">
             <a:extLst>
               <a:ext uri="{FF2B5EF4-FFF2-40B4-BE49-F238E27FC236}">
-                <a16:creationId xmlns:a16="http://schemas.microsoft.com/office/drawing/2014/main" id="{A40320A9-7C0C-45B4-BF2B-3B53B5686EBB}"/>
+                <a16:creationId xmlns:a16="http://schemas.microsoft.com/office/drawing/2014/main" xmlns="" id="{A40320A9-7C0C-45B4-BF2B-3B53B5686EBB}"/>
               </a:ext>
             </a:extLst>
           </p:cNvPr>
@@ -1536,7 +1536,7 @@
           <p:cNvPr id="3" name="Text Placeholder 2">
             <a:extLst>
               <a:ext uri="{FF2B5EF4-FFF2-40B4-BE49-F238E27FC236}">
-                <a16:creationId xmlns:a16="http://schemas.microsoft.com/office/drawing/2014/main" id="{8C440DE1-7DD6-4B1C-B961-CD2079B51F03}"/>
+                <a16:creationId xmlns:a16="http://schemas.microsoft.com/office/drawing/2014/main" xmlns="" id="{8C440DE1-7DD6-4B1C-B961-CD2079B51F03}"/>
               </a:ext>
             </a:extLst>
           </p:cNvPr>
@@ -1607,7 +1607,7 @@
           <p:cNvPr id="4" name="Content Placeholder 3">
             <a:extLst>
               <a:ext uri="{FF2B5EF4-FFF2-40B4-BE49-F238E27FC236}">
-                <a16:creationId xmlns:a16="http://schemas.microsoft.com/office/drawing/2014/main" id="{6FAFE840-CC9A-4D89-B05F-159EF756B427}"/>
+                <a16:creationId xmlns:a16="http://schemas.microsoft.com/office/drawing/2014/main" xmlns="" id="{6FAFE840-CC9A-4D89-B05F-159EF756B427}"/>
               </a:ext>
             </a:extLst>
           </p:cNvPr>
@@ -1669,7 +1669,7 @@
           <p:cNvPr id="5" name="Text Placeholder 4">
             <a:extLst>
               <a:ext uri="{FF2B5EF4-FFF2-40B4-BE49-F238E27FC236}">
-                <a16:creationId xmlns:a16="http://schemas.microsoft.com/office/drawing/2014/main" id="{4B87AADC-3401-48C6-98F6-0AB60F6DF9BE}"/>
+                <a16:creationId xmlns:a16="http://schemas.microsoft.com/office/drawing/2014/main" xmlns="" id="{4B87AADC-3401-48C6-98F6-0AB60F6DF9BE}"/>
               </a:ext>
             </a:extLst>
           </p:cNvPr>
@@ -1740,7 +1740,7 @@
           <p:cNvPr id="6" name="Content Placeholder 5">
             <a:extLst>
               <a:ext uri="{FF2B5EF4-FFF2-40B4-BE49-F238E27FC236}">
-                <a16:creationId xmlns:a16="http://schemas.microsoft.com/office/drawing/2014/main" id="{34BCF1A4-FB52-4DCD-80BC-324BA41C33CD}"/>
+                <a16:creationId xmlns:a16="http://schemas.microsoft.com/office/drawing/2014/main" xmlns="" id="{34BCF1A4-FB52-4DCD-80BC-324BA41C33CD}"/>
               </a:ext>
             </a:extLst>
           </p:cNvPr>
@@ -1802,7 +1802,7 @@
           <p:cNvPr id="7" name="Date Placeholder 6">
             <a:extLst>
               <a:ext uri="{FF2B5EF4-FFF2-40B4-BE49-F238E27FC236}">
-                <a16:creationId xmlns:a16="http://schemas.microsoft.com/office/drawing/2014/main" id="{8CFD4208-60E7-48B1-8CD0-717D5E26B827}"/>
+                <a16:creationId xmlns:a16="http://schemas.microsoft.com/office/drawing/2014/main" xmlns="" id="{8CFD4208-60E7-48B1-8CD0-717D5E26B827}"/>
               </a:ext>
             </a:extLst>
           </p:cNvPr>
@@ -1820,7 +1820,7 @@
           <a:p>
             <a:fld id="{6C733091-19F0-4DD7-90FE-000B4789B4CF}" type="datetimeFigureOut">
               <a:rPr lang="en-US" smtClean="0"/>
-              <a:t>8/30/2021</a:t>
+              <a:t>8/31/2021</a:t>
             </a:fld>
             <a:endParaRPr lang="en-US"/>
           </a:p>
@@ -1831,7 +1831,7 @@
           <p:cNvPr id="8" name="Footer Placeholder 7">
             <a:extLst>
               <a:ext uri="{FF2B5EF4-FFF2-40B4-BE49-F238E27FC236}">
-                <a16:creationId xmlns:a16="http://schemas.microsoft.com/office/drawing/2014/main" id="{94E429D1-BEB1-4D8A-91F2-CD4F80157F8D}"/>
+                <a16:creationId xmlns:a16="http://schemas.microsoft.com/office/drawing/2014/main" xmlns="" id="{94E429D1-BEB1-4D8A-91F2-CD4F80157F8D}"/>
               </a:ext>
             </a:extLst>
           </p:cNvPr>
@@ -1856,7 +1856,7 @@
           <p:cNvPr id="9" name="Slide Number Placeholder 8">
             <a:extLst>
               <a:ext uri="{FF2B5EF4-FFF2-40B4-BE49-F238E27FC236}">
-                <a16:creationId xmlns:a16="http://schemas.microsoft.com/office/drawing/2014/main" id="{6F17C19C-8370-4118-A8FC-5DDA6F84230F}"/>
+                <a16:creationId xmlns:a16="http://schemas.microsoft.com/office/drawing/2014/main" xmlns="" id="{6F17C19C-8370-4118-A8FC-5DDA6F84230F}"/>
               </a:ext>
             </a:extLst>
           </p:cNvPr>
@@ -1915,7 +1915,7 @@
           <p:cNvPr id="2" name="Title 1">
             <a:extLst>
               <a:ext uri="{FF2B5EF4-FFF2-40B4-BE49-F238E27FC236}">
-                <a16:creationId xmlns:a16="http://schemas.microsoft.com/office/drawing/2014/main" id="{252CBF36-7F99-45A9-BC35-BD2EC260CBF0}"/>
+                <a16:creationId xmlns:a16="http://schemas.microsoft.com/office/drawing/2014/main" xmlns="" id="{252CBF36-7F99-45A9-BC35-BD2EC260CBF0}"/>
               </a:ext>
             </a:extLst>
           </p:cNvPr>
@@ -1943,7 +1943,7 @@
           <p:cNvPr id="3" name="Date Placeholder 2">
             <a:extLst>
               <a:ext uri="{FF2B5EF4-FFF2-40B4-BE49-F238E27FC236}">
-                <a16:creationId xmlns:a16="http://schemas.microsoft.com/office/drawing/2014/main" id="{0D6F5F83-F07E-4501-B86B-9F96CD43993C}"/>
+                <a16:creationId xmlns:a16="http://schemas.microsoft.com/office/drawing/2014/main" xmlns="" id="{0D6F5F83-F07E-4501-B86B-9F96CD43993C}"/>
               </a:ext>
             </a:extLst>
           </p:cNvPr>
@@ -1961,7 +1961,7 @@
           <a:p>
             <a:fld id="{6C733091-19F0-4DD7-90FE-000B4789B4CF}" type="datetimeFigureOut">
               <a:rPr lang="en-US" smtClean="0"/>
-              <a:t>8/30/2021</a:t>
+              <a:t>8/31/2021</a:t>
             </a:fld>
             <a:endParaRPr lang="en-US"/>
           </a:p>
@@ -1972,7 +1972,7 @@
           <p:cNvPr id="4" name="Footer Placeholder 3">
             <a:extLst>
               <a:ext uri="{FF2B5EF4-FFF2-40B4-BE49-F238E27FC236}">
-                <a16:creationId xmlns:a16="http://schemas.microsoft.com/office/drawing/2014/main" id="{2861989B-F8E9-41FD-8E16-687424BCC266}"/>
+                <a16:creationId xmlns:a16="http://schemas.microsoft.com/office/drawing/2014/main" xmlns="" id="{2861989B-F8E9-41FD-8E16-687424BCC266}"/>
               </a:ext>
             </a:extLst>
           </p:cNvPr>
@@ -1997,7 +1997,7 @@
           <p:cNvPr id="5" name="Slide Number Placeholder 4">
             <a:extLst>
               <a:ext uri="{FF2B5EF4-FFF2-40B4-BE49-F238E27FC236}">
-                <a16:creationId xmlns:a16="http://schemas.microsoft.com/office/drawing/2014/main" id="{2026B6D7-7832-4815-95CE-5CEC39502825}"/>
+                <a16:creationId xmlns:a16="http://schemas.microsoft.com/office/drawing/2014/main" xmlns="" id="{2026B6D7-7832-4815-95CE-5CEC39502825}"/>
               </a:ext>
             </a:extLst>
           </p:cNvPr>
@@ -2056,7 +2056,7 @@
           <p:cNvPr id="2" name="Date Placeholder 1">
             <a:extLst>
               <a:ext uri="{FF2B5EF4-FFF2-40B4-BE49-F238E27FC236}">
-                <a16:creationId xmlns:a16="http://schemas.microsoft.com/office/drawing/2014/main" id="{9877919A-C4B6-46FD-A08A-9A4B867FE01A}"/>
+                <a16:creationId xmlns:a16="http://schemas.microsoft.com/office/drawing/2014/main" xmlns="" id="{9877919A-C4B6-46FD-A08A-9A4B867FE01A}"/>
               </a:ext>
             </a:extLst>
           </p:cNvPr>
@@ -2074,7 +2074,7 @@
           <a:p>
             <a:fld id="{6C733091-19F0-4DD7-90FE-000B4789B4CF}" type="datetimeFigureOut">
               <a:rPr lang="en-US" smtClean="0"/>
-              <a:t>8/30/2021</a:t>
+              <a:t>8/31/2021</a:t>
             </a:fld>
             <a:endParaRPr lang="en-US"/>
           </a:p>
@@ -2085,7 +2085,7 @@
           <p:cNvPr id="3" name="Footer Placeholder 2">
             <a:extLst>
               <a:ext uri="{FF2B5EF4-FFF2-40B4-BE49-F238E27FC236}">
-                <a16:creationId xmlns:a16="http://schemas.microsoft.com/office/drawing/2014/main" id="{9118539E-383C-4F1C-86F2-14C533A7E9FB}"/>
+                <a16:creationId xmlns:a16="http://schemas.microsoft.com/office/drawing/2014/main" xmlns="" id="{9118539E-383C-4F1C-86F2-14C533A7E9FB}"/>
               </a:ext>
             </a:extLst>
           </p:cNvPr>
@@ -2110,7 +2110,7 @@
           <p:cNvPr id="4" name="Slide Number Placeholder 3">
             <a:extLst>
               <a:ext uri="{FF2B5EF4-FFF2-40B4-BE49-F238E27FC236}">
-                <a16:creationId xmlns:a16="http://schemas.microsoft.com/office/drawing/2014/main" id="{C9A6D4E1-CA83-4214-9942-9E4617AA89BF}"/>
+                <a16:creationId xmlns:a16="http://schemas.microsoft.com/office/drawing/2014/main" xmlns="" id="{C9A6D4E1-CA83-4214-9942-9E4617AA89BF}"/>
               </a:ext>
             </a:extLst>
           </p:cNvPr>
@@ -2169,7 +2169,7 @@
           <p:cNvPr id="2" name="Title 1">
             <a:extLst>
               <a:ext uri="{FF2B5EF4-FFF2-40B4-BE49-F238E27FC236}">
-                <a16:creationId xmlns:a16="http://schemas.microsoft.com/office/drawing/2014/main" id="{046EF9B5-7A2A-4225-8817-86D028D6950C}"/>
+                <a16:creationId xmlns:a16="http://schemas.microsoft.com/office/drawing/2014/main" xmlns="" id="{046EF9B5-7A2A-4225-8817-86D028D6950C}"/>
               </a:ext>
             </a:extLst>
           </p:cNvPr>
@@ -2206,7 +2206,7 @@
           <p:cNvPr id="3" name="Content Placeholder 2">
             <a:extLst>
               <a:ext uri="{FF2B5EF4-FFF2-40B4-BE49-F238E27FC236}">
-                <a16:creationId xmlns:a16="http://schemas.microsoft.com/office/drawing/2014/main" id="{8667C390-5297-41E8-A403-22856007B051}"/>
+                <a16:creationId xmlns:a16="http://schemas.microsoft.com/office/drawing/2014/main" xmlns="" id="{8667C390-5297-41E8-A403-22856007B051}"/>
               </a:ext>
             </a:extLst>
           </p:cNvPr>
@@ -2296,7 +2296,7 @@
           <p:cNvPr id="4" name="Text Placeholder 3">
             <a:extLst>
               <a:ext uri="{FF2B5EF4-FFF2-40B4-BE49-F238E27FC236}">
-                <a16:creationId xmlns:a16="http://schemas.microsoft.com/office/drawing/2014/main" id="{8D0D2F7D-D6CD-4AB1-A3EA-CBFD2A2B3703}"/>
+                <a16:creationId xmlns:a16="http://schemas.microsoft.com/office/drawing/2014/main" xmlns="" id="{8D0D2F7D-D6CD-4AB1-A3EA-CBFD2A2B3703}"/>
               </a:ext>
             </a:extLst>
           </p:cNvPr>
@@ -2367,7 +2367,7 @@
           <p:cNvPr id="5" name="Date Placeholder 4">
             <a:extLst>
               <a:ext uri="{FF2B5EF4-FFF2-40B4-BE49-F238E27FC236}">
-                <a16:creationId xmlns:a16="http://schemas.microsoft.com/office/drawing/2014/main" id="{E17A441D-4FA7-4110-BF24-165CD3C3DAD7}"/>
+                <a16:creationId xmlns:a16="http://schemas.microsoft.com/office/drawing/2014/main" xmlns="" id="{E17A441D-4FA7-4110-BF24-165CD3C3DAD7}"/>
               </a:ext>
             </a:extLst>
           </p:cNvPr>
@@ -2385,7 +2385,7 @@
           <a:p>
             <a:fld id="{6C733091-19F0-4DD7-90FE-000B4789B4CF}" type="datetimeFigureOut">
               <a:rPr lang="en-US" smtClean="0"/>
-              <a:t>8/30/2021</a:t>
+              <a:t>8/31/2021</a:t>
             </a:fld>
             <a:endParaRPr lang="en-US"/>
           </a:p>
@@ -2396,7 +2396,7 @@
           <p:cNvPr id="6" name="Footer Placeholder 5">
             <a:extLst>
               <a:ext uri="{FF2B5EF4-FFF2-40B4-BE49-F238E27FC236}">
-                <a16:creationId xmlns:a16="http://schemas.microsoft.com/office/drawing/2014/main" id="{346102C5-5AE3-43CF-A686-1AB72B0790AB}"/>
+                <a16:creationId xmlns:a16="http://schemas.microsoft.com/office/drawing/2014/main" xmlns="" id="{346102C5-5AE3-43CF-A686-1AB72B0790AB}"/>
               </a:ext>
             </a:extLst>
           </p:cNvPr>
@@ -2421,7 +2421,7 @@
           <p:cNvPr id="7" name="Slide Number Placeholder 6">
             <a:extLst>
               <a:ext uri="{FF2B5EF4-FFF2-40B4-BE49-F238E27FC236}">
-                <a16:creationId xmlns:a16="http://schemas.microsoft.com/office/drawing/2014/main" id="{5528B3F7-462C-4500-8836-B3E5CD8DA61A}"/>
+                <a16:creationId xmlns:a16="http://schemas.microsoft.com/office/drawing/2014/main" xmlns="" id="{5528B3F7-462C-4500-8836-B3E5CD8DA61A}"/>
               </a:ext>
             </a:extLst>
           </p:cNvPr>
@@ -2480,7 +2480,7 @@
           <p:cNvPr id="2" name="Title 1">
             <a:extLst>
               <a:ext uri="{FF2B5EF4-FFF2-40B4-BE49-F238E27FC236}">
-                <a16:creationId xmlns:a16="http://schemas.microsoft.com/office/drawing/2014/main" id="{4BA10E59-DA48-4690-A956-9EB8E4E11EE5}"/>
+                <a16:creationId xmlns:a16="http://schemas.microsoft.com/office/drawing/2014/main" xmlns="" id="{4BA10E59-DA48-4690-A956-9EB8E4E11EE5}"/>
               </a:ext>
             </a:extLst>
           </p:cNvPr>
@@ -2517,7 +2517,7 @@
           <p:cNvPr id="3" name="Picture Placeholder 2">
             <a:extLst>
               <a:ext uri="{FF2B5EF4-FFF2-40B4-BE49-F238E27FC236}">
-                <a16:creationId xmlns:a16="http://schemas.microsoft.com/office/drawing/2014/main" id="{AC7AFE1E-67D1-4106-97CA-98302D42CC4D}"/>
+                <a16:creationId xmlns:a16="http://schemas.microsoft.com/office/drawing/2014/main" xmlns="" id="{AC7AFE1E-67D1-4106-97CA-98302D42CC4D}"/>
               </a:ext>
             </a:extLst>
           </p:cNvPr>
@@ -2584,7 +2584,7 @@
           <p:cNvPr id="4" name="Text Placeholder 3">
             <a:extLst>
               <a:ext uri="{FF2B5EF4-FFF2-40B4-BE49-F238E27FC236}">
-                <a16:creationId xmlns:a16="http://schemas.microsoft.com/office/drawing/2014/main" id="{67D8D73B-3D4D-42A7-9A3C-1D508E8A9B45}"/>
+                <a16:creationId xmlns:a16="http://schemas.microsoft.com/office/drawing/2014/main" xmlns="" id="{67D8D73B-3D4D-42A7-9A3C-1D508E8A9B45}"/>
               </a:ext>
             </a:extLst>
           </p:cNvPr>
@@ -2655,7 +2655,7 @@
           <p:cNvPr id="5" name="Date Placeholder 4">
             <a:extLst>
               <a:ext uri="{FF2B5EF4-FFF2-40B4-BE49-F238E27FC236}">
-                <a16:creationId xmlns:a16="http://schemas.microsoft.com/office/drawing/2014/main" id="{48C8945E-A47A-42A2-9DF6-CA6D5002F65F}"/>
+                <a16:creationId xmlns:a16="http://schemas.microsoft.com/office/drawing/2014/main" xmlns="" id="{48C8945E-A47A-42A2-9DF6-CA6D5002F65F}"/>
               </a:ext>
             </a:extLst>
           </p:cNvPr>
@@ -2673,7 +2673,7 @@
           <a:p>
             <a:fld id="{6C733091-19F0-4DD7-90FE-000B4789B4CF}" type="datetimeFigureOut">
               <a:rPr lang="en-US" smtClean="0"/>
-              <a:t>8/30/2021</a:t>
+              <a:t>8/31/2021</a:t>
             </a:fld>
             <a:endParaRPr lang="en-US"/>
           </a:p>
@@ -2684,7 +2684,7 @@
           <p:cNvPr id="6" name="Footer Placeholder 5">
             <a:extLst>
               <a:ext uri="{FF2B5EF4-FFF2-40B4-BE49-F238E27FC236}">
-                <a16:creationId xmlns:a16="http://schemas.microsoft.com/office/drawing/2014/main" id="{EB000DB4-2747-4297-B400-42A539FBDB42}"/>
+                <a16:creationId xmlns:a16="http://schemas.microsoft.com/office/drawing/2014/main" xmlns="" id="{EB000DB4-2747-4297-B400-42A539FBDB42}"/>
               </a:ext>
             </a:extLst>
           </p:cNvPr>
@@ -2709,7 +2709,7 @@
           <p:cNvPr id="7" name="Slide Number Placeholder 6">
             <a:extLst>
               <a:ext uri="{FF2B5EF4-FFF2-40B4-BE49-F238E27FC236}">
-                <a16:creationId xmlns:a16="http://schemas.microsoft.com/office/drawing/2014/main" id="{5BAD9222-F141-4803-AF73-E2DD92E2ABBC}"/>
+                <a16:creationId xmlns:a16="http://schemas.microsoft.com/office/drawing/2014/main" xmlns="" id="{5BAD9222-F141-4803-AF73-E2DD92E2ABBC}"/>
               </a:ext>
             </a:extLst>
           </p:cNvPr>
@@ -2773,7 +2773,7 @@
           <p:cNvPr id="2" name="Title Placeholder 1">
             <a:extLst>
               <a:ext uri="{FF2B5EF4-FFF2-40B4-BE49-F238E27FC236}">
-                <a16:creationId xmlns:a16="http://schemas.microsoft.com/office/drawing/2014/main" id="{5BF9D404-795C-4EA4-AD01-26740519239C}"/>
+                <a16:creationId xmlns:a16="http://schemas.microsoft.com/office/drawing/2014/main" xmlns="" id="{5BF9D404-795C-4EA4-AD01-26740519239C}"/>
               </a:ext>
             </a:extLst>
           </p:cNvPr>
@@ -2811,7 +2811,7 @@
           <p:cNvPr id="3" name="Text Placeholder 2">
             <a:extLst>
               <a:ext uri="{FF2B5EF4-FFF2-40B4-BE49-F238E27FC236}">
-                <a16:creationId xmlns:a16="http://schemas.microsoft.com/office/drawing/2014/main" id="{DE3FEC7B-48F8-4348-9BC6-68F83B859EE9}"/>
+                <a16:creationId xmlns:a16="http://schemas.microsoft.com/office/drawing/2014/main" xmlns="" id="{DE3FEC7B-48F8-4348-9BC6-68F83B859EE9}"/>
               </a:ext>
             </a:extLst>
           </p:cNvPr>
@@ -2878,7 +2878,7 @@
           <p:cNvPr id="4" name="Date Placeholder 3">
             <a:extLst>
               <a:ext uri="{FF2B5EF4-FFF2-40B4-BE49-F238E27FC236}">
-                <a16:creationId xmlns:a16="http://schemas.microsoft.com/office/drawing/2014/main" id="{31CA1A1D-E2F5-4161-A025-7B911965C2FE}"/>
+                <a16:creationId xmlns:a16="http://schemas.microsoft.com/office/drawing/2014/main" xmlns="" id="{31CA1A1D-E2F5-4161-A025-7B911965C2FE}"/>
               </a:ext>
             </a:extLst>
           </p:cNvPr>
@@ -2914,7 +2914,7 @@
           <a:p>
             <a:fld id="{6C733091-19F0-4DD7-90FE-000B4789B4CF}" type="datetimeFigureOut">
               <a:rPr lang="en-US" smtClean="0"/>
-              <a:t>8/30/2021</a:t>
+              <a:t>8/31/2021</a:t>
             </a:fld>
             <a:endParaRPr lang="en-US"/>
           </a:p>
@@ -2925,7 +2925,7 @@
           <p:cNvPr id="5" name="Footer Placeholder 4">
             <a:extLst>
               <a:ext uri="{FF2B5EF4-FFF2-40B4-BE49-F238E27FC236}">
-                <a16:creationId xmlns:a16="http://schemas.microsoft.com/office/drawing/2014/main" id="{43C7B926-18F3-4C13-AB92-764E10D324FB}"/>
+                <a16:creationId xmlns:a16="http://schemas.microsoft.com/office/drawing/2014/main" xmlns="" id="{43C7B926-18F3-4C13-AB92-764E10D324FB}"/>
               </a:ext>
             </a:extLst>
           </p:cNvPr>
@@ -2968,7 +2968,7 @@
           <p:cNvPr id="6" name="Slide Number Placeholder 5">
             <a:extLst>
               <a:ext uri="{FF2B5EF4-FFF2-40B4-BE49-F238E27FC236}">
-                <a16:creationId xmlns:a16="http://schemas.microsoft.com/office/drawing/2014/main" id="{734FA846-3BF6-46FD-80CF-34B300D244C0}"/>
+                <a16:creationId xmlns:a16="http://schemas.microsoft.com/office/drawing/2014/main" xmlns="" id="{734FA846-3BF6-46FD-80CF-34B300D244C0}"/>
               </a:ext>
             </a:extLst>
           </p:cNvPr>
@@ -4818,10 +4818,10 @@
           <p:cNvPr id="10" name="Rectangle 9">
             <a:extLst>
               <a:ext uri="{FF2B5EF4-FFF2-40B4-BE49-F238E27FC236}">
-                <a16:creationId xmlns:a16="http://schemas.microsoft.com/office/drawing/2014/main" id="{32BC26D8-82FB-445E-AA49-62A77D7C1EE0}"/>
+                <a16:creationId xmlns:a16="http://schemas.microsoft.com/office/drawing/2014/main" xmlns="" id="{32BC26D8-82FB-445E-AA49-62A77D7C1EE0}"/>
               </a:ext>
               <a:ext uri="{C183D7F6-B498-43B3-948B-1728B52AA6E4}">
-                <adec:decorative xmlns:adec="http://schemas.microsoft.com/office/drawing/2017/decorative" val="1"/>
+                <adec:decorative xmlns:adec="http://schemas.microsoft.com/office/drawing/2017/decorative" xmlns="" val="1"/>
               </a:ext>
             </a:extLst>
           </p:cNvPr>
@@ -4831,7 +4831,7 @@
           <p:nvPr>
             <p:extLst>
               <p:ext uri="{386F3935-93C4-4BCD-93E2-E3B085C9AB24}">
-                <p16:designElem xmlns:p16="http://schemas.microsoft.com/office/powerpoint/2015/main" val="1"/>
+                <p16:designElem xmlns:p16="http://schemas.microsoft.com/office/powerpoint/2015/main" xmlns="" val="1"/>
               </p:ext>
             </p:extLst>
           </p:nvPr>
@@ -4881,10 +4881,10 @@
           <p:cNvPr id="23" name="Rectangle 11">
             <a:extLst>
               <a:ext uri="{FF2B5EF4-FFF2-40B4-BE49-F238E27FC236}">
-                <a16:creationId xmlns:a16="http://schemas.microsoft.com/office/drawing/2014/main" id="{CB44330D-EA18-4254-AA95-EB49948539B8}"/>
+                <a16:creationId xmlns:a16="http://schemas.microsoft.com/office/drawing/2014/main" xmlns="" id="{CB44330D-EA18-4254-AA95-EB49948539B8}"/>
               </a:ext>
               <a:ext uri="{C183D7F6-B498-43B3-948B-1728B52AA6E4}">
-                <adec:decorative xmlns:adec="http://schemas.microsoft.com/office/drawing/2017/decorative" val="1"/>
+                <adec:decorative xmlns:adec="http://schemas.microsoft.com/office/drawing/2017/decorative" xmlns="" val="1"/>
               </a:ext>
             </a:extLst>
           </p:cNvPr>
@@ -4894,7 +4894,7 @@
           <p:nvPr>
             <p:extLst>
               <p:ext uri="{386F3935-93C4-4BCD-93E2-E3B085C9AB24}">
-                <p16:designElem xmlns:p16="http://schemas.microsoft.com/office/powerpoint/2015/main" val="1"/>
+                <p16:designElem xmlns:p16="http://schemas.microsoft.com/office/powerpoint/2015/main" xmlns="" val="1"/>
               </p:ext>
             </p:extLst>
           </p:nvPr>
@@ -4941,19 +4941,11 @@
       </p:sp>
       <p:pic>
         <p:nvPicPr>
-          <p:cNvPr id="5" name="Content Placeholder 4">
-            <a:extLst>
-              <a:ext uri="{FF2B5EF4-FFF2-40B4-BE49-F238E27FC236}">
-                <a16:creationId xmlns:a16="http://schemas.microsoft.com/office/drawing/2014/main" id="{E15CE9C9-A3D0-4D7C-888D-ACF85E8DA2BE}"/>
-              </a:ext>
-            </a:extLst>
-          </p:cNvPr>
+          <p:cNvPr id="6" name="Picture 5"/>
           <p:cNvPicPr>
-            <a:picLocks noGrp="1" noChangeAspect="1"/>
+            <a:picLocks noChangeAspect="1"/>
           </p:cNvPicPr>
-          <p:nvPr>
-            <p:ph idx="1"/>
-          </p:nvPr>
+          <p:nvPr/>
         </p:nvPicPr>
         <p:blipFill>
           <a:blip r:embed="rId2"/>
@@ -4963,8 +4955,8 @@
         </p:blipFill>
         <p:spPr>
           <a:xfrm>
-            <a:off x="1008268" y="643467"/>
-            <a:ext cx="10175464" cy="5571066"/>
+            <a:off x="2452687" y="742950"/>
+            <a:ext cx="7286625" cy="5372100"/>
           </a:xfrm>
           <a:prstGeom prst="rect">
             <a:avLst/>

</xml_diff>

<commit_message>
20210831 2220 tlw87 EOD updates.
</commit_message>
<xml_diff>
--- a/docs/AMT.pptx
+++ b/docs/AMT.pptx
@@ -139,7 +139,7 @@
           <p:cNvPr id="2" name="Title 1">
             <a:extLst>
               <a:ext uri="{FF2B5EF4-FFF2-40B4-BE49-F238E27FC236}">
-                <a16:creationId xmlns:a16="http://schemas.microsoft.com/office/drawing/2014/main" xmlns="" id="{67106D7E-D400-44F1-9A1A-D68CE501C73D}"/>
+                <a16:creationId xmlns:a16="http://schemas.microsoft.com/office/drawing/2014/main" id="{67106D7E-D400-44F1-9A1A-D68CE501C73D}"/>
               </a:ext>
             </a:extLst>
           </p:cNvPr>
@@ -176,7 +176,7 @@
           <p:cNvPr id="3" name="Subtitle 2">
             <a:extLst>
               <a:ext uri="{FF2B5EF4-FFF2-40B4-BE49-F238E27FC236}">
-                <a16:creationId xmlns:a16="http://schemas.microsoft.com/office/drawing/2014/main" xmlns="" id="{A5FDE527-E621-4639-A0C7-E1E9B0DFBCEC}"/>
+                <a16:creationId xmlns:a16="http://schemas.microsoft.com/office/drawing/2014/main" id="{A5FDE527-E621-4639-A0C7-E1E9B0DFBCEC}"/>
               </a:ext>
             </a:extLst>
           </p:cNvPr>
@@ -246,7 +246,7 @@
           <p:cNvPr id="4" name="Date Placeholder 3">
             <a:extLst>
               <a:ext uri="{FF2B5EF4-FFF2-40B4-BE49-F238E27FC236}">
-                <a16:creationId xmlns:a16="http://schemas.microsoft.com/office/drawing/2014/main" xmlns="" id="{E109CE88-B989-4109-89C8-36F7C245DB1C}"/>
+                <a16:creationId xmlns:a16="http://schemas.microsoft.com/office/drawing/2014/main" id="{E109CE88-B989-4109-89C8-36F7C245DB1C}"/>
               </a:ext>
             </a:extLst>
           </p:cNvPr>
@@ -275,7 +275,7 @@
           <p:cNvPr id="5" name="Footer Placeholder 4">
             <a:extLst>
               <a:ext uri="{FF2B5EF4-FFF2-40B4-BE49-F238E27FC236}">
-                <a16:creationId xmlns:a16="http://schemas.microsoft.com/office/drawing/2014/main" xmlns="" id="{0841498F-B991-43D3-B408-CC35D8EFCF37}"/>
+                <a16:creationId xmlns:a16="http://schemas.microsoft.com/office/drawing/2014/main" id="{0841498F-B991-43D3-B408-CC35D8EFCF37}"/>
               </a:ext>
             </a:extLst>
           </p:cNvPr>
@@ -300,7 +300,7 @@
           <p:cNvPr id="6" name="Slide Number Placeholder 5">
             <a:extLst>
               <a:ext uri="{FF2B5EF4-FFF2-40B4-BE49-F238E27FC236}">
-                <a16:creationId xmlns:a16="http://schemas.microsoft.com/office/drawing/2014/main" xmlns="" id="{01754CB8-17B1-45A0-AE7D-755EAA1B69D8}"/>
+                <a16:creationId xmlns:a16="http://schemas.microsoft.com/office/drawing/2014/main" id="{01754CB8-17B1-45A0-AE7D-755EAA1B69D8}"/>
               </a:ext>
             </a:extLst>
           </p:cNvPr>
@@ -359,7 +359,7 @@
           <p:cNvPr id="2" name="Title 1">
             <a:extLst>
               <a:ext uri="{FF2B5EF4-FFF2-40B4-BE49-F238E27FC236}">
-                <a16:creationId xmlns:a16="http://schemas.microsoft.com/office/drawing/2014/main" xmlns="" id="{E7A7B055-5DC2-440D-83C1-CAAE8E9A8E14}"/>
+                <a16:creationId xmlns:a16="http://schemas.microsoft.com/office/drawing/2014/main" id="{E7A7B055-5DC2-440D-83C1-CAAE8E9A8E14}"/>
               </a:ext>
             </a:extLst>
           </p:cNvPr>
@@ -387,7 +387,7 @@
           <p:cNvPr id="3" name="Vertical Text Placeholder 2">
             <a:extLst>
               <a:ext uri="{FF2B5EF4-FFF2-40B4-BE49-F238E27FC236}">
-                <a16:creationId xmlns:a16="http://schemas.microsoft.com/office/drawing/2014/main" xmlns="" id="{65710707-423D-4F9D-A49D-6C764C562553}"/>
+                <a16:creationId xmlns:a16="http://schemas.microsoft.com/office/drawing/2014/main" id="{65710707-423D-4F9D-A49D-6C764C562553}"/>
               </a:ext>
             </a:extLst>
           </p:cNvPr>
@@ -444,7 +444,7 @@
           <p:cNvPr id="4" name="Date Placeholder 3">
             <a:extLst>
               <a:ext uri="{FF2B5EF4-FFF2-40B4-BE49-F238E27FC236}">
-                <a16:creationId xmlns:a16="http://schemas.microsoft.com/office/drawing/2014/main" xmlns="" id="{98B6F7EF-D1BE-4437-85F3-99626E37E4EF}"/>
+                <a16:creationId xmlns:a16="http://schemas.microsoft.com/office/drawing/2014/main" id="{98B6F7EF-D1BE-4437-85F3-99626E37E4EF}"/>
               </a:ext>
             </a:extLst>
           </p:cNvPr>
@@ -473,7 +473,7 @@
           <p:cNvPr id="5" name="Footer Placeholder 4">
             <a:extLst>
               <a:ext uri="{FF2B5EF4-FFF2-40B4-BE49-F238E27FC236}">
-                <a16:creationId xmlns:a16="http://schemas.microsoft.com/office/drawing/2014/main" xmlns="" id="{D890AA9B-E479-4209-B245-83608F3D4013}"/>
+                <a16:creationId xmlns:a16="http://schemas.microsoft.com/office/drawing/2014/main" id="{D890AA9B-E479-4209-B245-83608F3D4013}"/>
               </a:ext>
             </a:extLst>
           </p:cNvPr>
@@ -498,7 +498,7 @@
           <p:cNvPr id="6" name="Slide Number Placeholder 5">
             <a:extLst>
               <a:ext uri="{FF2B5EF4-FFF2-40B4-BE49-F238E27FC236}">
-                <a16:creationId xmlns:a16="http://schemas.microsoft.com/office/drawing/2014/main" xmlns="" id="{0E4976E4-E15A-4296-A430-633D2BB9142B}"/>
+                <a16:creationId xmlns:a16="http://schemas.microsoft.com/office/drawing/2014/main" id="{0E4976E4-E15A-4296-A430-633D2BB9142B}"/>
               </a:ext>
             </a:extLst>
           </p:cNvPr>
@@ -557,7 +557,7 @@
           <p:cNvPr id="2" name="Vertical Title 1">
             <a:extLst>
               <a:ext uri="{FF2B5EF4-FFF2-40B4-BE49-F238E27FC236}">
-                <a16:creationId xmlns:a16="http://schemas.microsoft.com/office/drawing/2014/main" xmlns="" id="{66F63CF5-8DEE-4BB2-A2A5-5C16FEBE1AD5}"/>
+                <a16:creationId xmlns:a16="http://schemas.microsoft.com/office/drawing/2014/main" id="{66F63CF5-8DEE-4BB2-A2A5-5C16FEBE1AD5}"/>
               </a:ext>
             </a:extLst>
           </p:cNvPr>
@@ -590,7 +590,7 @@
           <p:cNvPr id="3" name="Vertical Text Placeholder 2">
             <a:extLst>
               <a:ext uri="{FF2B5EF4-FFF2-40B4-BE49-F238E27FC236}">
-                <a16:creationId xmlns:a16="http://schemas.microsoft.com/office/drawing/2014/main" xmlns="" id="{E0D5EBA5-94AF-4373-B032-A40FF73C7575}"/>
+                <a16:creationId xmlns:a16="http://schemas.microsoft.com/office/drawing/2014/main" id="{E0D5EBA5-94AF-4373-B032-A40FF73C7575}"/>
               </a:ext>
             </a:extLst>
           </p:cNvPr>
@@ -652,7 +652,7 @@
           <p:cNvPr id="4" name="Date Placeholder 3">
             <a:extLst>
               <a:ext uri="{FF2B5EF4-FFF2-40B4-BE49-F238E27FC236}">
-                <a16:creationId xmlns:a16="http://schemas.microsoft.com/office/drawing/2014/main" xmlns="" id="{7426B8E1-6758-4F5E-B618-96641332600B}"/>
+                <a16:creationId xmlns:a16="http://schemas.microsoft.com/office/drawing/2014/main" id="{7426B8E1-6758-4F5E-B618-96641332600B}"/>
               </a:ext>
             </a:extLst>
           </p:cNvPr>
@@ -681,7 +681,7 @@
           <p:cNvPr id="5" name="Footer Placeholder 4">
             <a:extLst>
               <a:ext uri="{FF2B5EF4-FFF2-40B4-BE49-F238E27FC236}">
-                <a16:creationId xmlns:a16="http://schemas.microsoft.com/office/drawing/2014/main" xmlns="" id="{F65E330E-2A7E-482D-AE0F-70EA5A29958B}"/>
+                <a16:creationId xmlns:a16="http://schemas.microsoft.com/office/drawing/2014/main" id="{F65E330E-2A7E-482D-AE0F-70EA5A29958B}"/>
               </a:ext>
             </a:extLst>
           </p:cNvPr>
@@ -706,7 +706,7 @@
           <p:cNvPr id="6" name="Slide Number Placeholder 5">
             <a:extLst>
               <a:ext uri="{FF2B5EF4-FFF2-40B4-BE49-F238E27FC236}">
-                <a16:creationId xmlns:a16="http://schemas.microsoft.com/office/drawing/2014/main" xmlns="" id="{B8000005-FC38-4A6C-9D09-7945EFA08160}"/>
+                <a16:creationId xmlns:a16="http://schemas.microsoft.com/office/drawing/2014/main" id="{B8000005-FC38-4A6C-9D09-7945EFA08160}"/>
               </a:ext>
             </a:extLst>
           </p:cNvPr>
@@ -765,7 +765,7 @@
           <p:cNvPr id="2" name="Title 1">
             <a:extLst>
               <a:ext uri="{FF2B5EF4-FFF2-40B4-BE49-F238E27FC236}">
-                <a16:creationId xmlns:a16="http://schemas.microsoft.com/office/drawing/2014/main" xmlns="" id="{91D0002C-766B-44B4-A24C-BE6DE6C7BA4C}"/>
+                <a16:creationId xmlns:a16="http://schemas.microsoft.com/office/drawing/2014/main" id="{91D0002C-766B-44B4-A24C-BE6DE6C7BA4C}"/>
               </a:ext>
             </a:extLst>
           </p:cNvPr>
@@ -793,7 +793,7 @@
           <p:cNvPr id="3" name="Content Placeholder 2">
             <a:extLst>
               <a:ext uri="{FF2B5EF4-FFF2-40B4-BE49-F238E27FC236}">
-                <a16:creationId xmlns:a16="http://schemas.microsoft.com/office/drawing/2014/main" xmlns="" id="{3455BAA9-6C7B-4874-AD76-BD466F64802D}"/>
+                <a16:creationId xmlns:a16="http://schemas.microsoft.com/office/drawing/2014/main" id="{3455BAA9-6C7B-4874-AD76-BD466F64802D}"/>
               </a:ext>
             </a:extLst>
           </p:cNvPr>
@@ -850,7 +850,7 @@
           <p:cNvPr id="4" name="Date Placeholder 3">
             <a:extLst>
               <a:ext uri="{FF2B5EF4-FFF2-40B4-BE49-F238E27FC236}">
-                <a16:creationId xmlns:a16="http://schemas.microsoft.com/office/drawing/2014/main" xmlns="" id="{8776BDAF-D8F2-4A61-904D-094BB4545702}"/>
+                <a16:creationId xmlns:a16="http://schemas.microsoft.com/office/drawing/2014/main" id="{8776BDAF-D8F2-4A61-904D-094BB4545702}"/>
               </a:ext>
             </a:extLst>
           </p:cNvPr>
@@ -879,7 +879,7 @@
           <p:cNvPr id="5" name="Footer Placeholder 4">
             <a:extLst>
               <a:ext uri="{FF2B5EF4-FFF2-40B4-BE49-F238E27FC236}">
-                <a16:creationId xmlns:a16="http://schemas.microsoft.com/office/drawing/2014/main" xmlns="" id="{F89C5665-4384-4706-9BD2-9F42B05C96BC}"/>
+                <a16:creationId xmlns:a16="http://schemas.microsoft.com/office/drawing/2014/main" id="{F89C5665-4384-4706-9BD2-9F42B05C96BC}"/>
               </a:ext>
             </a:extLst>
           </p:cNvPr>
@@ -904,7 +904,7 @@
           <p:cNvPr id="6" name="Slide Number Placeholder 5">
             <a:extLst>
               <a:ext uri="{FF2B5EF4-FFF2-40B4-BE49-F238E27FC236}">
-                <a16:creationId xmlns:a16="http://schemas.microsoft.com/office/drawing/2014/main" xmlns="" id="{7DCAD73E-CAB3-4BA7-905E-D203691D0418}"/>
+                <a16:creationId xmlns:a16="http://schemas.microsoft.com/office/drawing/2014/main" id="{7DCAD73E-CAB3-4BA7-905E-D203691D0418}"/>
               </a:ext>
             </a:extLst>
           </p:cNvPr>
@@ -963,7 +963,7 @@
           <p:cNvPr id="2" name="Title 1">
             <a:extLst>
               <a:ext uri="{FF2B5EF4-FFF2-40B4-BE49-F238E27FC236}">
-                <a16:creationId xmlns:a16="http://schemas.microsoft.com/office/drawing/2014/main" xmlns="" id="{A9880706-F7FA-4EC3-A022-9D6C7CEC3692}"/>
+                <a16:creationId xmlns:a16="http://schemas.microsoft.com/office/drawing/2014/main" id="{A9880706-F7FA-4EC3-A022-9D6C7CEC3692}"/>
               </a:ext>
             </a:extLst>
           </p:cNvPr>
@@ -1000,7 +1000,7 @@
           <p:cNvPr id="3" name="Text Placeholder 2">
             <a:extLst>
               <a:ext uri="{FF2B5EF4-FFF2-40B4-BE49-F238E27FC236}">
-                <a16:creationId xmlns:a16="http://schemas.microsoft.com/office/drawing/2014/main" xmlns="" id="{FA8A65D0-3DF5-448D-82EC-A967682A0DED}"/>
+                <a16:creationId xmlns:a16="http://schemas.microsoft.com/office/drawing/2014/main" id="{FA8A65D0-3DF5-448D-82EC-A967682A0DED}"/>
               </a:ext>
             </a:extLst>
           </p:cNvPr>
@@ -1125,7 +1125,7 @@
           <p:cNvPr id="4" name="Date Placeholder 3">
             <a:extLst>
               <a:ext uri="{FF2B5EF4-FFF2-40B4-BE49-F238E27FC236}">
-                <a16:creationId xmlns:a16="http://schemas.microsoft.com/office/drawing/2014/main" xmlns="" id="{600EA68C-01A6-487D-9D6E-1D1B4EAC0440}"/>
+                <a16:creationId xmlns:a16="http://schemas.microsoft.com/office/drawing/2014/main" id="{600EA68C-01A6-487D-9D6E-1D1B4EAC0440}"/>
               </a:ext>
             </a:extLst>
           </p:cNvPr>
@@ -1154,7 +1154,7 @@
           <p:cNvPr id="5" name="Footer Placeholder 4">
             <a:extLst>
               <a:ext uri="{FF2B5EF4-FFF2-40B4-BE49-F238E27FC236}">
-                <a16:creationId xmlns:a16="http://schemas.microsoft.com/office/drawing/2014/main" xmlns="" id="{6E6527CB-4FFD-4569-A82C-5EDC311B2CF6}"/>
+                <a16:creationId xmlns:a16="http://schemas.microsoft.com/office/drawing/2014/main" id="{6E6527CB-4FFD-4569-A82C-5EDC311B2CF6}"/>
               </a:ext>
             </a:extLst>
           </p:cNvPr>
@@ -1179,7 +1179,7 @@
           <p:cNvPr id="6" name="Slide Number Placeholder 5">
             <a:extLst>
               <a:ext uri="{FF2B5EF4-FFF2-40B4-BE49-F238E27FC236}">
-                <a16:creationId xmlns:a16="http://schemas.microsoft.com/office/drawing/2014/main" xmlns="" id="{24B19E5B-5A98-4381-A01D-01F81FD65792}"/>
+                <a16:creationId xmlns:a16="http://schemas.microsoft.com/office/drawing/2014/main" id="{24B19E5B-5A98-4381-A01D-01F81FD65792}"/>
               </a:ext>
             </a:extLst>
           </p:cNvPr>
@@ -1238,7 +1238,7 @@
           <p:cNvPr id="2" name="Title 1">
             <a:extLst>
               <a:ext uri="{FF2B5EF4-FFF2-40B4-BE49-F238E27FC236}">
-                <a16:creationId xmlns:a16="http://schemas.microsoft.com/office/drawing/2014/main" xmlns="" id="{63228B71-E923-4431-B8D2-FAE724678940}"/>
+                <a16:creationId xmlns:a16="http://schemas.microsoft.com/office/drawing/2014/main" id="{63228B71-E923-4431-B8D2-FAE724678940}"/>
               </a:ext>
             </a:extLst>
           </p:cNvPr>
@@ -1266,7 +1266,7 @@
           <p:cNvPr id="3" name="Content Placeholder 2">
             <a:extLst>
               <a:ext uri="{FF2B5EF4-FFF2-40B4-BE49-F238E27FC236}">
-                <a16:creationId xmlns:a16="http://schemas.microsoft.com/office/drawing/2014/main" xmlns="" id="{B18895E9-B7FF-4A00-955B-206CF8C73E43}"/>
+                <a16:creationId xmlns:a16="http://schemas.microsoft.com/office/drawing/2014/main" id="{B18895E9-B7FF-4A00-955B-206CF8C73E43}"/>
               </a:ext>
             </a:extLst>
           </p:cNvPr>
@@ -1328,7 +1328,7 @@
           <p:cNvPr id="4" name="Content Placeholder 3">
             <a:extLst>
               <a:ext uri="{FF2B5EF4-FFF2-40B4-BE49-F238E27FC236}">
-                <a16:creationId xmlns:a16="http://schemas.microsoft.com/office/drawing/2014/main" xmlns="" id="{DA813955-E3B9-44BC-8E1D-139269C8B48A}"/>
+                <a16:creationId xmlns:a16="http://schemas.microsoft.com/office/drawing/2014/main" id="{DA813955-E3B9-44BC-8E1D-139269C8B48A}"/>
               </a:ext>
             </a:extLst>
           </p:cNvPr>
@@ -1390,7 +1390,7 @@
           <p:cNvPr id="5" name="Date Placeholder 4">
             <a:extLst>
               <a:ext uri="{FF2B5EF4-FFF2-40B4-BE49-F238E27FC236}">
-                <a16:creationId xmlns:a16="http://schemas.microsoft.com/office/drawing/2014/main" xmlns="" id="{7E9B8EF5-28D5-4C4E-A2AB-EEA30D75DAFE}"/>
+                <a16:creationId xmlns:a16="http://schemas.microsoft.com/office/drawing/2014/main" id="{7E9B8EF5-28D5-4C4E-A2AB-EEA30D75DAFE}"/>
               </a:ext>
             </a:extLst>
           </p:cNvPr>
@@ -1419,7 +1419,7 @@
           <p:cNvPr id="6" name="Footer Placeholder 5">
             <a:extLst>
               <a:ext uri="{FF2B5EF4-FFF2-40B4-BE49-F238E27FC236}">
-                <a16:creationId xmlns:a16="http://schemas.microsoft.com/office/drawing/2014/main" xmlns="" id="{5723E678-8CB4-4335-AA04-6BD391748717}"/>
+                <a16:creationId xmlns:a16="http://schemas.microsoft.com/office/drawing/2014/main" id="{5723E678-8CB4-4335-AA04-6BD391748717}"/>
               </a:ext>
             </a:extLst>
           </p:cNvPr>
@@ -1444,7 +1444,7 @@
           <p:cNvPr id="7" name="Slide Number Placeholder 6">
             <a:extLst>
               <a:ext uri="{FF2B5EF4-FFF2-40B4-BE49-F238E27FC236}">
-                <a16:creationId xmlns:a16="http://schemas.microsoft.com/office/drawing/2014/main" xmlns="" id="{887B5567-9F4D-4AE1-92D8-769C9F7EA4F0}"/>
+                <a16:creationId xmlns:a16="http://schemas.microsoft.com/office/drawing/2014/main" id="{887B5567-9F4D-4AE1-92D8-769C9F7EA4F0}"/>
               </a:ext>
             </a:extLst>
           </p:cNvPr>
@@ -1503,7 +1503,7 @@
           <p:cNvPr id="2" name="Title 1">
             <a:extLst>
               <a:ext uri="{FF2B5EF4-FFF2-40B4-BE49-F238E27FC236}">
-                <a16:creationId xmlns:a16="http://schemas.microsoft.com/office/drawing/2014/main" xmlns="" id="{A40320A9-7C0C-45B4-BF2B-3B53B5686EBB}"/>
+                <a16:creationId xmlns:a16="http://schemas.microsoft.com/office/drawing/2014/main" id="{A40320A9-7C0C-45B4-BF2B-3B53B5686EBB}"/>
               </a:ext>
             </a:extLst>
           </p:cNvPr>
@@ -1536,7 +1536,7 @@
           <p:cNvPr id="3" name="Text Placeholder 2">
             <a:extLst>
               <a:ext uri="{FF2B5EF4-FFF2-40B4-BE49-F238E27FC236}">
-                <a16:creationId xmlns:a16="http://schemas.microsoft.com/office/drawing/2014/main" xmlns="" id="{8C440DE1-7DD6-4B1C-B961-CD2079B51F03}"/>
+                <a16:creationId xmlns:a16="http://schemas.microsoft.com/office/drawing/2014/main" id="{8C440DE1-7DD6-4B1C-B961-CD2079B51F03}"/>
               </a:ext>
             </a:extLst>
           </p:cNvPr>
@@ -1607,7 +1607,7 @@
           <p:cNvPr id="4" name="Content Placeholder 3">
             <a:extLst>
               <a:ext uri="{FF2B5EF4-FFF2-40B4-BE49-F238E27FC236}">
-                <a16:creationId xmlns:a16="http://schemas.microsoft.com/office/drawing/2014/main" xmlns="" id="{6FAFE840-CC9A-4D89-B05F-159EF756B427}"/>
+                <a16:creationId xmlns:a16="http://schemas.microsoft.com/office/drawing/2014/main" id="{6FAFE840-CC9A-4D89-B05F-159EF756B427}"/>
               </a:ext>
             </a:extLst>
           </p:cNvPr>
@@ -1669,7 +1669,7 @@
           <p:cNvPr id="5" name="Text Placeholder 4">
             <a:extLst>
               <a:ext uri="{FF2B5EF4-FFF2-40B4-BE49-F238E27FC236}">
-                <a16:creationId xmlns:a16="http://schemas.microsoft.com/office/drawing/2014/main" xmlns="" id="{4B87AADC-3401-48C6-98F6-0AB60F6DF9BE}"/>
+                <a16:creationId xmlns:a16="http://schemas.microsoft.com/office/drawing/2014/main" id="{4B87AADC-3401-48C6-98F6-0AB60F6DF9BE}"/>
               </a:ext>
             </a:extLst>
           </p:cNvPr>
@@ -1740,7 +1740,7 @@
           <p:cNvPr id="6" name="Content Placeholder 5">
             <a:extLst>
               <a:ext uri="{FF2B5EF4-FFF2-40B4-BE49-F238E27FC236}">
-                <a16:creationId xmlns:a16="http://schemas.microsoft.com/office/drawing/2014/main" xmlns="" id="{34BCF1A4-FB52-4DCD-80BC-324BA41C33CD}"/>
+                <a16:creationId xmlns:a16="http://schemas.microsoft.com/office/drawing/2014/main" id="{34BCF1A4-FB52-4DCD-80BC-324BA41C33CD}"/>
               </a:ext>
             </a:extLst>
           </p:cNvPr>
@@ -1802,7 +1802,7 @@
           <p:cNvPr id="7" name="Date Placeholder 6">
             <a:extLst>
               <a:ext uri="{FF2B5EF4-FFF2-40B4-BE49-F238E27FC236}">
-                <a16:creationId xmlns:a16="http://schemas.microsoft.com/office/drawing/2014/main" xmlns="" id="{8CFD4208-60E7-48B1-8CD0-717D5E26B827}"/>
+                <a16:creationId xmlns:a16="http://schemas.microsoft.com/office/drawing/2014/main" id="{8CFD4208-60E7-48B1-8CD0-717D5E26B827}"/>
               </a:ext>
             </a:extLst>
           </p:cNvPr>
@@ -1831,7 +1831,7 @@
           <p:cNvPr id="8" name="Footer Placeholder 7">
             <a:extLst>
               <a:ext uri="{FF2B5EF4-FFF2-40B4-BE49-F238E27FC236}">
-                <a16:creationId xmlns:a16="http://schemas.microsoft.com/office/drawing/2014/main" xmlns="" id="{94E429D1-BEB1-4D8A-91F2-CD4F80157F8D}"/>
+                <a16:creationId xmlns:a16="http://schemas.microsoft.com/office/drawing/2014/main" id="{94E429D1-BEB1-4D8A-91F2-CD4F80157F8D}"/>
               </a:ext>
             </a:extLst>
           </p:cNvPr>
@@ -1856,7 +1856,7 @@
           <p:cNvPr id="9" name="Slide Number Placeholder 8">
             <a:extLst>
               <a:ext uri="{FF2B5EF4-FFF2-40B4-BE49-F238E27FC236}">
-                <a16:creationId xmlns:a16="http://schemas.microsoft.com/office/drawing/2014/main" xmlns="" id="{6F17C19C-8370-4118-A8FC-5DDA6F84230F}"/>
+                <a16:creationId xmlns:a16="http://schemas.microsoft.com/office/drawing/2014/main" id="{6F17C19C-8370-4118-A8FC-5DDA6F84230F}"/>
               </a:ext>
             </a:extLst>
           </p:cNvPr>
@@ -1915,7 +1915,7 @@
           <p:cNvPr id="2" name="Title 1">
             <a:extLst>
               <a:ext uri="{FF2B5EF4-FFF2-40B4-BE49-F238E27FC236}">
-                <a16:creationId xmlns:a16="http://schemas.microsoft.com/office/drawing/2014/main" xmlns="" id="{252CBF36-7F99-45A9-BC35-BD2EC260CBF0}"/>
+                <a16:creationId xmlns:a16="http://schemas.microsoft.com/office/drawing/2014/main" id="{252CBF36-7F99-45A9-BC35-BD2EC260CBF0}"/>
               </a:ext>
             </a:extLst>
           </p:cNvPr>
@@ -1943,7 +1943,7 @@
           <p:cNvPr id="3" name="Date Placeholder 2">
             <a:extLst>
               <a:ext uri="{FF2B5EF4-FFF2-40B4-BE49-F238E27FC236}">
-                <a16:creationId xmlns:a16="http://schemas.microsoft.com/office/drawing/2014/main" xmlns="" id="{0D6F5F83-F07E-4501-B86B-9F96CD43993C}"/>
+                <a16:creationId xmlns:a16="http://schemas.microsoft.com/office/drawing/2014/main" id="{0D6F5F83-F07E-4501-B86B-9F96CD43993C}"/>
               </a:ext>
             </a:extLst>
           </p:cNvPr>
@@ -1972,7 +1972,7 @@
           <p:cNvPr id="4" name="Footer Placeholder 3">
             <a:extLst>
               <a:ext uri="{FF2B5EF4-FFF2-40B4-BE49-F238E27FC236}">
-                <a16:creationId xmlns:a16="http://schemas.microsoft.com/office/drawing/2014/main" xmlns="" id="{2861989B-F8E9-41FD-8E16-687424BCC266}"/>
+                <a16:creationId xmlns:a16="http://schemas.microsoft.com/office/drawing/2014/main" id="{2861989B-F8E9-41FD-8E16-687424BCC266}"/>
               </a:ext>
             </a:extLst>
           </p:cNvPr>
@@ -1997,7 +1997,7 @@
           <p:cNvPr id="5" name="Slide Number Placeholder 4">
             <a:extLst>
               <a:ext uri="{FF2B5EF4-FFF2-40B4-BE49-F238E27FC236}">
-                <a16:creationId xmlns:a16="http://schemas.microsoft.com/office/drawing/2014/main" xmlns="" id="{2026B6D7-7832-4815-95CE-5CEC39502825}"/>
+                <a16:creationId xmlns:a16="http://schemas.microsoft.com/office/drawing/2014/main" id="{2026B6D7-7832-4815-95CE-5CEC39502825}"/>
               </a:ext>
             </a:extLst>
           </p:cNvPr>
@@ -2056,7 +2056,7 @@
           <p:cNvPr id="2" name="Date Placeholder 1">
             <a:extLst>
               <a:ext uri="{FF2B5EF4-FFF2-40B4-BE49-F238E27FC236}">
-                <a16:creationId xmlns:a16="http://schemas.microsoft.com/office/drawing/2014/main" xmlns="" id="{9877919A-C4B6-46FD-A08A-9A4B867FE01A}"/>
+                <a16:creationId xmlns:a16="http://schemas.microsoft.com/office/drawing/2014/main" id="{9877919A-C4B6-46FD-A08A-9A4B867FE01A}"/>
               </a:ext>
             </a:extLst>
           </p:cNvPr>
@@ -2085,7 +2085,7 @@
           <p:cNvPr id="3" name="Footer Placeholder 2">
             <a:extLst>
               <a:ext uri="{FF2B5EF4-FFF2-40B4-BE49-F238E27FC236}">
-                <a16:creationId xmlns:a16="http://schemas.microsoft.com/office/drawing/2014/main" xmlns="" id="{9118539E-383C-4F1C-86F2-14C533A7E9FB}"/>
+                <a16:creationId xmlns:a16="http://schemas.microsoft.com/office/drawing/2014/main" id="{9118539E-383C-4F1C-86F2-14C533A7E9FB}"/>
               </a:ext>
             </a:extLst>
           </p:cNvPr>
@@ -2110,7 +2110,7 @@
           <p:cNvPr id="4" name="Slide Number Placeholder 3">
             <a:extLst>
               <a:ext uri="{FF2B5EF4-FFF2-40B4-BE49-F238E27FC236}">
-                <a16:creationId xmlns:a16="http://schemas.microsoft.com/office/drawing/2014/main" xmlns="" id="{C9A6D4E1-CA83-4214-9942-9E4617AA89BF}"/>
+                <a16:creationId xmlns:a16="http://schemas.microsoft.com/office/drawing/2014/main" id="{C9A6D4E1-CA83-4214-9942-9E4617AA89BF}"/>
               </a:ext>
             </a:extLst>
           </p:cNvPr>
@@ -2169,7 +2169,7 @@
           <p:cNvPr id="2" name="Title 1">
             <a:extLst>
               <a:ext uri="{FF2B5EF4-FFF2-40B4-BE49-F238E27FC236}">
-                <a16:creationId xmlns:a16="http://schemas.microsoft.com/office/drawing/2014/main" xmlns="" id="{046EF9B5-7A2A-4225-8817-86D028D6950C}"/>
+                <a16:creationId xmlns:a16="http://schemas.microsoft.com/office/drawing/2014/main" id="{046EF9B5-7A2A-4225-8817-86D028D6950C}"/>
               </a:ext>
             </a:extLst>
           </p:cNvPr>
@@ -2206,7 +2206,7 @@
           <p:cNvPr id="3" name="Content Placeholder 2">
             <a:extLst>
               <a:ext uri="{FF2B5EF4-FFF2-40B4-BE49-F238E27FC236}">
-                <a16:creationId xmlns:a16="http://schemas.microsoft.com/office/drawing/2014/main" xmlns="" id="{8667C390-5297-41E8-A403-22856007B051}"/>
+                <a16:creationId xmlns:a16="http://schemas.microsoft.com/office/drawing/2014/main" id="{8667C390-5297-41E8-A403-22856007B051}"/>
               </a:ext>
             </a:extLst>
           </p:cNvPr>
@@ -2296,7 +2296,7 @@
           <p:cNvPr id="4" name="Text Placeholder 3">
             <a:extLst>
               <a:ext uri="{FF2B5EF4-FFF2-40B4-BE49-F238E27FC236}">
-                <a16:creationId xmlns:a16="http://schemas.microsoft.com/office/drawing/2014/main" xmlns="" id="{8D0D2F7D-D6CD-4AB1-A3EA-CBFD2A2B3703}"/>
+                <a16:creationId xmlns:a16="http://schemas.microsoft.com/office/drawing/2014/main" id="{8D0D2F7D-D6CD-4AB1-A3EA-CBFD2A2B3703}"/>
               </a:ext>
             </a:extLst>
           </p:cNvPr>
@@ -2367,7 +2367,7 @@
           <p:cNvPr id="5" name="Date Placeholder 4">
             <a:extLst>
               <a:ext uri="{FF2B5EF4-FFF2-40B4-BE49-F238E27FC236}">
-                <a16:creationId xmlns:a16="http://schemas.microsoft.com/office/drawing/2014/main" xmlns="" id="{E17A441D-4FA7-4110-BF24-165CD3C3DAD7}"/>
+                <a16:creationId xmlns:a16="http://schemas.microsoft.com/office/drawing/2014/main" id="{E17A441D-4FA7-4110-BF24-165CD3C3DAD7}"/>
               </a:ext>
             </a:extLst>
           </p:cNvPr>
@@ -2396,7 +2396,7 @@
           <p:cNvPr id="6" name="Footer Placeholder 5">
             <a:extLst>
               <a:ext uri="{FF2B5EF4-FFF2-40B4-BE49-F238E27FC236}">
-                <a16:creationId xmlns:a16="http://schemas.microsoft.com/office/drawing/2014/main" xmlns="" id="{346102C5-5AE3-43CF-A686-1AB72B0790AB}"/>
+                <a16:creationId xmlns:a16="http://schemas.microsoft.com/office/drawing/2014/main" id="{346102C5-5AE3-43CF-A686-1AB72B0790AB}"/>
               </a:ext>
             </a:extLst>
           </p:cNvPr>
@@ -2421,7 +2421,7 @@
           <p:cNvPr id="7" name="Slide Number Placeholder 6">
             <a:extLst>
               <a:ext uri="{FF2B5EF4-FFF2-40B4-BE49-F238E27FC236}">
-                <a16:creationId xmlns:a16="http://schemas.microsoft.com/office/drawing/2014/main" xmlns="" id="{5528B3F7-462C-4500-8836-B3E5CD8DA61A}"/>
+                <a16:creationId xmlns:a16="http://schemas.microsoft.com/office/drawing/2014/main" id="{5528B3F7-462C-4500-8836-B3E5CD8DA61A}"/>
               </a:ext>
             </a:extLst>
           </p:cNvPr>
@@ -2480,7 +2480,7 @@
           <p:cNvPr id="2" name="Title 1">
             <a:extLst>
               <a:ext uri="{FF2B5EF4-FFF2-40B4-BE49-F238E27FC236}">
-                <a16:creationId xmlns:a16="http://schemas.microsoft.com/office/drawing/2014/main" xmlns="" id="{4BA10E59-DA48-4690-A956-9EB8E4E11EE5}"/>
+                <a16:creationId xmlns:a16="http://schemas.microsoft.com/office/drawing/2014/main" id="{4BA10E59-DA48-4690-A956-9EB8E4E11EE5}"/>
               </a:ext>
             </a:extLst>
           </p:cNvPr>
@@ -2517,7 +2517,7 @@
           <p:cNvPr id="3" name="Picture Placeholder 2">
             <a:extLst>
               <a:ext uri="{FF2B5EF4-FFF2-40B4-BE49-F238E27FC236}">
-                <a16:creationId xmlns:a16="http://schemas.microsoft.com/office/drawing/2014/main" xmlns="" id="{AC7AFE1E-67D1-4106-97CA-98302D42CC4D}"/>
+                <a16:creationId xmlns:a16="http://schemas.microsoft.com/office/drawing/2014/main" id="{AC7AFE1E-67D1-4106-97CA-98302D42CC4D}"/>
               </a:ext>
             </a:extLst>
           </p:cNvPr>
@@ -2584,7 +2584,7 @@
           <p:cNvPr id="4" name="Text Placeholder 3">
             <a:extLst>
               <a:ext uri="{FF2B5EF4-FFF2-40B4-BE49-F238E27FC236}">
-                <a16:creationId xmlns:a16="http://schemas.microsoft.com/office/drawing/2014/main" xmlns="" id="{67D8D73B-3D4D-42A7-9A3C-1D508E8A9B45}"/>
+                <a16:creationId xmlns:a16="http://schemas.microsoft.com/office/drawing/2014/main" id="{67D8D73B-3D4D-42A7-9A3C-1D508E8A9B45}"/>
               </a:ext>
             </a:extLst>
           </p:cNvPr>
@@ -2655,7 +2655,7 @@
           <p:cNvPr id="5" name="Date Placeholder 4">
             <a:extLst>
               <a:ext uri="{FF2B5EF4-FFF2-40B4-BE49-F238E27FC236}">
-                <a16:creationId xmlns:a16="http://schemas.microsoft.com/office/drawing/2014/main" xmlns="" id="{48C8945E-A47A-42A2-9DF6-CA6D5002F65F}"/>
+                <a16:creationId xmlns:a16="http://schemas.microsoft.com/office/drawing/2014/main" id="{48C8945E-A47A-42A2-9DF6-CA6D5002F65F}"/>
               </a:ext>
             </a:extLst>
           </p:cNvPr>
@@ -2684,7 +2684,7 @@
           <p:cNvPr id="6" name="Footer Placeholder 5">
             <a:extLst>
               <a:ext uri="{FF2B5EF4-FFF2-40B4-BE49-F238E27FC236}">
-                <a16:creationId xmlns:a16="http://schemas.microsoft.com/office/drawing/2014/main" xmlns="" id="{EB000DB4-2747-4297-B400-42A539FBDB42}"/>
+                <a16:creationId xmlns:a16="http://schemas.microsoft.com/office/drawing/2014/main" id="{EB000DB4-2747-4297-B400-42A539FBDB42}"/>
               </a:ext>
             </a:extLst>
           </p:cNvPr>
@@ -2709,7 +2709,7 @@
           <p:cNvPr id="7" name="Slide Number Placeholder 6">
             <a:extLst>
               <a:ext uri="{FF2B5EF4-FFF2-40B4-BE49-F238E27FC236}">
-                <a16:creationId xmlns:a16="http://schemas.microsoft.com/office/drawing/2014/main" xmlns="" id="{5BAD9222-F141-4803-AF73-E2DD92E2ABBC}"/>
+                <a16:creationId xmlns:a16="http://schemas.microsoft.com/office/drawing/2014/main" id="{5BAD9222-F141-4803-AF73-E2DD92E2ABBC}"/>
               </a:ext>
             </a:extLst>
           </p:cNvPr>
@@ -2773,7 +2773,7 @@
           <p:cNvPr id="2" name="Title Placeholder 1">
             <a:extLst>
               <a:ext uri="{FF2B5EF4-FFF2-40B4-BE49-F238E27FC236}">
-                <a16:creationId xmlns:a16="http://schemas.microsoft.com/office/drawing/2014/main" xmlns="" id="{5BF9D404-795C-4EA4-AD01-26740519239C}"/>
+                <a16:creationId xmlns:a16="http://schemas.microsoft.com/office/drawing/2014/main" id="{5BF9D404-795C-4EA4-AD01-26740519239C}"/>
               </a:ext>
             </a:extLst>
           </p:cNvPr>
@@ -2811,7 +2811,7 @@
           <p:cNvPr id="3" name="Text Placeholder 2">
             <a:extLst>
               <a:ext uri="{FF2B5EF4-FFF2-40B4-BE49-F238E27FC236}">
-                <a16:creationId xmlns:a16="http://schemas.microsoft.com/office/drawing/2014/main" xmlns="" id="{DE3FEC7B-48F8-4348-9BC6-68F83B859EE9}"/>
+                <a16:creationId xmlns:a16="http://schemas.microsoft.com/office/drawing/2014/main" id="{DE3FEC7B-48F8-4348-9BC6-68F83B859EE9}"/>
               </a:ext>
             </a:extLst>
           </p:cNvPr>
@@ -2878,7 +2878,7 @@
           <p:cNvPr id="4" name="Date Placeholder 3">
             <a:extLst>
               <a:ext uri="{FF2B5EF4-FFF2-40B4-BE49-F238E27FC236}">
-                <a16:creationId xmlns:a16="http://schemas.microsoft.com/office/drawing/2014/main" xmlns="" id="{31CA1A1D-E2F5-4161-A025-7B911965C2FE}"/>
+                <a16:creationId xmlns:a16="http://schemas.microsoft.com/office/drawing/2014/main" id="{31CA1A1D-E2F5-4161-A025-7B911965C2FE}"/>
               </a:ext>
             </a:extLst>
           </p:cNvPr>
@@ -2925,7 +2925,7 @@
           <p:cNvPr id="5" name="Footer Placeholder 4">
             <a:extLst>
               <a:ext uri="{FF2B5EF4-FFF2-40B4-BE49-F238E27FC236}">
-                <a16:creationId xmlns:a16="http://schemas.microsoft.com/office/drawing/2014/main" xmlns="" id="{43C7B926-18F3-4C13-AB92-764E10D324FB}"/>
+                <a16:creationId xmlns:a16="http://schemas.microsoft.com/office/drawing/2014/main" id="{43C7B926-18F3-4C13-AB92-764E10D324FB}"/>
               </a:ext>
             </a:extLst>
           </p:cNvPr>
@@ -2968,7 +2968,7 @@
           <p:cNvPr id="6" name="Slide Number Placeholder 5">
             <a:extLst>
               <a:ext uri="{FF2B5EF4-FFF2-40B4-BE49-F238E27FC236}">
-                <a16:creationId xmlns:a16="http://schemas.microsoft.com/office/drawing/2014/main" xmlns="" id="{734FA846-3BF6-46FD-80CF-34B300D244C0}"/>
+                <a16:creationId xmlns:a16="http://schemas.microsoft.com/office/drawing/2014/main" id="{734FA846-3BF6-46FD-80CF-34B300D244C0}"/>
               </a:ext>
             </a:extLst>
           </p:cNvPr>
@@ -4813,15 +4813,15 @@
           <a:chExt cx="0" cy="0"/>
         </a:xfrm>
       </p:grpSpPr>
-      <p:sp>
+      <p:sp useBgFill="1">
         <p:nvSpPr>
           <p:cNvPr id="10" name="Rectangle 9">
             <a:extLst>
               <a:ext uri="{FF2B5EF4-FFF2-40B4-BE49-F238E27FC236}">
-                <a16:creationId xmlns:a16="http://schemas.microsoft.com/office/drawing/2014/main" xmlns="" id="{32BC26D8-82FB-445E-AA49-62A77D7C1EE0}"/>
+                <a16:creationId xmlns:a16="http://schemas.microsoft.com/office/drawing/2014/main" id="{AB8C311F-7253-4AED-9701-7FC0708C41C7}"/>
               </a:ext>
               <a:ext uri="{C183D7F6-B498-43B3-948B-1728B52AA6E4}">
-                <adec:decorative xmlns:adec="http://schemas.microsoft.com/office/drawing/2017/decorative" xmlns="" val="1"/>
+                <adec:decorative xmlns:adec="http://schemas.microsoft.com/office/drawing/2017/decorative" val="1"/>
               </a:ext>
             </a:extLst>
           </p:cNvPr>
@@ -4831,7 +4831,7 @@
           <p:nvPr>
             <p:extLst>
               <p:ext uri="{386F3935-93C4-4BCD-93E2-E3B085C9AB24}">
-                <p16:designElem xmlns:p16="http://schemas.microsoft.com/office/powerpoint/2015/main" xmlns="" val="1"/>
+                <p16:designElem xmlns:p16="http://schemas.microsoft.com/office/powerpoint/2015/main" val="1"/>
               </p:ext>
             </p:extLst>
           </p:nvPr>
@@ -4844,9 +4844,95 @@
           <a:prstGeom prst="rect">
             <a:avLst/>
           </a:prstGeom>
-          <a:solidFill>
-            <a:srgbClr val="5A2B50"/>
-          </a:solidFill>
+          <a:ln w="12700" cap="flat" cmpd="sng" algn="ctr">
+            <a:noFill/>
+            <a:prstDash val="solid"/>
+            <a:miter lim="800000"/>
+          </a:ln>
+          <a:effectLst/>
+          <a:extLst>
+            <a:ext uri="{91240B29-F687-4F45-9708-019B960494DF}">
+              <a14:hiddenLine xmlns:a14="http://schemas.microsoft.com/office/drawing/2010/main" w="12700" cap="flat" cmpd="sng" algn="ctr">
+                <a:solidFill>
+                  <a:schemeClr val="accent1">
+                    <a:shade val="50000"/>
+                  </a:schemeClr>
+                </a:solidFill>
+                <a:prstDash val="solid"/>
+                <a:miter lim="800000"/>
+              </a14:hiddenLine>
+            </a:ext>
+          </a:extLst>
+        </p:spPr>
+        <p:style>
+          <a:lnRef idx="2">
+            <a:schemeClr val="accent1">
+              <a:shade val="50000"/>
+            </a:schemeClr>
+          </a:lnRef>
+          <a:fillRef idx="1">
+            <a:schemeClr val="accent1"/>
+          </a:fillRef>
+          <a:effectRef idx="0">
+            <a:schemeClr val="accent1"/>
+          </a:effectRef>
+          <a:fontRef idx="minor">
+            <a:schemeClr val="lt1"/>
+          </a:fontRef>
+        </p:style>
+        <p:txBody>
+          <a:bodyPr rtlCol="0" anchor="ctr"/>
+          <a:lstStyle/>
+          <a:p>
+            <a:pPr algn="ctr"/>
+            <a:endParaRPr lang="en-US"/>
+          </a:p>
+        </p:txBody>
+      </p:sp>
+      <p:sp>
+        <p:nvSpPr>
+          <p:cNvPr id="12" name="Rectangle 11">
+            <a:extLst>
+              <a:ext uri="{FF2B5EF4-FFF2-40B4-BE49-F238E27FC236}">
+                <a16:creationId xmlns:a16="http://schemas.microsoft.com/office/drawing/2014/main" id="{E2384209-CB15-4CDF-9D31-C44FD9A3F20D}"/>
+              </a:ext>
+              <a:ext uri="{C183D7F6-B498-43B3-948B-1728B52AA6E4}">
+                <adec:decorative xmlns:adec="http://schemas.microsoft.com/office/drawing/2017/decorative" val="1"/>
+              </a:ext>
+            </a:extLst>
+          </p:cNvPr>
+          <p:cNvSpPr>
+            <a:spLocks noGrp="1" noRot="1" noChangeAspect="1" noMove="1" noResize="1" noEditPoints="1" noAdjustHandles="1" noChangeArrowheads="1" noChangeShapeType="1" noTextEdit="1"/>
+          </p:cNvSpPr>
+          <p:nvPr>
+            <p:extLst>
+              <p:ext uri="{386F3935-93C4-4BCD-93E2-E3B085C9AB24}">
+                <p16:designElem xmlns:p16="http://schemas.microsoft.com/office/powerpoint/2015/main" val="1"/>
+              </p:ext>
+            </p:extLst>
+          </p:nvPr>
+        </p:nvSpPr>
+        <p:spPr>
+          <a:xfrm rot="16200000" flipH="1">
+            <a:off x="2666617" y="-2666188"/>
+            <a:ext cx="6858000" cy="12191233"/>
+          </a:xfrm>
+          <a:prstGeom prst="rect">
+            <a:avLst/>
+          </a:prstGeom>
+          <a:gradFill>
+            <a:gsLst>
+              <a:gs pos="8000">
+                <a:schemeClr val="accent1"/>
+              </a:gs>
+              <a:gs pos="100000">
+                <a:schemeClr val="accent1">
+                  <a:lumMod val="50000"/>
+                </a:schemeClr>
+              </a:gs>
+            </a:gsLst>
+            <a:lin ang="12000000" scaled="0"/>
+          </a:gradFill>
           <a:ln>
             <a:noFill/>
           </a:ln>
@@ -4878,13 +4964,13 @@
       </p:sp>
       <p:sp>
         <p:nvSpPr>
-          <p:cNvPr id="23" name="Rectangle 11">
-            <a:extLst>
-              <a:ext uri="{FF2B5EF4-FFF2-40B4-BE49-F238E27FC236}">
-                <a16:creationId xmlns:a16="http://schemas.microsoft.com/office/drawing/2014/main" xmlns="" id="{CB44330D-EA18-4254-AA95-EB49948539B8}"/>
+          <p:cNvPr id="14" name="Rectangle 13">
+            <a:extLst>
+              <a:ext uri="{FF2B5EF4-FFF2-40B4-BE49-F238E27FC236}">
+                <a16:creationId xmlns:a16="http://schemas.microsoft.com/office/drawing/2014/main" id="{2633B3B5-CC90-43F0-8714-D31D1F3F0209}"/>
               </a:ext>
               <a:ext uri="{C183D7F6-B498-43B3-948B-1728B52AA6E4}">
-                <adec:decorative xmlns:adec="http://schemas.microsoft.com/office/drawing/2017/decorative" xmlns="" val="1"/>
+                <adec:decorative xmlns:adec="http://schemas.microsoft.com/office/drawing/2017/decorative" val="1"/>
               </a:ext>
             </a:extLst>
           </p:cNvPr>
@@ -4894,22 +4980,32 @@
           <p:nvPr>
             <p:extLst>
               <p:ext uri="{386F3935-93C4-4BCD-93E2-E3B085C9AB24}">
-                <p16:designElem xmlns:p16="http://schemas.microsoft.com/office/powerpoint/2015/main" xmlns="" val="1"/>
+                <p16:designElem xmlns:p16="http://schemas.microsoft.com/office/powerpoint/2015/main" val="1"/>
               </p:ext>
             </p:extLst>
           </p:nvPr>
         </p:nvSpPr>
         <p:spPr>
-          <a:xfrm>
-            <a:off x="477012" y="480060"/>
-            <a:ext cx="11237976" cy="5897880"/>
+          <a:xfrm rot="10800000" flipH="1">
+            <a:off x="-2311" y="0"/>
+            <a:ext cx="9070846" cy="6857572"/>
           </a:xfrm>
           <a:prstGeom prst="rect">
             <a:avLst/>
           </a:prstGeom>
-          <a:solidFill>
-            <a:srgbClr val="FFFFFF"/>
-          </a:solidFill>
+          <a:gradFill>
+            <a:gsLst>
+              <a:gs pos="8000">
+                <a:srgbClr val="000000">
+                  <a:alpha val="52000"/>
+                </a:srgbClr>
+              </a:gs>
+              <a:gs pos="100000">
+                <a:schemeClr val="accent1"/>
+              </a:gs>
+            </a:gsLst>
+            <a:lin ang="4800000" scaled="0"/>
+          </a:gradFill>
           <a:ln>
             <a:noFill/>
           </a:ln>
@@ -4939,9 +5035,92 @@
           </a:p>
         </p:txBody>
       </p:sp>
+      <p:sp>
+        <p:nvSpPr>
+          <p:cNvPr id="16" name="Rectangle 15">
+            <a:extLst>
+              <a:ext uri="{FF2B5EF4-FFF2-40B4-BE49-F238E27FC236}">
+                <a16:creationId xmlns:a16="http://schemas.microsoft.com/office/drawing/2014/main" id="{A8D57A06-A426-446D-B02C-A2DC6B62E45E}"/>
+              </a:ext>
+              <a:ext uri="{C183D7F6-B498-43B3-948B-1728B52AA6E4}">
+                <adec:decorative xmlns:adec="http://schemas.microsoft.com/office/drawing/2017/decorative" val="1"/>
+              </a:ext>
+            </a:extLst>
+          </p:cNvPr>
+          <p:cNvSpPr>
+            <a:spLocks noGrp="1" noRot="1" noChangeAspect="1" noMove="1" noResize="1" noEditPoints="1" noAdjustHandles="1" noChangeArrowheads="1" noChangeShapeType="1" noTextEdit="1"/>
+          </p:cNvSpPr>
+          <p:nvPr>
+            <p:extLst>
+              <p:ext uri="{386F3935-93C4-4BCD-93E2-E3B085C9AB24}">
+                <p16:designElem xmlns:p16="http://schemas.microsoft.com/office/powerpoint/2015/main" val="1"/>
+              </p:ext>
+            </p:extLst>
+          </p:nvPr>
+        </p:nvSpPr>
+        <p:spPr>
+          <a:xfrm rot="16200000" flipH="1">
+            <a:off x="3649491" y="-1685840"/>
+            <a:ext cx="4894564" cy="12193546"/>
+          </a:xfrm>
+          <a:prstGeom prst="rect">
+            <a:avLst/>
+          </a:prstGeom>
+          <a:gradFill>
+            <a:gsLst>
+              <a:gs pos="0">
+                <a:schemeClr val="accent5">
+                  <a:lumMod val="60000"/>
+                  <a:lumOff val="40000"/>
+                  <a:alpha val="0"/>
+                </a:schemeClr>
+              </a:gs>
+              <a:gs pos="100000">
+                <a:srgbClr val="000000">
+                  <a:alpha val="46000"/>
+                </a:srgbClr>
+              </a:gs>
+            </a:gsLst>
+            <a:lin ang="1200000" scaled="0"/>
+          </a:gradFill>
+          <a:ln>
+            <a:noFill/>
+          </a:ln>
+        </p:spPr>
+        <p:style>
+          <a:lnRef idx="2">
+            <a:schemeClr val="accent1">
+              <a:shade val="50000"/>
+            </a:schemeClr>
+          </a:lnRef>
+          <a:fillRef idx="1">
+            <a:schemeClr val="accent1"/>
+          </a:fillRef>
+          <a:effectRef idx="0">
+            <a:schemeClr val="accent1"/>
+          </a:effectRef>
+          <a:fontRef idx="minor">
+            <a:schemeClr val="lt1"/>
+          </a:fontRef>
+        </p:style>
+        <p:txBody>
+          <a:bodyPr rtlCol="0" anchor="ctr"/>
+          <a:lstStyle/>
+          <a:p>
+            <a:pPr algn="ctr"/>
+            <a:endParaRPr lang="en-US"/>
+          </a:p>
+        </p:txBody>
+      </p:sp>
       <p:pic>
         <p:nvPicPr>
-          <p:cNvPr id="6" name="Picture 5"/>
+          <p:cNvPr id="5" name="Picture 4" descr="Diagram&#10;&#10;Description automatically generated">
+            <a:extLst>
+              <a:ext uri="{FF2B5EF4-FFF2-40B4-BE49-F238E27FC236}">
+                <a16:creationId xmlns:a16="http://schemas.microsoft.com/office/drawing/2014/main" id="{DB17FD74-8C94-4DC8-A4F8-6135D511A8C6}"/>
+              </a:ext>
+            </a:extLst>
+          </p:cNvPr>
           <p:cNvPicPr>
             <a:picLocks noChangeAspect="1"/>
           </p:cNvPicPr>
@@ -4955,8 +5134,8 @@
         </p:blipFill>
         <p:spPr>
           <a:xfrm>
-            <a:off x="2452687" y="742950"/>
-            <a:ext cx="7286625" cy="5372100"/>
+            <a:off x="1789043" y="457200"/>
+            <a:ext cx="8613913" cy="5943600"/>
           </a:xfrm>
           <a:prstGeom prst="rect">
             <a:avLst/>
@@ -4966,7 +5145,7 @@
     </p:spTree>
     <p:extLst>
       <p:ext uri="{BB962C8B-B14F-4D97-AF65-F5344CB8AC3E}">
-        <p14:creationId xmlns:p14="http://schemas.microsoft.com/office/powerpoint/2010/main" val="2607150881"/>
+        <p14:creationId xmlns:p14="http://schemas.microsoft.com/office/powerpoint/2010/main" val="806997856"/>
       </p:ext>
     </p:extLst>
   </p:cSld>

</xml_diff>

<commit_message>
20210902 1608 tlw8748253: EOD updates.
</commit_message>
<xml_diff>
--- a/docs/AMT.pptx
+++ b/docs/AMT.pptx
@@ -11,6 +11,8 @@
     <p:sldId id="274" r:id="rId5"/>
     <p:sldId id="273" r:id="rId6"/>
     <p:sldId id="276" r:id="rId7"/>
+    <p:sldId id="277" r:id="rId8"/>
+    <p:sldId id="278" r:id="rId9"/>
   </p:sldIdLst>
   <p:sldSz cx="12192000" cy="6858000"/>
   <p:notesSz cx="6858000" cy="9144000"/>
@@ -139,7 +141,7 @@
           <p:cNvPr id="2" name="Title 1">
             <a:extLst>
               <a:ext uri="{FF2B5EF4-FFF2-40B4-BE49-F238E27FC236}">
-                <a16:creationId xmlns:a16="http://schemas.microsoft.com/office/drawing/2014/main" id="{67106D7E-D400-44F1-9A1A-D68CE501C73D}"/>
+                <a16:creationId xmlns:a16="http://schemas.microsoft.com/office/drawing/2014/main" xmlns="" id="{67106D7E-D400-44F1-9A1A-D68CE501C73D}"/>
               </a:ext>
             </a:extLst>
           </p:cNvPr>
@@ -176,7 +178,7 @@
           <p:cNvPr id="3" name="Subtitle 2">
             <a:extLst>
               <a:ext uri="{FF2B5EF4-FFF2-40B4-BE49-F238E27FC236}">
-                <a16:creationId xmlns:a16="http://schemas.microsoft.com/office/drawing/2014/main" id="{A5FDE527-E621-4639-A0C7-E1E9B0DFBCEC}"/>
+                <a16:creationId xmlns:a16="http://schemas.microsoft.com/office/drawing/2014/main" xmlns="" id="{A5FDE527-E621-4639-A0C7-E1E9B0DFBCEC}"/>
               </a:ext>
             </a:extLst>
           </p:cNvPr>
@@ -246,7 +248,7 @@
           <p:cNvPr id="4" name="Date Placeholder 3">
             <a:extLst>
               <a:ext uri="{FF2B5EF4-FFF2-40B4-BE49-F238E27FC236}">
-                <a16:creationId xmlns:a16="http://schemas.microsoft.com/office/drawing/2014/main" id="{E109CE88-B989-4109-89C8-36F7C245DB1C}"/>
+                <a16:creationId xmlns:a16="http://schemas.microsoft.com/office/drawing/2014/main" xmlns="" id="{E109CE88-B989-4109-89C8-36F7C245DB1C}"/>
               </a:ext>
             </a:extLst>
           </p:cNvPr>
@@ -264,7 +266,7 @@
           <a:p>
             <a:fld id="{6C733091-19F0-4DD7-90FE-000B4789B4CF}" type="datetimeFigureOut">
               <a:rPr lang="en-US" smtClean="0"/>
-              <a:t>8/31/2021</a:t>
+              <a:t>9/2/2021</a:t>
             </a:fld>
             <a:endParaRPr lang="en-US"/>
           </a:p>
@@ -275,7 +277,7 @@
           <p:cNvPr id="5" name="Footer Placeholder 4">
             <a:extLst>
               <a:ext uri="{FF2B5EF4-FFF2-40B4-BE49-F238E27FC236}">
-                <a16:creationId xmlns:a16="http://schemas.microsoft.com/office/drawing/2014/main" id="{0841498F-B991-43D3-B408-CC35D8EFCF37}"/>
+                <a16:creationId xmlns:a16="http://schemas.microsoft.com/office/drawing/2014/main" xmlns="" id="{0841498F-B991-43D3-B408-CC35D8EFCF37}"/>
               </a:ext>
             </a:extLst>
           </p:cNvPr>
@@ -300,7 +302,7 @@
           <p:cNvPr id="6" name="Slide Number Placeholder 5">
             <a:extLst>
               <a:ext uri="{FF2B5EF4-FFF2-40B4-BE49-F238E27FC236}">
-                <a16:creationId xmlns:a16="http://schemas.microsoft.com/office/drawing/2014/main" id="{01754CB8-17B1-45A0-AE7D-755EAA1B69D8}"/>
+                <a16:creationId xmlns:a16="http://schemas.microsoft.com/office/drawing/2014/main" xmlns="" id="{01754CB8-17B1-45A0-AE7D-755EAA1B69D8}"/>
               </a:ext>
             </a:extLst>
           </p:cNvPr>
@@ -359,7 +361,7 @@
           <p:cNvPr id="2" name="Title 1">
             <a:extLst>
               <a:ext uri="{FF2B5EF4-FFF2-40B4-BE49-F238E27FC236}">
-                <a16:creationId xmlns:a16="http://schemas.microsoft.com/office/drawing/2014/main" id="{E7A7B055-5DC2-440D-83C1-CAAE8E9A8E14}"/>
+                <a16:creationId xmlns:a16="http://schemas.microsoft.com/office/drawing/2014/main" xmlns="" id="{E7A7B055-5DC2-440D-83C1-CAAE8E9A8E14}"/>
               </a:ext>
             </a:extLst>
           </p:cNvPr>
@@ -387,7 +389,7 @@
           <p:cNvPr id="3" name="Vertical Text Placeholder 2">
             <a:extLst>
               <a:ext uri="{FF2B5EF4-FFF2-40B4-BE49-F238E27FC236}">
-                <a16:creationId xmlns:a16="http://schemas.microsoft.com/office/drawing/2014/main" id="{65710707-423D-4F9D-A49D-6C764C562553}"/>
+                <a16:creationId xmlns:a16="http://schemas.microsoft.com/office/drawing/2014/main" xmlns="" id="{65710707-423D-4F9D-A49D-6C764C562553}"/>
               </a:ext>
             </a:extLst>
           </p:cNvPr>
@@ -444,7 +446,7 @@
           <p:cNvPr id="4" name="Date Placeholder 3">
             <a:extLst>
               <a:ext uri="{FF2B5EF4-FFF2-40B4-BE49-F238E27FC236}">
-                <a16:creationId xmlns:a16="http://schemas.microsoft.com/office/drawing/2014/main" id="{98B6F7EF-D1BE-4437-85F3-99626E37E4EF}"/>
+                <a16:creationId xmlns:a16="http://schemas.microsoft.com/office/drawing/2014/main" xmlns="" id="{98B6F7EF-D1BE-4437-85F3-99626E37E4EF}"/>
               </a:ext>
             </a:extLst>
           </p:cNvPr>
@@ -462,7 +464,7 @@
           <a:p>
             <a:fld id="{6C733091-19F0-4DD7-90FE-000B4789B4CF}" type="datetimeFigureOut">
               <a:rPr lang="en-US" smtClean="0"/>
-              <a:t>8/31/2021</a:t>
+              <a:t>9/2/2021</a:t>
             </a:fld>
             <a:endParaRPr lang="en-US"/>
           </a:p>
@@ -473,7 +475,7 @@
           <p:cNvPr id="5" name="Footer Placeholder 4">
             <a:extLst>
               <a:ext uri="{FF2B5EF4-FFF2-40B4-BE49-F238E27FC236}">
-                <a16:creationId xmlns:a16="http://schemas.microsoft.com/office/drawing/2014/main" id="{D890AA9B-E479-4209-B245-83608F3D4013}"/>
+                <a16:creationId xmlns:a16="http://schemas.microsoft.com/office/drawing/2014/main" xmlns="" id="{D890AA9B-E479-4209-B245-83608F3D4013}"/>
               </a:ext>
             </a:extLst>
           </p:cNvPr>
@@ -498,7 +500,7 @@
           <p:cNvPr id="6" name="Slide Number Placeholder 5">
             <a:extLst>
               <a:ext uri="{FF2B5EF4-FFF2-40B4-BE49-F238E27FC236}">
-                <a16:creationId xmlns:a16="http://schemas.microsoft.com/office/drawing/2014/main" id="{0E4976E4-E15A-4296-A430-633D2BB9142B}"/>
+                <a16:creationId xmlns:a16="http://schemas.microsoft.com/office/drawing/2014/main" xmlns="" id="{0E4976E4-E15A-4296-A430-633D2BB9142B}"/>
               </a:ext>
             </a:extLst>
           </p:cNvPr>
@@ -557,7 +559,7 @@
           <p:cNvPr id="2" name="Vertical Title 1">
             <a:extLst>
               <a:ext uri="{FF2B5EF4-FFF2-40B4-BE49-F238E27FC236}">
-                <a16:creationId xmlns:a16="http://schemas.microsoft.com/office/drawing/2014/main" id="{66F63CF5-8DEE-4BB2-A2A5-5C16FEBE1AD5}"/>
+                <a16:creationId xmlns:a16="http://schemas.microsoft.com/office/drawing/2014/main" xmlns="" id="{66F63CF5-8DEE-4BB2-A2A5-5C16FEBE1AD5}"/>
               </a:ext>
             </a:extLst>
           </p:cNvPr>
@@ -590,7 +592,7 @@
           <p:cNvPr id="3" name="Vertical Text Placeholder 2">
             <a:extLst>
               <a:ext uri="{FF2B5EF4-FFF2-40B4-BE49-F238E27FC236}">
-                <a16:creationId xmlns:a16="http://schemas.microsoft.com/office/drawing/2014/main" id="{E0D5EBA5-94AF-4373-B032-A40FF73C7575}"/>
+                <a16:creationId xmlns:a16="http://schemas.microsoft.com/office/drawing/2014/main" xmlns="" id="{E0D5EBA5-94AF-4373-B032-A40FF73C7575}"/>
               </a:ext>
             </a:extLst>
           </p:cNvPr>
@@ -652,7 +654,7 @@
           <p:cNvPr id="4" name="Date Placeholder 3">
             <a:extLst>
               <a:ext uri="{FF2B5EF4-FFF2-40B4-BE49-F238E27FC236}">
-                <a16:creationId xmlns:a16="http://schemas.microsoft.com/office/drawing/2014/main" id="{7426B8E1-6758-4F5E-B618-96641332600B}"/>
+                <a16:creationId xmlns:a16="http://schemas.microsoft.com/office/drawing/2014/main" xmlns="" id="{7426B8E1-6758-4F5E-B618-96641332600B}"/>
               </a:ext>
             </a:extLst>
           </p:cNvPr>
@@ -670,7 +672,7 @@
           <a:p>
             <a:fld id="{6C733091-19F0-4DD7-90FE-000B4789B4CF}" type="datetimeFigureOut">
               <a:rPr lang="en-US" smtClean="0"/>
-              <a:t>8/31/2021</a:t>
+              <a:t>9/2/2021</a:t>
             </a:fld>
             <a:endParaRPr lang="en-US"/>
           </a:p>
@@ -681,7 +683,7 @@
           <p:cNvPr id="5" name="Footer Placeholder 4">
             <a:extLst>
               <a:ext uri="{FF2B5EF4-FFF2-40B4-BE49-F238E27FC236}">
-                <a16:creationId xmlns:a16="http://schemas.microsoft.com/office/drawing/2014/main" id="{F65E330E-2A7E-482D-AE0F-70EA5A29958B}"/>
+                <a16:creationId xmlns:a16="http://schemas.microsoft.com/office/drawing/2014/main" xmlns="" id="{F65E330E-2A7E-482D-AE0F-70EA5A29958B}"/>
               </a:ext>
             </a:extLst>
           </p:cNvPr>
@@ -706,7 +708,7 @@
           <p:cNvPr id="6" name="Slide Number Placeholder 5">
             <a:extLst>
               <a:ext uri="{FF2B5EF4-FFF2-40B4-BE49-F238E27FC236}">
-                <a16:creationId xmlns:a16="http://schemas.microsoft.com/office/drawing/2014/main" id="{B8000005-FC38-4A6C-9D09-7945EFA08160}"/>
+                <a16:creationId xmlns:a16="http://schemas.microsoft.com/office/drawing/2014/main" xmlns="" id="{B8000005-FC38-4A6C-9D09-7945EFA08160}"/>
               </a:ext>
             </a:extLst>
           </p:cNvPr>
@@ -765,7 +767,7 @@
           <p:cNvPr id="2" name="Title 1">
             <a:extLst>
               <a:ext uri="{FF2B5EF4-FFF2-40B4-BE49-F238E27FC236}">
-                <a16:creationId xmlns:a16="http://schemas.microsoft.com/office/drawing/2014/main" id="{91D0002C-766B-44B4-A24C-BE6DE6C7BA4C}"/>
+                <a16:creationId xmlns:a16="http://schemas.microsoft.com/office/drawing/2014/main" xmlns="" id="{91D0002C-766B-44B4-A24C-BE6DE6C7BA4C}"/>
               </a:ext>
             </a:extLst>
           </p:cNvPr>
@@ -793,7 +795,7 @@
           <p:cNvPr id="3" name="Content Placeholder 2">
             <a:extLst>
               <a:ext uri="{FF2B5EF4-FFF2-40B4-BE49-F238E27FC236}">
-                <a16:creationId xmlns:a16="http://schemas.microsoft.com/office/drawing/2014/main" id="{3455BAA9-6C7B-4874-AD76-BD466F64802D}"/>
+                <a16:creationId xmlns:a16="http://schemas.microsoft.com/office/drawing/2014/main" xmlns="" id="{3455BAA9-6C7B-4874-AD76-BD466F64802D}"/>
               </a:ext>
             </a:extLst>
           </p:cNvPr>
@@ -850,7 +852,7 @@
           <p:cNvPr id="4" name="Date Placeholder 3">
             <a:extLst>
               <a:ext uri="{FF2B5EF4-FFF2-40B4-BE49-F238E27FC236}">
-                <a16:creationId xmlns:a16="http://schemas.microsoft.com/office/drawing/2014/main" id="{8776BDAF-D8F2-4A61-904D-094BB4545702}"/>
+                <a16:creationId xmlns:a16="http://schemas.microsoft.com/office/drawing/2014/main" xmlns="" id="{8776BDAF-D8F2-4A61-904D-094BB4545702}"/>
               </a:ext>
             </a:extLst>
           </p:cNvPr>
@@ -868,7 +870,7 @@
           <a:p>
             <a:fld id="{6C733091-19F0-4DD7-90FE-000B4789B4CF}" type="datetimeFigureOut">
               <a:rPr lang="en-US" smtClean="0"/>
-              <a:t>8/31/2021</a:t>
+              <a:t>9/2/2021</a:t>
             </a:fld>
             <a:endParaRPr lang="en-US"/>
           </a:p>
@@ -879,7 +881,7 @@
           <p:cNvPr id="5" name="Footer Placeholder 4">
             <a:extLst>
               <a:ext uri="{FF2B5EF4-FFF2-40B4-BE49-F238E27FC236}">
-                <a16:creationId xmlns:a16="http://schemas.microsoft.com/office/drawing/2014/main" id="{F89C5665-4384-4706-9BD2-9F42B05C96BC}"/>
+                <a16:creationId xmlns:a16="http://schemas.microsoft.com/office/drawing/2014/main" xmlns="" id="{F89C5665-4384-4706-9BD2-9F42B05C96BC}"/>
               </a:ext>
             </a:extLst>
           </p:cNvPr>
@@ -904,7 +906,7 @@
           <p:cNvPr id="6" name="Slide Number Placeholder 5">
             <a:extLst>
               <a:ext uri="{FF2B5EF4-FFF2-40B4-BE49-F238E27FC236}">
-                <a16:creationId xmlns:a16="http://schemas.microsoft.com/office/drawing/2014/main" id="{7DCAD73E-CAB3-4BA7-905E-D203691D0418}"/>
+                <a16:creationId xmlns:a16="http://schemas.microsoft.com/office/drawing/2014/main" xmlns="" id="{7DCAD73E-CAB3-4BA7-905E-D203691D0418}"/>
               </a:ext>
             </a:extLst>
           </p:cNvPr>
@@ -963,7 +965,7 @@
           <p:cNvPr id="2" name="Title 1">
             <a:extLst>
               <a:ext uri="{FF2B5EF4-FFF2-40B4-BE49-F238E27FC236}">
-                <a16:creationId xmlns:a16="http://schemas.microsoft.com/office/drawing/2014/main" id="{A9880706-F7FA-4EC3-A022-9D6C7CEC3692}"/>
+                <a16:creationId xmlns:a16="http://schemas.microsoft.com/office/drawing/2014/main" xmlns="" id="{A9880706-F7FA-4EC3-A022-9D6C7CEC3692}"/>
               </a:ext>
             </a:extLst>
           </p:cNvPr>
@@ -1000,7 +1002,7 @@
           <p:cNvPr id="3" name="Text Placeholder 2">
             <a:extLst>
               <a:ext uri="{FF2B5EF4-FFF2-40B4-BE49-F238E27FC236}">
-                <a16:creationId xmlns:a16="http://schemas.microsoft.com/office/drawing/2014/main" id="{FA8A65D0-3DF5-448D-82EC-A967682A0DED}"/>
+                <a16:creationId xmlns:a16="http://schemas.microsoft.com/office/drawing/2014/main" xmlns="" id="{FA8A65D0-3DF5-448D-82EC-A967682A0DED}"/>
               </a:ext>
             </a:extLst>
           </p:cNvPr>
@@ -1125,7 +1127,7 @@
           <p:cNvPr id="4" name="Date Placeholder 3">
             <a:extLst>
               <a:ext uri="{FF2B5EF4-FFF2-40B4-BE49-F238E27FC236}">
-                <a16:creationId xmlns:a16="http://schemas.microsoft.com/office/drawing/2014/main" id="{600EA68C-01A6-487D-9D6E-1D1B4EAC0440}"/>
+                <a16:creationId xmlns:a16="http://schemas.microsoft.com/office/drawing/2014/main" xmlns="" id="{600EA68C-01A6-487D-9D6E-1D1B4EAC0440}"/>
               </a:ext>
             </a:extLst>
           </p:cNvPr>
@@ -1143,7 +1145,7 @@
           <a:p>
             <a:fld id="{6C733091-19F0-4DD7-90FE-000B4789B4CF}" type="datetimeFigureOut">
               <a:rPr lang="en-US" smtClean="0"/>
-              <a:t>8/31/2021</a:t>
+              <a:t>9/2/2021</a:t>
             </a:fld>
             <a:endParaRPr lang="en-US"/>
           </a:p>
@@ -1154,7 +1156,7 @@
           <p:cNvPr id="5" name="Footer Placeholder 4">
             <a:extLst>
               <a:ext uri="{FF2B5EF4-FFF2-40B4-BE49-F238E27FC236}">
-                <a16:creationId xmlns:a16="http://schemas.microsoft.com/office/drawing/2014/main" id="{6E6527CB-4FFD-4569-A82C-5EDC311B2CF6}"/>
+                <a16:creationId xmlns:a16="http://schemas.microsoft.com/office/drawing/2014/main" xmlns="" id="{6E6527CB-4FFD-4569-A82C-5EDC311B2CF6}"/>
               </a:ext>
             </a:extLst>
           </p:cNvPr>
@@ -1179,7 +1181,7 @@
           <p:cNvPr id="6" name="Slide Number Placeholder 5">
             <a:extLst>
               <a:ext uri="{FF2B5EF4-FFF2-40B4-BE49-F238E27FC236}">
-                <a16:creationId xmlns:a16="http://schemas.microsoft.com/office/drawing/2014/main" id="{24B19E5B-5A98-4381-A01D-01F81FD65792}"/>
+                <a16:creationId xmlns:a16="http://schemas.microsoft.com/office/drawing/2014/main" xmlns="" id="{24B19E5B-5A98-4381-A01D-01F81FD65792}"/>
               </a:ext>
             </a:extLst>
           </p:cNvPr>
@@ -1238,7 +1240,7 @@
           <p:cNvPr id="2" name="Title 1">
             <a:extLst>
               <a:ext uri="{FF2B5EF4-FFF2-40B4-BE49-F238E27FC236}">
-                <a16:creationId xmlns:a16="http://schemas.microsoft.com/office/drawing/2014/main" id="{63228B71-E923-4431-B8D2-FAE724678940}"/>
+                <a16:creationId xmlns:a16="http://schemas.microsoft.com/office/drawing/2014/main" xmlns="" id="{63228B71-E923-4431-B8D2-FAE724678940}"/>
               </a:ext>
             </a:extLst>
           </p:cNvPr>
@@ -1266,7 +1268,7 @@
           <p:cNvPr id="3" name="Content Placeholder 2">
             <a:extLst>
               <a:ext uri="{FF2B5EF4-FFF2-40B4-BE49-F238E27FC236}">
-                <a16:creationId xmlns:a16="http://schemas.microsoft.com/office/drawing/2014/main" id="{B18895E9-B7FF-4A00-955B-206CF8C73E43}"/>
+                <a16:creationId xmlns:a16="http://schemas.microsoft.com/office/drawing/2014/main" xmlns="" id="{B18895E9-B7FF-4A00-955B-206CF8C73E43}"/>
               </a:ext>
             </a:extLst>
           </p:cNvPr>
@@ -1328,7 +1330,7 @@
           <p:cNvPr id="4" name="Content Placeholder 3">
             <a:extLst>
               <a:ext uri="{FF2B5EF4-FFF2-40B4-BE49-F238E27FC236}">
-                <a16:creationId xmlns:a16="http://schemas.microsoft.com/office/drawing/2014/main" id="{DA813955-E3B9-44BC-8E1D-139269C8B48A}"/>
+                <a16:creationId xmlns:a16="http://schemas.microsoft.com/office/drawing/2014/main" xmlns="" id="{DA813955-E3B9-44BC-8E1D-139269C8B48A}"/>
               </a:ext>
             </a:extLst>
           </p:cNvPr>
@@ -1390,7 +1392,7 @@
           <p:cNvPr id="5" name="Date Placeholder 4">
             <a:extLst>
               <a:ext uri="{FF2B5EF4-FFF2-40B4-BE49-F238E27FC236}">
-                <a16:creationId xmlns:a16="http://schemas.microsoft.com/office/drawing/2014/main" id="{7E9B8EF5-28D5-4C4E-A2AB-EEA30D75DAFE}"/>
+                <a16:creationId xmlns:a16="http://schemas.microsoft.com/office/drawing/2014/main" xmlns="" id="{7E9B8EF5-28D5-4C4E-A2AB-EEA30D75DAFE}"/>
               </a:ext>
             </a:extLst>
           </p:cNvPr>
@@ -1408,7 +1410,7 @@
           <a:p>
             <a:fld id="{6C733091-19F0-4DD7-90FE-000B4789B4CF}" type="datetimeFigureOut">
               <a:rPr lang="en-US" smtClean="0"/>
-              <a:t>8/31/2021</a:t>
+              <a:t>9/2/2021</a:t>
             </a:fld>
             <a:endParaRPr lang="en-US"/>
           </a:p>
@@ -1419,7 +1421,7 @@
           <p:cNvPr id="6" name="Footer Placeholder 5">
             <a:extLst>
               <a:ext uri="{FF2B5EF4-FFF2-40B4-BE49-F238E27FC236}">
-                <a16:creationId xmlns:a16="http://schemas.microsoft.com/office/drawing/2014/main" id="{5723E678-8CB4-4335-AA04-6BD391748717}"/>
+                <a16:creationId xmlns:a16="http://schemas.microsoft.com/office/drawing/2014/main" xmlns="" id="{5723E678-8CB4-4335-AA04-6BD391748717}"/>
               </a:ext>
             </a:extLst>
           </p:cNvPr>
@@ -1444,7 +1446,7 @@
           <p:cNvPr id="7" name="Slide Number Placeholder 6">
             <a:extLst>
               <a:ext uri="{FF2B5EF4-FFF2-40B4-BE49-F238E27FC236}">
-                <a16:creationId xmlns:a16="http://schemas.microsoft.com/office/drawing/2014/main" id="{887B5567-9F4D-4AE1-92D8-769C9F7EA4F0}"/>
+                <a16:creationId xmlns:a16="http://schemas.microsoft.com/office/drawing/2014/main" xmlns="" id="{887B5567-9F4D-4AE1-92D8-769C9F7EA4F0}"/>
               </a:ext>
             </a:extLst>
           </p:cNvPr>
@@ -1503,7 +1505,7 @@
           <p:cNvPr id="2" name="Title 1">
             <a:extLst>
               <a:ext uri="{FF2B5EF4-FFF2-40B4-BE49-F238E27FC236}">
-                <a16:creationId xmlns:a16="http://schemas.microsoft.com/office/drawing/2014/main" id="{A40320A9-7C0C-45B4-BF2B-3B53B5686EBB}"/>
+                <a16:creationId xmlns:a16="http://schemas.microsoft.com/office/drawing/2014/main" xmlns="" id="{A40320A9-7C0C-45B4-BF2B-3B53B5686EBB}"/>
               </a:ext>
             </a:extLst>
           </p:cNvPr>
@@ -1536,7 +1538,7 @@
           <p:cNvPr id="3" name="Text Placeholder 2">
             <a:extLst>
               <a:ext uri="{FF2B5EF4-FFF2-40B4-BE49-F238E27FC236}">
-                <a16:creationId xmlns:a16="http://schemas.microsoft.com/office/drawing/2014/main" id="{8C440DE1-7DD6-4B1C-B961-CD2079B51F03}"/>
+                <a16:creationId xmlns:a16="http://schemas.microsoft.com/office/drawing/2014/main" xmlns="" id="{8C440DE1-7DD6-4B1C-B961-CD2079B51F03}"/>
               </a:ext>
             </a:extLst>
           </p:cNvPr>
@@ -1607,7 +1609,7 @@
           <p:cNvPr id="4" name="Content Placeholder 3">
             <a:extLst>
               <a:ext uri="{FF2B5EF4-FFF2-40B4-BE49-F238E27FC236}">
-                <a16:creationId xmlns:a16="http://schemas.microsoft.com/office/drawing/2014/main" id="{6FAFE840-CC9A-4D89-B05F-159EF756B427}"/>
+                <a16:creationId xmlns:a16="http://schemas.microsoft.com/office/drawing/2014/main" xmlns="" id="{6FAFE840-CC9A-4D89-B05F-159EF756B427}"/>
               </a:ext>
             </a:extLst>
           </p:cNvPr>
@@ -1669,7 +1671,7 @@
           <p:cNvPr id="5" name="Text Placeholder 4">
             <a:extLst>
               <a:ext uri="{FF2B5EF4-FFF2-40B4-BE49-F238E27FC236}">
-                <a16:creationId xmlns:a16="http://schemas.microsoft.com/office/drawing/2014/main" id="{4B87AADC-3401-48C6-98F6-0AB60F6DF9BE}"/>
+                <a16:creationId xmlns:a16="http://schemas.microsoft.com/office/drawing/2014/main" xmlns="" id="{4B87AADC-3401-48C6-98F6-0AB60F6DF9BE}"/>
               </a:ext>
             </a:extLst>
           </p:cNvPr>
@@ -1740,7 +1742,7 @@
           <p:cNvPr id="6" name="Content Placeholder 5">
             <a:extLst>
               <a:ext uri="{FF2B5EF4-FFF2-40B4-BE49-F238E27FC236}">
-                <a16:creationId xmlns:a16="http://schemas.microsoft.com/office/drawing/2014/main" id="{34BCF1A4-FB52-4DCD-80BC-324BA41C33CD}"/>
+                <a16:creationId xmlns:a16="http://schemas.microsoft.com/office/drawing/2014/main" xmlns="" id="{34BCF1A4-FB52-4DCD-80BC-324BA41C33CD}"/>
               </a:ext>
             </a:extLst>
           </p:cNvPr>
@@ -1802,7 +1804,7 @@
           <p:cNvPr id="7" name="Date Placeholder 6">
             <a:extLst>
               <a:ext uri="{FF2B5EF4-FFF2-40B4-BE49-F238E27FC236}">
-                <a16:creationId xmlns:a16="http://schemas.microsoft.com/office/drawing/2014/main" id="{8CFD4208-60E7-48B1-8CD0-717D5E26B827}"/>
+                <a16:creationId xmlns:a16="http://schemas.microsoft.com/office/drawing/2014/main" xmlns="" id="{8CFD4208-60E7-48B1-8CD0-717D5E26B827}"/>
               </a:ext>
             </a:extLst>
           </p:cNvPr>
@@ -1820,7 +1822,7 @@
           <a:p>
             <a:fld id="{6C733091-19F0-4DD7-90FE-000B4789B4CF}" type="datetimeFigureOut">
               <a:rPr lang="en-US" smtClean="0"/>
-              <a:t>8/31/2021</a:t>
+              <a:t>9/2/2021</a:t>
             </a:fld>
             <a:endParaRPr lang="en-US"/>
           </a:p>
@@ -1831,7 +1833,7 @@
           <p:cNvPr id="8" name="Footer Placeholder 7">
             <a:extLst>
               <a:ext uri="{FF2B5EF4-FFF2-40B4-BE49-F238E27FC236}">
-                <a16:creationId xmlns:a16="http://schemas.microsoft.com/office/drawing/2014/main" id="{94E429D1-BEB1-4D8A-91F2-CD4F80157F8D}"/>
+                <a16:creationId xmlns:a16="http://schemas.microsoft.com/office/drawing/2014/main" xmlns="" id="{94E429D1-BEB1-4D8A-91F2-CD4F80157F8D}"/>
               </a:ext>
             </a:extLst>
           </p:cNvPr>
@@ -1856,7 +1858,7 @@
           <p:cNvPr id="9" name="Slide Number Placeholder 8">
             <a:extLst>
               <a:ext uri="{FF2B5EF4-FFF2-40B4-BE49-F238E27FC236}">
-                <a16:creationId xmlns:a16="http://schemas.microsoft.com/office/drawing/2014/main" id="{6F17C19C-8370-4118-A8FC-5DDA6F84230F}"/>
+                <a16:creationId xmlns:a16="http://schemas.microsoft.com/office/drawing/2014/main" xmlns="" id="{6F17C19C-8370-4118-A8FC-5DDA6F84230F}"/>
               </a:ext>
             </a:extLst>
           </p:cNvPr>
@@ -1915,7 +1917,7 @@
           <p:cNvPr id="2" name="Title 1">
             <a:extLst>
               <a:ext uri="{FF2B5EF4-FFF2-40B4-BE49-F238E27FC236}">
-                <a16:creationId xmlns:a16="http://schemas.microsoft.com/office/drawing/2014/main" id="{252CBF36-7F99-45A9-BC35-BD2EC260CBF0}"/>
+                <a16:creationId xmlns:a16="http://schemas.microsoft.com/office/drawing/2014/main" xmlns="" id="{252CBF36-7F99-45A9-BC35-BD2EC260CBF0}"/>
               </a:ext>
             </a:extLst>
           </p:cNvPr>
@@ -1943,7 +1945,7 @@
           <p:cNvPr id="3" name="Date Placeholder 2">
             <a:extLst>
               <a:ext uri="{FF2B5EF4-FFF2-40B4-BE49-F238E27FC236}">
-                <a16:creationId xmlns:a16="http://schemas.microsoft.com/office/drawing/2014/main" id="{0D6F5F83-F07E-4501-B86B-9F96CD43993C}"/>
+                <a16:creationId xmlns:a16="http://schemas.microsoft.com/office/drawing/2014/main" xmlns="" id="{0D6F5F83-F07E-4501-B86B-9F96CD43993C}"/>
               </a:ext>
             </a:extLst>
           </p:cNvPr>
@@ -1961,7 +1963,7 @@
           <a:p>
             <a:fld id="{6C733091-19F0-4DD7-90FE-000B4789B4CF}" type="datetimeFigureOut">
               <a:rPr lang="en-US" smtClean="0"/>
-              <a:t>8/31/2021</a:t>
+              <a:t>9/2/2021</a:t>
             </a:fld>
             <a:endParaRPr lang="en-US"/>
           </a:p>
@@ -1972,7 +1974,7 @@
           <p:cNvPr id="4" name="Footer Placeholder 3">
             <a:extLst>
               <a:ext uri="{FF2B5EF4-FFF2-40B4-BE49-F238E27FC236}">
-                <a16:creationId xmlns:a16="http://schemas.microsoft.com/office/drawing/2014/main" id="{2861989B-F8E9-41FD-8E16-687424BCC266}"/>
+                <a16:creationId xmlns:a16="http://schemas.microsoft.com/office/drawing/2014/main" xmlns="" id="{2861989B-F8E9-41FD-8E16-687424BCC266}"/>
               </a:ext>
             </a:extLst>
           </p:cNvPr>
@@ -1997,7 +1999,7 @@
           <p:cNvPr id="5" name="Slide Number Placeholder 4">
             <a:extLst>
               <a:ext uri="{FF2B5EF4-FFF2-40B4-BE49-F238E27FC236}">
-                <a16:creationId xmlns:a16="http://schemas.microsoft.com/office/drawing/2014/main" id="{2026B6D7-7832-4815-95CE-5CEC39502825}"/>
+                <a16:creationId xmlns:a16="http://schemas.microsoft.com/office/drawing/2014/main" xmlns="" id="{2026B6D7-7832-4815-95CE-5CEC39502825}"/>
               </a:ext>
             </a:extLst>
           </p:cNvPr>
@@ -2056,7 +2058,7 @@
           <p:cNvPr id="2" name="Date Placeholder 1">
             <a:extLst>
               <a:ext uri="{FF2B5EF4-FFF2-40B4-BE49-F238E27FC236}">
-                <a16:creationId xmlns:a16="http://schemas.microsoft.com/office/drawing/2014/main" id="{9877919A-C4B6-46FD-A08A-9A4B867FE01A}"/>
+                <a16:creationId xmlns:a16="http://schemas.microsoft.com/office/drawing/2014/main" xmlns="" id="{9877919A-C4B6-46FD-A08A-9A4B867FE01A}"/>
               </a:ext>
             </a:extLst>
           </p:cNvPr>
@@ -2074,7 +2076,7 @@
           <a:p>
             <a:fld id="{6C733091-19F0-4DD7-90FE-000B4789B4CF}" type="datetimeFigureOut">
               <a:rPr lang="en-US" smtClean="0"/>
-              <a:t>8/31/2021</a:t>
+              <a:t>9/2/2021</a:t>
             </a:fld>
             <a:endParaRPr lang="en-US"/>
           </a:p>
@@ -2085,7 +2087,7 @@
           <p:cNvPr id="3" name="Footer Placeholder 2">
             <a:extLst>
               <a:ext uri="{FF2B5EF4-FFF2-40B4-BE49-F238E27FC236}">
-                <a16:creationId xmlns:a16="http://schemas.microsoft.com/office/drawing/2014/main" id="{9118539E-383C-4F1C-86F2-14C533A7E9FB}"/>
+                <a16:creationId xmlns:a16="http://schemas.microsoft.com/office/drawing/2014/main" xmlns="" id="{9118539E-383C-4F1C-86F2-14C533A7E9FB}"/>
               </a:ext>
             </a:extLst>
           </p:cNvPr>
@@ -2110,7 +2112,7 @@
           <p:cNvPr id="4" name="Slide Number Placeholder 3">
             <a:extLst>
               <a:ext uri="{FF2B5EF4-FFF2-40B4-BE49-F238E27FC236}">
-                <a16:creationId xmlns:a16="http://schemas.microsoft.com/office/drawing/2014/main" id="{C9A6D4E1-CA83-4214-9942-9E4617AA89BF}"/>
+                <a16:creationId xmlns:a16="http://schemas.microsoft.com/office/drawing/2014/main" xmlns="" id="{C9A6D4E1-CA83-4214-9942-9E4617AA89BF}"/>
               </a:ext>
             </a:extLst>
           </p:cNvPr>
@@ -2169,7 +2171,7 @@
           <p:cNvPr id="2" name="Title 1">
             <a:extLst>
               <a:ext uri="{FF2B5EF4-FFF2-40B4-BE49-F238E27FC236}">
-                <a16:creationId xmlns:a16="http://schemas.microsoft.com/office/drawing/2014/main" id="{046EF9B5-7A2A-4225-8817-86D028D6950C}"/>
+                <a16:creationId xmlns:a16="http://schemas.microsoft.com/office/drawing/2014/main" xmlns="" id="{046EF9B5-7A2A-4225-8817-86D028D6950C}"/>
               </a:ext>
             </a:extLst>
           </p:cNvPr>
@@ -2206,7 +2208,7 @@
           <p:cNvPr id="3" name="Content Placeholder 2">
             <a:extLst>
               <a:ext uri="{FF2B5EF4-FFF2-40B4-BE49-F238E27FC236}">
-                <a16:creationId xmlns:a16="http://schemas.microsoft.com/office/drawing/2014/main" id="{8667C390-5297-41E8-A403-22856007B051}"/>
+                <a16:creationId xmlns:a16="http://schemas.microsoft.com/office/drawing/2014/main" xmlns="" id="{8667C390-5297-41E8-A403-22856007B051}"/>
               </a:ext>
             </a:extLst>
           </p:cNvPr>
@@ -2296,7 +2298,7 @@
           <p:cNvPr id="4" name="Text Placeholder 3">
             <a:extLst>
               <a:ext uri="{FF2B5EF4-FFF2-40B4-BE49-F238E27FC236}">
-                <a16:creationId xmlns:a16="http://schemas.microsoft.com/office/drawing/2014/main" id="{8D0D2F7D-D6CD-4AB1-A3EA-CBFD2A2B3703}"/>
+                <a16:creationId xmlns:a16="http://schemas.microsoft.com/office/drawing/2014/main" xmlns="" id="{8D0D2F7D-D6CD-4AB1-A3EA-CBFD2A2B3703}"/>
               </a:ext>
             </a:extLst>
           </p:cNvPr>
@@ -2367,7 +2369,7 @@
           <p:cNvPr id="5" name="Date Placeholder 4">
             <a:extLst>
               <a:ext uri="{FF2B5EF4-FFF2-40B4-BE49-F238E27FC236}">
-                <a16:creationId xmlns:a16="http://schemas.microsoft.com/office/drawing/2014/main" id="{E17A441D-4FA7-4110-BF24-165CD3C3DAD7}"/>
+                <a16:creationId xmlns:a16="http://schemas.microsoft.com/office/drawing/2014/main" xmlns="" id="{E17A441D-4FA7-4110-BF24-165CD3C3DAD7}"/>
               </a:ext>
             </a:extLst>
           </p:cNvPr>
@@ -2385,7 +2387,7 @@
           <a:p>
             <a:fld id="{6C733091-19F0-4DD7-90FE-000B4789B4CF}" type="datetimeFigureOut">
               <a:rPr lang="en-US" smtClean="0"/>
-              <a:t>8/31/2021</a:t>
+              <a:t>9/2/2021</a:t>
             </a:fld>
             <a:endParaRPr lang="en-US"/>
           </a:p>
@@ -2396,7 +2398,7 @@
           <p:cNvPr id="6" name="Footer Placeholder 5">
             <a:extLst>
               <a:ext uri="{FF2B5EF4-FFF2-40B4-BE49-F238E27FC236}">
-                <a16:creationId xmlns:a16="http://schemas.microsoft.com/office/drawing/2014/main" id="{346102C5-5AE3-43CF-A686-1AB72B0790AB}"/>
+                <a16:creationId xmlns:a16="http://schemas.microsoft.com/office/drawing/2014/main" xmlns="" id="{346102C5-5AE3-43CF-A686-1AB72B0790AB}"/>
               </a:ext>
             </a:extLst>
           </p:cNvPr>
@@ -2421,7 +2423,7 @@
           <p:cNvPr id="7" name="Slide Number Placeholder 6">
             <a:extLst>
               <a:ext uri="{FF2B5EF4-FFF2-40B4-BE49-F238E27FC236}">
-                <a16:creationId xmlns:a16="http://schemas.microsoft.com/office/drawing/2014/main" id="{5528B3F7-462C-4500-8836-B3E5CD8DA61A}"/>
+                <a16:creationId xmlns:a16="http://schemas.microsoft.com/office/drawing/2014/main" xmlns="" id="{5528B3F7-462C-4500-8836-B3E5CD8DA61A}"/>
               </a:ext>
             </a:extLst>
           </p:cNvPr>
@@ -2480,7 +2482,7 @@
           <p:cNvPr id="2" name="Title 1">
             <a:extLst>
               <a:ext uri="{FF2B5EF4-FFF2-40B4-BE49-F238E27FC236}">
-                <a16:creationId xmlns:a16="http://schemas.microsoft.com/office/drawing/2014/main" id="{4BA10E59-DA48-4690-A956-9EB8E4E11EE5}"/>
+                <a16:creationId xmlns:a16="http://schemas.microsoft.com/office/drawing/2014/main" xmlns="" id="{4BA10E59-DA48-4690-A956-9EB8E4E11EE5}"/>
               </a:ext>
             </a:extLst>
           </p:cNvPr>
@@ -2517,7 +2519,7 @@
           <p:cNvPr id="3" name="Picture Placeholder 2">
             <a:extLst>
               <a:ext uri="{FF2B5EF4-FFF2-40B4-BE49-F238E27FC236}">
-                <a16:creationId xmlns:a16="http://schemas.microsoft.com/office/drawing/2014/main" id="{AC7AFE1E-67D1-4106-97CA-98302D42CC4D}"/>
+                <a16:creationId xmlns:a16="http://schemas.microsoft.com/office/drawing/2014/main" xmlns="" id="{AC7AFE1E-67D1-4106-97CA-98302D42CC4D}"/>
               </a:ext>
             </a:extLst>
           </p:cNvPr>
@@ -2584,7 +2586,7 @@
           <p:cNvPr id="4" name="Text Placeholder 3">
             <a:extLst>
               <a:ext uri="{FF2B5EF4-FFF2-40B4-BE49-F238E27FC236}">
-                <a16:creationId xmlns:a16="http://schemas.microsoft.com/office/drawing/2014/main" id="{67D8D73B-3D4D-42A7-9A3C-1D508E8A9B45}"/>
+                <a16:creationId xmlns:a16="http://schemas.microsoft.com/office/drawing/2014/main" xmlns="" id="{67D8D73B-3D4D-42A7-9A3C-1D508E8A9B45}"/>
               </a:ext>
             </a:extLst>
           </p:cNvPr>
@@ -2655,7 +2657,7 @@
           <p:cNvPr id="5" name="Date Placeholder 4">
             <a:extLst>
               <a:ext uri="{FF2B5EF4-FFF2-40B4-BE49-F238E27FC236}">
-                <a16:creationId xmlns:a16="http://schemas.microsoft.com/office/drawing/2014/main" id="{48C8945E-A47A-42A2-9DF6-CA6D5002F65F}"/>
+                <a16:creationId xmlns:a16="http://schemas.microsoft.com/office/drawing/2014/main" xmlns="" id="{48C8945E-A47A-42A2-9DF6-CA6D5002F65F}"/>
               </a:ext>
             </a:extLst>
           </p:cNvPr>
@@ -2673,7 +2675,7 @@
           <a:p>
             <a:fld id="{6C733091-19F0-4DD7-90FE-000B4789B4CF}" type="datetimeFigureOut">
               <a:rPr lang="en-US" smtClean="0"/>
-              <a:t>8/31/2021</a:t>
+              <a:t>9/2/2021</a:t>
             </a:fld>
             <a:endParaRPr lang="en-US"/>
           </a:p>
@@ -2684,7 +2686,7 @@
           <p:cNvPr id="6" name="Footer Placeholder 5">
             <a:extLst>
               <a:ext uri="{FF2B5EF4-FFF2-40B4-BE49-F238E27FC236}">
-                <a16:creationId xmlns:a16="http://schemas.microsoft.com/office/drawing/2014/main" id="{EB000DB4-2747-4297-B400-42A539FBDB42}"/>
+                <a16:creationId xmlns:a16="http://schemas.microsoft.com/office/drawing/2014/main" xmlns="" id="{EB000DB4-2747-4297-B400-42A539FBDB42}"/>
               </a:ext>
             </a:extLst>
           </p:cNvPr>
@@ -2709,7 +2711,7 @@
           <p:cNvPr id="7" name="Slide Number Placeholder 6">
             <a:extLst>
               <a:ext uri="{FF2B5EF4-FFF2-40B4-BE49-F238E27FC236}">
-                <a16:creationId xmlns:a16="http://schemas.microsoft.com/office/drawing/2014/main" id="{5BAD9222-F141-4803-AF73-E2DD92E2ABBC}"/>
+                <a16:creationId xmlns:a16="http://schemas.microsoft.com/office/drawing/2014/main" xmlns="" id="{5BAD9222-F141-4803-AF73-E2DD92E2ABBC}"/>
               </a:ext>
             </a:extLst>
           </p:cNvPr>
@@ -2773,7 +2775,7 @@
           <p:cNvPr id="2" name="Title Placeholder 1">
             <a:extLst>
               <a:ext uri="{FF2B5EF4-FFF2-40B4-BE49-F238E27FC236}">
-                <a16:creationId xmlns:a16="http://schemas.microsoft.com/office/drawing/2014/main" id="{5BF9D404-795C-4EA4-AD01-26740519239C}"/>
+                <a16:creationId xmlns:a16="http://schemas.microsoft.com/office/drawing/2014/main" xmlns="" id="{5BF9D404-795C-4EA4-AD01-26740519239C}"/>
               </a:ext>
             </a:extLst>
           </p:cNvPr>
@@ -2811,7 +2813,7 @@
           <p:cNvPr id="3" name="Text Placeholder 2">
             <a:extLst>
               <a:ext uri="{FF2B5EF4-FFF2-40B4-BE49-F238E27FC236}">
-                <a16:creationId xmlns:a16="http://schemas.microsoft.com/office/drawing/2014/main" id="{DE3FEC7B-48F8-4348-9BC6-68F83B859EE9}"/>
+                <a16:creationId xmlns:a16="http://schemas.microsoft.com/office/drawing/2014/main" xmlns="" id="{DE3FEC7B-48F8-4348-9BC6-68F83B859EE9}"/>
               </a:ext>
             </a:extLst>
           </p:cNvPr>
@@ -2878,7 +2880,7 @@
           <p:cNvPr id="4" name="Date Placeholder 3">
             <a:extLst>
               <a:ext uri="{FF2B5EF4-FFF2-40B4-BE49-F238E27FC236}">
-                <a16:creationId xmlns:a16="http://schemas.microsoft.com/office/drawing/2014/main" id="{31CA1A1D-E2F5-4161-A025-7B911965C2FE}"/>
+                <a16:creationId xmlns:a16="http://schemas.microsoft.com/office/drawing/2014/main" xmlns="" id="{31CA1A1D-E2F5-4161-A025-7B911965C2FE}"/>
               </a:ext>
             </a:extLst>
           </p:cNvPr>
@@ -2914,7 +2916,7 @@
           <a:p>
             <a:fld id="{6C733091-19F0-4DD7-90FE-000B4789B4CF}" type="datetimeFigureOut">
               <a:rPr lang="en-US" smtClean="0"/>
-              <a:t>8/31/2021</a:t>
+              <a:t>9/2/2021</a:t>
             </a:fld>
             <a:endParaRPr lang="en-US"/>
           </a:p>
@@ -2925,7 +2927,7 @@
           <p:cNvPr id="5" name="Footer Placeholder 4">
             <a:extLst>
               <a:ext uri="{FF2B5EF4-FFF2-40B4-BE49-F238E27FC236}">
-                <a16:creationId xmlns:a16="http://schemas.microsoft.com/office/drawing/2014/main" id="{43C7B926-18F3-4C13-AB92-764E10D324FB}"/>
+                <a16:creationId xmlns:a16="http://schemas.microsoft.com/office/drawing/2014/main" xmlns="" id="{43C7B926-18F3-4C13-AB92-764E10D324FB}"/>
               </a:ext>
             </a:extLst>
           </p:cNvPr>
@@ -2968,7 +2970,7 @@
           <p:cNvPr id="6" name="Slide Number Placeholder 5">
             <a:extLst>
               <a:ext uri="{FF2B5EF4-FFF2-40B4-BE49-F238E27FC236}">
-                <a16:creationId xmlns:a16="http://schemas.microsoft.com/office/drawing/2014/main" id="{734FA846-3BF6-46FD-80CF-34B300D244C0}"/>
+                <a16:creationId xmlns:a16="http://schemas.microsoft.com/office/drawing/2014/main" xmlns="" id="{734FA846-3BF6-46FD-80CF-34B300D244C0}"/>
               </a:ext>
             </a:extLst>
           </p:cNvPr>
@@ -4818,10 +4820,10 @@
           <p:cNvPr id="10" name="Rectangle 9">
             <a:extLst>
               <a:ext uri="{FF2B5EF4-FFF2-40B4-BE49-F238E27FC236}">
-                <a16:creationId xmlns:a16="http://schemas.microsoft.com/office/drawing/2014/main" id="{AB8C311F-7253-4AED-9701-7FC0708C41C7}"/>
+                <a16:creationId xmlns:a16="http://schemas.microsoft.com/office/drawing/2014/main" xmlns="" id="{AB8C311F-7253-4AED-9701-7FC0708C41C7}"/>
               </a:ext>
               <a:ext uri="{C183D7F6-B498-43B3-948B-1728B52AA6E4}">
-                <adec:decorative xmlns:adec="http://schemas.microsoft.com/office/drawing/2017/decorative" val="1"/>
+                <adec:decorative xmlns:adec="http://schemas.microsoft.com/office/drawing/2017/decorative" xmlns="" val="1"/>
               </a:ext>
             </a:extLst>
           </p:cNvPr>
@@ -4831,7 +4833,7 @@
           <p:nvPr>
             <p:extLst>
               <p:ext uri="{386F3935-93C4-4BCD-93E2-E3B085C9AB24}">
-                <p16:designElem xmlns:p16="http://schemas.microsoft.com/office/powerpoint/2015/main" val="1"/>
+                <p16:designElem xmlns:p16="http://schemas.microsoft.com/office/powerpoint/2015/main" xmlns="" val="1"/>
               </p:ext>
             </p:extLst>
           </p:nvPr>
@@ -4889,235 +4891,12 @@
           </a:p>
         </p:txBody>
       </p:sp>
-      <p:sp>
-        <p:nvSpPr>
-          <p:cNvPr id="12" name="Rectangle 11">
-            <a:extLst>
-              <a:ext uri="{FF2B5EF4-FFF2-40B4-BE49-F238E27FC236}">
-                <a16:creationId xmlns:a16="http://schemas.microsoft.com/office/drawing/2014/main" id="{E2384209-CB15-4CDF-9D31-C44FD9A3F20D}"/>
-              </a:ext>
-              <a:ext uri="{C183D7F6-B498-43B3-948B-1728B52AA6E4}">
-                <adec:decorative xmlns:adec="http://schemas.microsoft.com/office/drawing/2017/decorative" val="1"/>
-              </a:ext>
-            </a:extLst>
-          </p:cNvPr>
-          <p:cNvSpPr>
-            <a:spLocks noGrp="1" noRot="1" noChangeAspect="1" noMove="1" noResize="1" noEditPoints="1" noAdjustHandles="1" noChangeArrowheads="1" noChangeShapeType="1" noTextEdit="1"/>
-          </p:cNvSpPr>
-          <p:nvPr>
-            <p:extLst>
-              <p:ext uri="{386F3935-93C4-4BCD-93E2-E3B085C9AB24}">
-                <p16:designElem xmlns:p16="http://schemas.microsoft.com/office/powerpoint/2015/main" val="1"/>
-              </p:ext>
-            </p:extLst>
-          </p:nvPr>
-        </p:nvSpPr>
-        <p:spPr>
-          <a:xfrm rot="16200000" flipH="1">
-            <a:off x="2666617" y="-2666188"/>
-            <a:ext cx="6858000" cy="12191233"/>
-          </a:xfrm>
-          <a:prstGeom prst="rect">
-            <a:avLst/>
-          </a:prstGeom>
-          <a:gradFill>
-            <a:gsLst>
-              <a:gs pos="8000">
-                <a:schemeClr val="accent1"/>
-              </a:gs>
-              <a:gs pos="100000">
-                <a:schemeClr val="accent1">
-                  <a:lumMod val="50000"/>
-                </a:schemeClr>
-              </a:gs>
-            </a:gsLst>
-            <a:lin ang="12000000" scaled="0"/>
-          </a:gradFill>
-          <a:ln>
-            <a:noFill/>
-          </a:ln>
-        </p:spPr>
-        <p:style>
-          <a:lnRef idx="2">
-            <a:schemeClr val="accent1">
-              <a:shade val="50000"/>
-            </a:schemeClr>
-          </a:lnRef>
-          <a:fillRef idx="1">
-            <a:schemeClr val="accent1"/>
-          </a:fillRef>
-          <a:effectRef idx="0">
-            <a:schemeClr val="accent1"/>
-          </a:effectRef>
-          <a:fontRef idx="minor">
-            <a:schemeClr val="lt1"/>
-          </a:fontRef>
-        </p:style>
-        <p:txBody>
-          <a:bodyPr rtlCol="0" anchor="ctr"/>
-          <a:lstStyle/>
-          <a:p>
-            <a:pPr algn="ctr"/>
-            <a:endParaRPr lang="en-US"/>
-          </a:p>
-        </p:txBody>
-      </p:sp>
-      <p:sp>
-        <p:nvSpPr>
-          <p:cNvPr id="14" name="Rectangle 13">
-            <a:extLst>
-              <a:ext uri="{FF2B5EF4-FFF2-40B4-BE49-F238E27FC236}">
-                <a16:creationId xmlns:a16="http://schemas.microsoft.com/office/drawing/2014/main" id="{2633B3B5-CC90-43F0-8714-D31D1F3F0209}"/>
-              </a:ext>
-              <a:ext uri="{C183D7F6-B498-43B3-948B-1728B52AA6E4}">
-                <adec:decorative xmlns:adec="http://schemas.microsoft.com/office/drawing/2017/decorative" val="1"/>
-              </a:ext>
-            </a:extLst>
-          </p:cNvPr>
-          <p:cNvSpPr>
-            <a:spLocks noGrp="1" noRot="1" noChangeAspect="1" noMove="1" noResize="1" noEditPoints="1" noAdjustHandles="1" noChangeArrowheads="1" noChangeShapeType="1" noTextEdit="1"/>
-          </p:cNvSpPr>
-          <p:nvPr>
-            <p:extLst>
-              <p:ext uri="{386F3935-93C4-4BCD-93E2-E3B085C9AB24}">
-                <p16:designElem xmlns:p16="http://schemas.microsoft.com/office/powerpoint/2015/main" val="1"/>
-              </p:ext>
-            </p:extLst>
-          </p:nvPr>
-        </p:nvSpPr>
-        <p:spPr>
-          <a:xfrm rot="10800000" flipH="1">
-            <a:off x="-2311" y="0"/>
-            <a:ext cx="9070846" cy="6857572"/>
-          </a:xfrm>
-          <a:prstGeom prst="rect">
-            <a:avLst/>
-          </a:prstGeom>
-          <a:gradFill>
-            <a:gsLst>
-              <a:gs pos="8000">
-                <a:srgbClr val="000000">
-                  <a:alpha val="52000"/>
-                </a:srgbClr>
-              </a:gs>
-              <a:gs pos="100000">
-                <a:schemeClr val="accent1"/>
-              </a:gs>
-            </a:gsLst>
-            <a:lin ang="4800000" scaled="0"/>
-          </a:gradFill>
-          <a:ln>
-            <a:noFill/>
-          </a:ln>
-        </p:spPr>
-        <p:style>
-          <a:lnRef idx="2">
-            <a:schemeClr val="accent1">
-              <a:shade val="50000"/>
-            </a:schemeClr>
-          </a:lnRef>
-          <a:fillRef idx="1">
-            <a:schemeClr val="accent1"/>
-          </a:fillRef>
-          <a:effectRef idx="0">
-            <a:schemeClr val="accent1"/>
-          </a:effectRef>
-          <a:fontRef idx="minor">
-            <a:schemeClr val="lt1"/>
-          </a:fontRef>
-        </p:style>
-        <p:txBody>
-          <a:bodyPr rtlCol="0" anchor="ctr"/>
-          <a:lstStyle/>
-          <a:p>
-            <a:pPr algn="ctr"/>
-            <a:endParaRPr lang="en-US"/>
-          </a:p>
-        </p:txBody>
-      </p:sp>
-      <p:sp>
-        <p:nvSpPr>
-          <p:cNvPr id="16" name="Rectangle 15">
-            <a:extLst>
-              <a:ext uri="{FF2B5EF4-FFF2-40B4-BE49-F238E27FC236}">
-                <a16:creationId xmlns:a16="http://schemas.microsoft.com/office/drawing/2014/main" id="{A8D57A06-A426-446D-B02C-A2DC6B62E45E}"/>
-              </a:ext>
-              <a:ext uri="{C183D7F6-B498-43B3-948B-1728B52AA6E4}">
-                <adec:decorative xmlns:adec="http://schemas.microsoft.com/office/drawing/2017/decorative" val="1"/>
-              </a:ext>
-            </a:extLst>
-          </p:cNvPr>
-          <p:cNvSpPr>
-            <a:spLocks noGrp="1" noRot="1" noChangeAspect="1" noMove="1" noResize="1" noEditPoints="1" noAdjustHandles="1" noChangeArrowheads="1" noChangeShapeType="1" noTextEdit="1"/>
-          </p:cNvSpPr>
-          <p:nvPr>
-            <p:extLst>
-              <p:ext uri="{386F3935-93C4-4BCD-93E2-E3B085C9AB24}">
-                <p16:designElem xmlns:p16="http://schemas.microsoft.com/office/powerpoint/2015/main" val="1"/>
-              </p:ext>
-            </p:extLst>
-          </p:nvPr>
-        </p:nvSpPr>
-        <p:spPr>
-          <a:xfrm rot="16200000" flipH="1">
-            <a:off x="3649491" y="-1685840"/>
-            <a:ext cx="4894564" cy="12193546"/>
-          </a:xfrm>
-          <a:prstGeom prst="rect">
-            <a:avLst/>
-          </a:prstGeom>
-          <a:gradFill>
-            <a:gsLst>
-              <a:gs pos="0">
-                <a:schemeClr val="accent5">
-                  <a:lumMod val="60000"/>
-                  <a:lumOff val="40000"/>
-                  <a:alpha val="0"/>
-                </a:schemeClr>
-              </a:gs>
-              <a:gs pos="100000">
-                <a:srgbClr val="000000">
-                  <a:alpha val="46000"/>
-                </a:srgbClr>
-              </a:gs>
-            </a:gsLst>
-            <a:lin ang="1200000" scaled="0"/>
-          </a:gradFill>
-          <a:ln>
-            <a:noFill/>
-          </a:ln>
-        </p:spPr>
-        <p:style>
-          <a:lnRef idx="2">
-            <a:schemeClr val="accent1">
-              <a:shade val="50000"/>
-            </a:schemeClr>
-          </a:lnRef>
-          <a:fillRef idx="1">
-            <a:schemeClr val="accent1"/>
-          </a:fillRef>
-          <a:effectRef idx="0">
-            <a:schemeClr val="accent1"/>
-          </a:effectRef>
-          <a:fontRef idx="minor">
-            <a:schemeClr val="lt1"/>
-          </a:fontRef>
-        </p:style>
-        <p:txBody>
-          <a:bodyPr rtlCol="0" anchor="ctr"/>
-          <a:lstStyle/>
-          <a:p>
-            <a:pPr algn="ctr"/>
-            <a:endParaRPr lang="en-US"/>
-          </a:p>
-        </p:txBody>
-      </p:sp>
       <p:pic>
         <p:nvPicPr>
           <p:cNvPr id="5" name="Picture 4" descr="Diagram&#10;&#10;Description automatically generated">
             <a:extLst>
               <a:ext uri="{FF2B5EF4-FFF2-40B4-BE49-F238E27FC236}">
-                <a16:creationId xmlns:a16="http://schemas.microsoft.com/office/drawing/2014/main" id="{DB17FD74-8C94-4DC8-A4F8-6135D511A8C6}"/>
+                <a16:creationId xmlns:a16="http://schemas.microsoft.com/office/drawing/2014/main" xmlns="" id="{DB17FD74-8C94-4DC8-A4F8-6135D511A8C6}"/>
               </a:ext>
             </a:extLst>
           </p:cNvPr>
@@ -5142,10 +4921,2834 @@
           </a:prstGeom>
         </p:spPr>
       </p:pic>
+      <p:sp>
+        <p:nvSpPr>
+          <p:cNvPr id="7" name="Title 1"/>
+          <p:cNvSpPr txBox="1">
+            <a:spLocks/>
+          </p:cNvSpPr>
+          <p:nvPr/>
+        </p:nvSpPr>
+        <p:spPr>
+          <a:xfrm>
+            <a:off x="166088" y="120357"/>
+            <a:ext cx="11419962" cy="698793"/>
+          </a:xfrm>
+          <a:prstGeom prst="rect">
+            <a:avLst/>
+          </a:prstGeom>
+        </p:spPr>
+        <p:txBody>
+          <a:bodyPr>
+            <a:noAutofit/>
+          </a:bodyPr>
+          <a:lstStyle>
+            <a:lvl1pPr algn="l" defTabSz="914400" rtl="0" eaLnBrk="1" latinLnBrk="0" hangingPunct="1">
+              <a:lnSpc>
+                <a:spcPct val="90000"/>
+              </a:lnSpc>
+              <a:spcBef>
+                <a:spcPct val="0"/>
+              </a:spcBef>
+              <a:buNone/>
+              <a:defRPr sz="4400" kern="1200">
+                <a:solidFill>
+                  <a:schemeClr val="tx1"/>
+                </a:solidFill>
+                <a:latin typeface="+mj-lt"/>
+                <a:ea typeface="+mj-ea"/>
+                <a:cs typeface="+mj-cs"/>
+              </a:defRPr>
+            </a:lvl1pPr>
+          </a:lstStyle>
+          <a:p>
+            <a:r>
+              <a:rPr lang="en-US" sz="2800" dirty="0" smtClean="0"/>
+              <a:t>AMT Preliminary Data Model</a:t>
+            </a:r>
+            <a:endParaRPr lang="en-US" sz="2800" dirty="0"/>
+          </a:p>
+        </p:txBody>
+      </p:sp>
     </p:spTree>
     <p:extLst>
       <p:ext uri="{BB962C8B-B14F-4D97-AF65-F5344CB8AC3E}">
         <p14:creationId xmlns:p14="http://schemas.microsoft.com/office/powerpoint/2010/main" val="806997856"/>
+      </p:ext>
+    </p:extLst>
+  </p:cSld>
+  <p:clrMapOvr>
+    <a:masterClrMapping/>
+  </p:clrMapOvr>
+</p:sld>
+</file>
+
+<file path=ppt/slides/slide7.xml><?xml version="1.0" encoding="utf-8"?>
+<p:sld xmlns:a="http://schemas.openxmlformats.org/drawingml/2006/main" xmlns:r="http://schemas.openxmlformats.org/officeDocument/2006/relationships" xmlns:p="http://schemas.openxmlformats.org/presentationml/2006/main">
+  <p:cSld>
+    <p:spTree>
+      <p:nvGrpSpPr>
+        <p:cNvPr id="1" name=""/>
+        <p:cNvGrpSpPr/>
+        <p:nvPr/>
+      </p:nvGrpSpPr>
+      <p:grpSpPr>
+        <a:xfrm>
+          <a:off x="0" y="0"/>
+          <a:ext cx="0" cy="0"/>
+          <a:chOff x="0" y="0"/>
+          <a:chExt cx="0" cy="0"/>
+        </a:xfrm>
+      </p:grpSpPr>
+      <p:sp>
+        <p:nvSpPr>
+          <p:cNvPr id="89" name="Rectangle 88">
+            <a:extLst>
+              <a:ext uri="{FF2B5EF4-FFF2-40B4-BE49-F238E27FC236}">
+                <a16:creationId xmlns="" xmlns:a16="http://schemas.microsoft.com/office/drawing/2014/main" id="{EED827AB-78FC-41AC-8676-30DA25D7C5FC}"/>
+              </a:ext>
+            </a:extLst>
+          </p:cNvPr>
+          <p:cNvSpPr/>
+          <p:nvPr/>
+        </p:nvSpPr>
+        <p:spPr>
+          <a:xfrm>
+            <a:off x="7544214" y="3326408"/>
+            <a:ext cx="1494797" cy="991056"/>
+          </a:xfrm>
+          <a:prstGeom prst="rect">
+            <a:avLst/>
+          </a:prstGeom>
+          <a:solidFill>
+            <a:schemeClr val="accent6"/>
+          </a:solidFill>
+        </p:spPr>
+        <p:style>
+          <a:lnRef idx="2">
+            <a:schemeClr val="accent1">
+              <a:shade val="50000"/>
+            </a:schemeClr>
+          </a:lnRef>
+          <a:fillRef idx="1">
+            <a:schemeClr val="accent1"/>
+          </a:fillRef>
+          <a:effectRef idx="0">
+            <a:schemeClr val="accent1"/>
+          </a:effectRef>
+          <a:fontRef idx="minor">
+            <a:schemeClr val="lt1"/>
+          </a:fontRef>
+        </p:style>
+        <p:txBody>
+          <a:bodyPr rtlCol="0" anchor="ctr"/>
+          <a:lstStyle/>
+          <a:p>
+            <a:pPr algn="ctr"/>
+            <a:r>
+              <a:rPr lang="en-US" sz="1000" dirty="0"/>
+              <a:t>com.tlw8253.dto</a:t>
+            </a:r>
+          </a:p>
+          <a:p>
+            <a:pPr algn="ctr"/>
+            <a:r>
+              <a:rPr lang="en-US" sz="1200" dirty="0"/>
+              <a:t>Data Transfer Object</a:t>
+            </a:r>
+          </a:p>
+          <a:p>
+            <a:pPr algn="ctr"/>
+            <a:r>
+              <a:rPr lang="en-US" dirty="0"/>
+              <a:t>&lt;Tn&gt;DTO</a:t>
+            </a:r>
+          </a:p>
+          <a:p>
+            <a:pPr algn="ctr"/>
+            <a:r>
+              <a:rPr lang="en-US" sz="1200" dirty="0"/>
+              <a:t>&lt;Tn&gt;</a:t>
+            </a:r>
+            <a:r>
+              <a:rPr lang="en-US" sz="1200" dirty="0" err="1"/>
+              <a:t>AddOrEditDTO</a:t>
+            </a:r>
+            <a:endParaRPr lang="en-US" sz="1200" dirty="0"/>
+          </a:p>
+        </p:txBody>
+      </p:sp>
+      <p:sp>
+        <p:nvSpPr>
+          <p:cNvPr id="62" name="Rectangle 61">
+            <a:extLst>
+              <a:ext uri="{FF2B5EF4-FFF2-40B4-BE49-F238E27FC236}">
+                <a16:creationId xmlns="" xmlns:a16="http://schemas.microsoft.com/office/drawing/2014/main" id="{C3FE7107-D2B1-4448-B03A-F2CE9B45CFD6}"/>
+              </a:ext>
+            </a:extLst>
+          </p:cNvPr>
+          <p:cNvSpPr/>
+          <p:nvPr/>
+        </p:nvSpPr>
+        <p:spPr>
+          <a:xfrm>
+            <a:off x="4733154" y="2531096"/>
+            <a:ext cx="1589922" cy="991056"/>
+          </a:xfrm>
+          <a:prstGeom prst="rect">
+            <a:avLst/>
+          </a:prstGeom>
+          <a:solidFill>
+            <a:schemeClr val="accent6"/>
+          </a:solidFill>
+        </p:spPr>
+        <p:style>
+          <a:lnRef idx="2">
+            <a:schemeClr val="accent1">
+              <a:shade val="50000"/>
+            </a:schemeClr>
+          </a:lnRef>
+          <a:fillRef idx="1">
+            <a:schemeClr val="accent1"/>
+          </a:fillRef>
+          <a:effectRef idx="0">
+            <a:schemeClr val="accent1"/>
+          </a:effectRef>
+          <a:fontRef idx="minor">
+            <a:schemeClr val="lt1"/>
+          </a:fontRef>
+        </p:style>
+        <p:txBody>
+          <a:bodyPr rtlCol="0" anchor="ctr"/>
+          <a:lstStyle/>
+          <a:p>
+            <a:pPr algn="ctr"/>
+            <a:r>
+              <a:rPr lang="en-US" sz="1000" dirty="0"/>
+              <a:t>com.tlw8253.dao</a:t>
+            </a:r>
+          </a:p>
+          <a:p>
+            <a:pPr algn="ctr"/>
+            <a:r>
+              <a:rPr lang="en-US" dirty="0"/>
+              <a:t>&lt;Tn&gt;</a:t>
+            </a:r>
+            <a:r>
+              <a:rPr lang="en-US" dirty="0" err="1"/>
+              <a:t>DAOImpl</a:t>
+            </a:r>
+            <a:endParaRPr lang="en-US" dirty="0"/>
+          </a:p>
+        </p:txBody>
+      </p:sp>
+      <p:sp>
+        <p:nvSpPr>
+          <p:cNvPr id="61" name="Rectangle 60">
+            <a:extLst>
+              <a:ext uri="{FF2B5EF4-FFF2-40B4-BE49-F238E27FC236}">
+                <a16:creationId xmlns="" xmlns:a16="http://schemas.microsoft.com/office/drawing/2014/main" id="{2F7B40FD-C5BA-431D-AE99-1CB70F1BAB88}"/>
+              </a:ext>
+            </a:extLst>
+          </p:cNvPr>
+          <p:cNvSpPr/>
+          <p:nvPr/>
+        </p:nvSpPr>
+        <p:spPr>
+          <a:xfrm>
+            <a:off x="8635143" y="972118"/>
+            <a:ext cx="1494797" cy="991056"/>
+          </a:xfrm>
+          <a:prstGeom prst="rect">
+            <a:avLst/>
+          </a:prstGeom>
+          <a:solidFill>
+            <a:schemeClr val="accent6"/>
+          </a:solidFill>
+        </p:spPr>
+        <p:style>
+          <a:lnRef idx="2">
+            <a:schemeClr val="accent1">
+              <a:shade val="50000"/>
+            </a:schemeClr>
+          </a:lnRef>
+          <a:fillRef idx="1">
+            <a:schemeClr val="accent1"/>
+          </a:fillRef>
+          <a:effectRef idx="0">
+            <a:schemeClr val="accent1"/>
+          </a:effectRef>
+          <a:fontRef idx="minor">
+            <a:schemeClr val="lt1"/>
+          </a:fontRef>
+        </p:style>
+        <p:txBody>
+          <a:bodyPr rtlCol="0" anchor="ctr"/>
+          <a:lstStyle/>
+          <a:p>
+            <a:pPr algn="ctr"/>
+            <a:r>
+              <a:rPr lang="en-US" sz="1000" dirty="0"/>
+              <a:t>com.tlw8253.model</a:t>
+            </a:r>
+          </a:p>
+          <a:p>
+            <a:pPr algn="ctr"/>
+            <a:r>
+              <a:rPr lang="en-US" dirty="0"/>
+              <a:t>&lt;Tn&gt;Model</a:t>
+            </a:r>
+          </a:p>
+        </p:txBody>
+      </p:sp>
+      <p:sp>
+        <p:nvSpPr>
+          <p:cNvPr id="60" name="Rectangle 59">
+            <a:extLst>
+              <a:ext uri="{FF2B5EF4-FFF2-40B4-BE49-F238E27FC236}">
+                <a16:creationId xmlns="" xmlns:a16="http://schemas.microsoft.com/office/drawing/2014/main" id="{CF3E4DE9-C6F2-4C11-BE7F-2753CDEFE535}"/>
+              </a:ext>
+            </a:extLst>
+          </p:cNvPr>
+          <p:cNvSpPr/>
+          <p:nvPr/>
+        </p:nvSpPr>
+        <p:spPr>
+          <a:xfrm>
+            <a:off x="7508008" y="5195357"/>
+            <a:ext cx="1678916" cy="991056"/>
+          </a:xfrm>
+          <a:prstGeom prst="rect">
+            <a:avLst/>
+          </a:prstGeom>
+          <a:solidFill>
+            <a:schemeClr val="accent6"/>
+          </a:solidFill>
+        </p:spPr>
+        <p:style>
+          <a:lnRef idx="2">
+            <a:schemeClr val="accent1">
+              <a:shade val="50000"/>
+            </a:schemeClr>
+          </a:lnRef>
+          <a:fillRef idx="1">
+            <a:schemeClr val="accent1"/>
+          </a:fillRef>
+          <a:effectRef idx="0">
+            <a:schemeClr val="accent1"/>
+          </a:effectRef>
+          <a:fontRef idx="minor">
+            <a:schemeClr val="lt1"/>
+          </a:fontRef>
+        </p:style>
+        <p:txBody>
+          <a:bodyPr rtlCol="0" anchor="ctr"/>
+          <a:lstStyle/>
+          <a:p>
+            <a:pPr algn="ctr"/>
+            <a:r>
+              <a:rPr lang="en-US" sz="1000" dirty="0"/>
+              <a:t>com.tlw8253.controller</a:t>
+            </a:r>
+          </a:p>
+          <a:p>
+            <a:pPr algn="ctr"/>
+            <a:r>
+              <a:rPr lang="en-US" dirty="0"/>
+              <a:t>&lt;Tn&gt;Controller</a:t>
+            </a:r>
+          </a:p>
+        </p:txBody>
+      </p:sp>
+      <p:sp>
+        <p:nvSpPr>
+          <p:cNvPr id="36" name="Rectangle 35"/>
+          <p:cNvSpPr/>
+          <p:nvPr/>
+        </p:nvSpPr>
+        <p:spPr>
+          <a:xfrm>
+            <a:off x="4779362" y="4590037"/>
+            <a:ext cx="1519176" cy="991056"/>
+          </a:xfrm>
+          <a:prstGeom prst="rect">
+            <a:avLst/>
+          </a:prstGeom>
+          <a:solidFill>
+            <a:schemeClr val="accent6"/>
+          </a:solidFill>
+        </p:spPr>
+        <p:style>
+          <a:lnRef idx="2">
+            <a:schemeClr val="accent1">
+              <a:shade val="50000"/>
+            </a:schemeClr>
+          </a:lnRef>
+          <a:fillRef idx="1">
+            <a:schemeClr val="accent1"/>
+          </a:fillRef>
+          <a:effectRef idx="0">
+            <a:schemeClr val="accent1"/>
+          </a:effectRef>
+          <a:fontRef idx="minor">
+            <a:schemeClr val="lt1"/>
+          </a:fontRef>
+        </p:style>
+        <p:txBody>
+          <a:bodyPr rtlCol="0" anchor="ctr"/>
+          <a:lstStyle/>
+          <a:p>
+            <a:pPr algn="ctr"/>
+            <a:r>
+              <a:rPr lang="en-US" sz="1000" dirty="0"/>
+              <a:t>com.tlw8253.service</a:t>
+            </a:r>
+          </a:p>
+          <a:p>
+            <a:pPr algn="ctr"/>
+            <a:r>
+              <a:rPr lang="en-US" sz="1600" dirty="0"/>
+              <a:t>&lt;Tn&gt;Service</a:t>
+            </a:r>
+          </a:p>
+        </p:txBody>
+      </p:sp>
+      <p:sp>
+        <p:nvSpPr>
+          <p:cNvPr id="4" name="Rectangle 3"/>
+          <p:cNvSpPr/>
+          <p:nvPr/>
+        </p:nvSpPr>
+        <p:spPr>
+          <a:xfrm>
+            <a:off x="806450" y="754828"/>
+            <a:ext cx="1690400" cy="1169222"/>
+          </a:xfrm>
+          <a:prstGeom prst="rect">
+            <a:avLst/>
+          </a:prstGeom>
+          <a:solidFill>
+            <a:schemeClr val="accent2"/>
+          </a:solidFill>
+        </p:spPr>
+        <p:style>
+          <a:lnRef idx="2">
+            <a:schemeClr val="accent1">
+              <a:shade val="50000"/>
+            </a:schemeClr>
+          </a:lnRef>
+          <a:fillRef idx="1">
+            <a:schemeClr val="accent1"/>
+          </a:fillRef>
+          <a:effectRef idx="0">
+            <a:schemeClr val="accent1"/>
+          </a:effectRef>
+          <a:fontRef idx="minor">
+            <a:schemeClr val="lt1"/>
+          </a:fontRef>
+        </p:style>
+        <p:txBody>
+          <a:bodyPr rtlCol="0" anchor="ctr"/>
+          <a:lstStyle/>
+          <a:p>
+            <a:pPr algn="ctr"/>
+            <a:r>
+              <a:rPr lang="en-US" sz="1000" dirty="0"/>
+              <a:t>com.tlw8253.dao</a:t>
+            </a:r>
+          </a:p>
+          <a:p>
+            <a:pPr algn="ctr"/>
+            <a:r>
+              <a:rPr lang="en-US" sz="1000" dirty="0"/>
+              <a:t>&lt;&lt; interface &gt;&gt;</a:t>
+            </a:r>
+          </a:p>
+          <a:p>
+            <a:pPr algn="ctr"/>
+            <a:r>
+              <a:rPr lang="en-US" sz="1400" dirty="0"/>
+              <a:t>Data Access Object</a:t>
+            </a:r>
+          </a:p>
+          <a:p>
+            <a:pPr algn="ctr"/>
+            <a:r>
+              <a:rPr lang="en-US" sz="1400" dirty="0" err="1"/>
+              <a:t>GenericDAO</a:t>
+            </a:r>
+            <a:r>
+              <a:rPr lang="en-US" sz="1400" dirty="0"/>
+              <a:t>&lt;T&gt;</a:t>
+            </a:r>
+          </a:p>
+        </p:txBody>
+      </p:sp>
+      <p:sp>
+        <p:nvSpPr>
+          <p:cNvPr id="5" name="Rectangle 4"/>
+          <p:cNvSpPr/>
+          <p:nvPr/>
+        </p:nvSpPr>
+        <p:spPr>
+          <a:xfrm>
+            <a:off x="8499897" y="417543"/>
+            <a:ext cx="1494797" cy="991056"/>
+          </a:xfrm>
+          <a:prstGeom prst="rect">
+            <a:avLst/>
+          </a:prstGeom>
+          <a:solidFill>
+            <a:schemeClr val="accent6"/>
+          </a:solidFill>
+        </p:spPr>
+        <p:style>
+          <a:lnRef idx="2">
+            <a:schemeClr val="accent1">
+              <a:shade val="50000"/>
+            </a:schemeClr>
+          </a:lnRef>
+          <a:fillRef idx="1">
+            <a:schemeClr val="accent1"/>
+          </a:fillRef>
+          <a:effectRef idx="0">
+            <a:schemeClr val="accent1"/>
+          </a:effectRef>
+          <a:fontRef idx="minor">
+            <a:schemeClr val="lt1"/>
+          </a:fontRef>
+        </p:style>
+        <p:txBody>
+          <a:bodyPr rtlCol="0" anchor="ctr"/>
+          <a:lstStyle/>
+          <a:p>
+            <a:pPr algn="ctr"/>
+            <a:r>
+              <a:rPr lang="en-US" sz="1000" dirty="0"/>
+              <a:t>com.tlw8253.model</a:t>
+            </a:r>
+          </a:p>
+          <a:p>
+            <a:pPr algn="ctr"/>
+            <a:r>
+              <a:rPr lang="en-US" dirty="0"/>
+              <a:t>&lt;T&gt;Model</a:t>
+            </a:r>
+          </a:p>
+        </p:txBody>
+      </p:sp>
+      <p:cxnSp>
+        <p:nvCxnSpPr>
+          <p:cNvPr id="9" name="Straight Arrow Connector 8"/>
+          <p:cNvCxnSpPr>
+            <a:cxnSpLocks/>
+            <a:stCxn id="20" idx="3"/>
+            <a:endCxn id="5" idx="1"/>
+          </p:cNvCxnSpPr>
+          <p:nvPr/>
+        </p:nvCxnSpPr>
+        <p:spPr>
+          <a:xfrm flipV="1">
+            <a:off x="6258426" y="913071"/>
+            <a:ext cx="2241471" cy="1554816"/>
+          </a:xfrm>
+          <a:prstGeom prst="straightConnector1">
+            <a:avLst/>
+          </a:prstGeom>
+          <a:ln>
+            <a:tailEnd type="triangle"/>
+          </a:ln>
+        </p:spPr>
+        <p:style>
+          <a:lnRef idx="1">
+            <a:schemeClr val="accent1"/>
+          </a:lnRef>
+          <a:fillRef idx="0">
+            <a:schemeClr val="accent1"/>
+          </a:fillRef>
+          <a:effectRef idx="0">
+            <a:schemeClr val="accent1"/>
+          </a:effectRef>
+          <a:fontRef idx="minor">
+            <a:schemeClr val="tx1"/>
+          </a:fontRef>
+        </p:style>
+      </p:cxnSp>
+      <p:sp>
+        <p:nvSpPr>
+          <p:cNvPr id="15" name="Rectangle 14"/>
+          <p:cNvSpPr/>
+          <p:nvPr/>
+        </p:nvSpPr>
+        <p:spPr>
+          <a:xfrm>
+            <a:off x="7433863" y="2809248"/>
+            <a:ext cx="1494797" cy="991056"/>
+          </a:xfrm>
+          <a:prstGeom prst="rect">
+            <a:avLst/>
+          </a:prstGeom>
+          <a:solidFill>
+            <a:schemeClr val="accent6"/>
+          </a:solidFill>
+        </p:spPr>
+        <p:style>
+          <a:lnRef idx="2">
+            <a:schemeClr val="accent1">
+              <a:shade val="50000"/>
+            </a:schemeClr>
+          </a:lnRef>
+          <a:fillRef idx="1">
+            <a:schemeClr val="accent1"/>
+          </a:fillRef>
+          <a:effectRef idx="0">
+            <a:schemeClr val="accent1"/>
+          </a:effectRef>
+          <a:fontRef idx="minor">
+            <a:schemeClr val="lt1"/>
+          </a:fontRef>
+        </p:style>
+        <p:txBody>
+          <a:bodyPr rtlCol="0" anchor="ctr"/>
+          <a:lstStyle/>
+          <a:p>
+            <a:pPr algn="ctr"/>
+            <a:r>
+              <a:rPr lang="en-US" sz="1000" dirty="0"/>
+              <a:t>com.tlw8253.dto</a:t>
+            </a:r>
+          </a:p>
+          <a:p>
+            <a:pPr algn="ctr"/>
+            <a:r>
+              <a:rPr lang="en-US" sz="1200" dirty="0"/>
+              <a:t>Data Transfer Object</a:t>
+            </a:r>
+          </a:p>
+          <a:p>
+            <a:pPr algn="ctr"/>
+            <a:r>
+              <a:rPr lang="en-US" dirty="0"/>
+              <a:t>&lt;T&gt;DTO</a:t>
+            </a:r>
+          </a:p>
+          <a:p>
+            <a:pPr algn="ctr"/>
+            <a:r>
+              <a:rPr lang="en-US" sz="1200" dirty="0"/>
+              <a:t>&lt;T&gt;</a:t>
+            </a:r>
+            <a:r>
+              <a:rPr lang="en-US" sz="1200" dirty="0" err="1"/>
+              <a:t>AddOrEditDTO</a:t>
+            </a:r>
+            <a:endParaRPr lang="en-US" sz="1200" dirty="0"/>
+          </a:p>
+        </p:txBody>
+      </p:sp>
+      <p:cxnSp>
+        <p:nvCxnSpPr>
+          <p:cNvPr id="17" name="Straight Arrow Connector 16"/>
+          <p:cNvCxnSpPr>
+            <a:cxnSpLocks/>
+            <a:stCxn id="20" idx="3"/>
+            <a:endCxn id="57" idx="1"/>
+          </p:cNvCxnSpPr>
+          <p:nvPr/>
+        </p:nvCxnSpPr>
+        <p:spPr>
+          <a:xfrm flipV="1">
+            <a:off x="6258426" y="2308389"/>
+            <a:ext cx="4048574" cy="159498"/>
+          </a:xfrm>
+          <a:prstGeom prst="straightConnector1">
+            <a:avLst/>
+          </a:prstGeom>
+          <a:ln>
+            <a:tailEnd type="triangle"/>
+          </a:ln>
+        </p:spPr>
+        <p:style>
+          <a:lnRef idx="1">
+            <a:schemeClr val="accent1"/>
+          </a:lnRef>
+          <a:fillRef idx="0">
+            <a:schemeClr val="accent1"/>
+          </a:fillRef>
+          <a:effectRef idx="0">
+            <a:schemeClr val="accent1"/>
+          </a:effectRef>
+          <a:fontRef idx="minor">
+            <a:schemeClr val="tx1"/>
+          </a:fontRef>
+        </p:style>
+      </p:cxnSp>
+      <p:sp>
+        <p:nvSpPr>
+          <p:cNvPr id="19" name="TextBox 18">
+            <a:extLst>
+              <a:ext uri="{FF2B5EF4-FFF2-40B4-BE49-F238E27FC236}">
+                <a16:creationId xmlns="" xmlns:a16="http://schemas.microsoft.com/office/drawing/2014/main" id="{E0BBD6C8-C8F2-40C5-AA64-85961A11ADC2}"/>
+              </a:ext>
+            </a:extLst>
+          </p:cNvPr>
+          <p:cNvSpPr txBox="1"/>
+          <p:nvPr/>
+        </p:nvSpPr>
+        <p:spPr>
+          <a:xfrm>
+            <a:off x="7207461" y="2088153"/>
+            <a:ext cx="728932" cy="276999"/>
+          </a:xfrm>
+          <a:prstGeom prst="rect">
+            <a:avLst/>
+          </a:prstGeom>
+          <a:noFill/>
+        </p:spPr>
+        <p:txBody>
+          <a:bodyPr wrap="square" rtlCol="0">
+            <a:spAutoFit/>
+          </a:bodyPr>
+          <a:lstStyle/>
+          <a:p>
+            <a:r>
+              <a:rPr lang="en-US" sz="1200" dirty="0"/>
+              <a:t>uses</a:t>
+            </a:r>
+          </a:p>
+        </p:txBody>
+      </p:sp>
+      <p:sp>
+        <p:nvSpPr>
+          <p:cNvPr id="20" name="Rectangle 19"/>
+          <p:cNvSpPr/>
+          <p:nvPr/>
+        </p:nvSpPr>
+        <p:spPr>
+          <a:xfrm>
+            <a:off x="4668504" y="1972359"/>
+            <a:ext cx="1589922" cy="991056"/>
+          </a:xfrm>
+          <a:prstGeom prst="rect">
+            <a:avLst/>
+          </a:prstGeom>
+          <a:solidFill>
+            <a:schemeClr val="accent6"/>
+          </a:solidFill>
+        </p:spPr>
+        <p:style>
+          <a:lnRef idx="2">
+            <a:schemeClr val="accent1">
+              <a:shade val="50000"/>
+            </a:schemeClr>
+          </a:lnRef>
+          <a:fillRef idx="1">
+            <a:schemeClr val="accent1"/>
+          </a:fillRef>
+          <a:effectRef idx="0">
+            <a:schemeClr val="accent1"/>
+          </a:effectRef>
+          <a:fontRef idx="minor">
+            <a:schemeClr val="lt1"/>
+          </a:fontRef>
+        </p:style>
+        <p:txBody>
+          <a:bodyPr rtlCol="0" anchor="ctr"/>
+          <a:lstStyle/>
+          <a:p>
+            <a:pPr algn="ctr"/>
+            <a:r>
+              <a:rPr lang="en-US" sz="1000" dirty="0"/>
+              <a:t>com.tlw8253.dao</a:t>
+            </a:r>
+          </a:p>
+          <a:p>
+            <a:pPr algn="ctr"/>
+            <a:r>
+              <a:rPr lang="en-US" dirty="0"/>
+              <a:t>&lt;T&gt;</a:t>
+            </a:r>
+            <a:r>
+              <a:rPr lang="en-US" dirty="0" err="1"/>
+              <a:t>DAOImpl</a:t>
+            </a:r>
+            <a:endParaRPr lang="en-US" dirty="0"/>
+          </a:p>
+        </p:txBody>
+      </p:sp>
+      <p:cxnSp>
+        <p:nvCxnSpPr>
+          <p:cNvPr id="22" name="Straight Arrow Connector 21"/>
+          <p:cNvCxnSpPr>
+            <a:cxnSpLocks/>
+            <a:stCxn id="20" idx="1"/>
+            <a:endCxn id="4" idx="3"/>
+          </p:cNvCxnSpPr>
+          <p:nvPr/>
+        </p:nvCxnSpPr>
+        <p:spPr>
+          <a:xfrm flipH="1" flipV="1">
+            <a:off x="2496850" y="1339439"/>
+            <a:ext cx="2171654" cy="1128448"/>
+          </a:xfrm>
+          <a:prstGeom prst="straightConnector1">
+            <a:avLst/>
+          </a:prstGeom>
+          <a:ln>
+            <a:tailEnd type="triangle"/>
+          </a:ln>
+        </p:spPr>
+        <p:style>
+          <a:lnRef idx="1">
+            <a:schemeClr val="accent1"/>
+          </a:lnRef>
+          <a:fillRef idx="0">
+            <a:schemeClr val="accent1"/>
+          </a:fillRef>
+          <a:effectRef idx="0">
+            <a:schemeClr val="accent1"/>
+          </a:effectRef>
+          <a:fontRef idx="minor">
+            <a:schemeClr val="tx1"/>
+          </a:fontRef>
+        </p:style>
+      </p:cxnSp>
+      <p:sp>
+        <p:nvSpPr>
+          <p:cNvPr id="23" name="TextBox 22">
+            <a:extLst>
+              <a:ext uri="{FF2B5EF4-FFF2-40B4-BE49-F238E27FC236}">
+                <a16:creationId xmlns="" xmlns:a16="http://schemas.microsoft.com/office/drawing/2014/main" id="{E0BBD6C8-C8F2-40C5-AA64-85961A11ADC2}"/>
+              </a:ext>
+            </a:extLst>
+          </p:cNvPr>
+          <p:cNvSpPr txBox="1"/>
+          <p:nvPr/>
+        </p:nvSpPr>
+        <p:spPr>
+          <a:xfrm>
+            <a:off x="3112152" y="1408599"/>
+            <a:ext cx="1063847" cy="276999"/>
+          </a:xfrm>
+          <a:prstGeom prst="rect">
+            <a:avLst/>
+          </a:prstGeom>
+          <a:noFill/>
+        </p:spPr>
+        <p:txBody>
+          <a:bodyPr wrap="square" rtlCol="0">
+            <a:spAutoFit/>
+          </a:bodyPr>
+          <a:lstStyle/>
+          <a:p>
+            <a:r>
+              <a:rPr lang="en-US" sz="1200" dirty="0"/>
+              <a:t>implements</a:t>
+            </a:r>
+          </a:p>
+        </p:txBody>
+      </p:sp>
+      <p:sp>
+        <p:nvSpPr>
+          <p:cNvPr id="25" name="Flowchart: Magnetic Disk 24"/>
+          <p:cNvSpPr/>
+          <p:nvPr/>
+        </p:nvSpPr>
+        <p:spPr>
+          <a:xfrm>
+            <a:off x="7400487" y="158383"/>
+            <a:ext cx="653404" cy="1018434"/>
+          </a:xfrm>
+          <a:prstGeom prst="flowChartMagneticDisk">
+            <a:avLst/>
+          </a:prstGeom>
+          <a:solidFill>
+            <a:schemeClr val="accent3"/>
+          </a:solidFill>
+        </p:spPr>
+        <p:style>
+          <a:lnRef idx="2">
+            <a:schemeClr val="accent1">
+              <a:shade val="50000"/>
+            </a:schemeClr>
+          </a:lnRef>
+          <a:fillRef idx="1">
+            <a:schemeClr val="accent1"/>
+          </a:fillRef>
+          <a:effectRef idx="0">
+            <a:schemeClr val="accent1"/>
+          </a:effectRef>
+          <a:fontRef idx="minor">
+            <a:schemeClr val="lt1"/>
+          </a:fontRef>
+        </p:style>
+        <p:txBody>
+          <a:bodyPr rtlCol="0" anchor="ctr"/>
+          <a:lstStyle/>
+          <a:p>
+            <a:pPr algn="ctr"/>
+            <a:r>
+              <a:rPr lang="en-US" dirty="0"/>
+              <a:t>DB</a:t>
+            </a:r>
+          </a:p>
+        </p:txBody>
+      </p:sp>
+      <p:cxnSp>
+        <p:nvCxnSpPr>
+          <p:cNvPr id="27" name="Straight Arrow Connector 26"/>
+          <p:cNvCxnSpPr>
+            <a:stCxn id="20" idx="3"/>
+            <a:endCxn id="25" idx="2"/>
+          </p:cNvCxnSpPr>
+          <p:nvPr/>
+        </p:nvCxnSpPr>
+        <p:spPr>
+          <a:xfrm flipV="1">
+            <a:off x="6258426" y="667600"/>
+            <a:ext cx="1142061" cy="1800287"/>
+          </a:xfrm>
+          <a:prstGeom prst="straightConnector1">
+            <a:avLst/>
+          </a:prstGeom>
+          <a:ln>
+            <a:tailEnd type="triangle"/>
+          </a:ln>
+        </p:spPr>
+        <p:style>
+          <a:lnRef idx="1">
+            <a:schemeClr val="accent1"/>
+          </a:lnRef>
+          <a:fillRef idx="0">
+            <a:schemeClr val="accent1"/>
+          </a:fillRef>
+          <a:effectRef idx="0">
+            <a:schemeClr val="accent1"/>
+          </a:effectRef>
+          <a:fontRef idx="minor">
+            <a:schemeClr val="tx1"/>
+          </a:fontRef>
+        </p:style>
+      </p:cxnSp>
+      <p:sp>
+        <p:nvSpPr>
+          <p:cNvPr id="28" name="TextBox 27">
+            <a:extLst>
+              <a:ext uri="{FF2B5EF4-FFF2-40B4-BE49-F238E27FC236}">
+                <a16:creationId xmlns="" xmlns:a16="http://schemas.microsoft.com/office/drawing/2014/main" id="{E0BBD6C8-C8F2-40C5-AA64-85961A11ADC2}"/>
+              </a:ext>
+            </a:extLst>
+          </p:cNvPr>
+          <p:cNvSpPr txBox="1"/>
+          <p:nvPr/>
+        </p:nvSpPr>
+        <p:spPr>
+          <a:xfrm>
+            <a:off x="6889602" y="1360525"/>
+            <a:ext cx="728932" cy="276999"/>
+          </a:xfrm>
+          <a:prstGeom prst="rect">
+            <a:avLst/>
+          </a:prstGeom>
+          <a:noFill/>
+        </p:spPr>
+        <p:txBody>
+          <a:bodyPr wrap="square" rtlCol="0">
+            <a:spAutoFit/>
+          </a:bodyPr>
+          <a:lstStyle/>
+          <a:p>
+            <a:r>
+              <a:rPr lang="en-US" sz="1200" dirty="0"/>
+              <a:t>access</a:t>
+            </a:r>
+          </a:p>
+        </p:txBody>
+      </p:sp>
+      <p:sp>
+        <p:nvSpPr>
+          <p:cNvPr id="29" name="Rectangle 28"/>
+          <p:cNvSpPr/>
+          <p:nvPr/>
+        </p:nvSpPr>
+        <p:spPr>
+          <a:xfrm>
+            <a:off x="4717928" y="4051852"/>
+            <a:ext cx="1494797" cy="991056"/>
+          </a:xfrm>
+          <a:prstGeom prst="rect">
+            <a:avLst/>
+          </a:prstGeom>
+          <a:solidFill>
+            <a:schemeClr val="accent6"/>
+          </a:solidFill>
+        </p:spPr>
+        <p:style>
+          <a:lnRef idx="2">
+            <a:schemeClr val="accent1">
+              <a:shade val="50000"/>
+            </a:schemeClr>
+          </a:lnRef>
+          <a:fillRef idx="1">
+            <a:schemeClr val="accent1"/>
+          </a:fillRef>
+          <a:effectRef idx="0">
+            <a:schemeClr val="accent1"/>
+          </a:effectRef>
+          <a:fontRef idx="minor">
+            <a:schemeClr val="lt1"/>
+          </a:fontRef>
+        </p:style>
+        <p:txBody>
+          <a:bodyPr rtlCol="0" anchor="ctr"/>
+          <a:lstStyle/>
+          <a:p>
+            <a:pPr algn="ctr"/>
+            <a:r>
+              <a:rPr lang="en-US" sz="1000" dirty="0"/>
+              <a:t>com.tlw8253.service</a:t>
+            </a:r>
+          </a:p>
+          <a:p>
+            <a:pPr algn="ctr"/>
+            <a:r>
+              <a:rPr lang="en-US" dirty="0"/>
+              <a:t>&lt;T&gt;Service</a:t>
+            </a:r>
+          </a:p>
+        </p:txBody>
+      </p:sp>
+      <p:cxnSp>
+        <p:nvCxnSpPr>
+          <p:cNvPr id="33" name="Straight Arrow Connector 32"/>
+          <p:cNvCxnSpPr>
+            <a:stCxn id="29" idx="0"/>
+            <a:endCxn id="20" idx="2"/>
+          </p:cNvCxnSpPr>
+          <p:nvPr/>
+        </p:nvCxnSpPr>
+        <p:spPr>
+          <a:xfrm flipH="1" flipV="1">
+            <a:off x="5463465" y="2963415"/>
+            <a:ext cx="1862" cy="1088437"/>
+          </a:xfrm>
+          <a:prstGeom prst="straightConnector1">
+            <a:avLst/>
+          </a:prstGeom>
+          <a:ln>
+            <a:tailEnd type="triangle"/>
+          </a:ln>
+        </p:spPr>
+        <p:style>
+          <a:lnRef idx="1">
+            <a:schemeClr val="accent1"/>
+          </a:lnRef>
+          <a:fillRef idx="0">
+            <a:schemeClr val="accent1"/>
+          </a:fillRef>
+          <a:effectRef idx="0">
+            <a:schemeClr val="accent1"/>
+          </a:effectRef>
+          <a:fontRef idx="minor">
+            <a:schemeClr val="tx1"/>
+          </a:fontRef>
+        </p:style>
+      </p:cxnSp>
+      <p:sp>
+        <p:nvSpPr>
+          <p:cNvPr id="34" name="TextBox 33">
+            <a:extLst>
+              <a:ext uri="{FF2B5EF4-FFF2-40B4-BE49-F238E27FC236}">
+                <a16:creationId xmlns="" xmlns:a16="http://schemas.microsoft.com/office/drawing/2014/main" id="{E0BBD6C8-C8F2-40C5-AA64-85961A11ADC2}"/>
+              </a:ext>
+            </a:extLst>
+          </p:cNvPr>
+          <p:cNvSpPr txBox="1"/>
+          <p:nvPr/>
+        </p:nvSpPr>
+        <p:spPr>
+          <a:xfrm>
+            <a:off x="5001782" y="3652968"/>
+            <a:ext cx="538098" cy="276999"/>
+          </a:xfrm>
+          <a:prstGeom prst="rect">
+            <a:avLst/>
+          </a:prstGeom>
+          <a:noFill/>
+        </p:spPr>
+        <p:txBody>
+          <a:bodyPr wrap="square" rtlCol="0">
+            <a:spAutoFit/>
+          </a:bodyPr>
+          <a:lstStyle/>
+          <a:p>
+            <a:r>
+              <a:rPr lang="en-US" sz="1200" dirty="0"/>
+              <a:t>uses</a:t>
+            </a:r>
+          </a:p>
+        </p:txBody>
+      </p:sp>
+      <p:sp>
+        <p:nvSpPr>
+          <p:cNvPr id="35" name="Rectangle 34"/>
+          <p:cNvSpPr/>
+          <p:nvPr/>
+        </p:nvSpPr>
+        <p:spPr>
+          <a:xfrm>
+            <a:off x="949569" y="2293030"/>
+            <a:ext cx="1998489" cy="657053"/>
+          </a:xfrm>
+          <a:prstGeom prst="rect">
+            <a:avLst/>
+          </a:prstGeom>
+          <a:solidFill>
+            <a:schemeClr val="accent6"/>
+          </a:solidFill>
+        </p:spPr>
+        <p:style>
+          <a:lnRef idx="2">
+            <a:schemeClr val="accent1">
+              <a:shade val="50000"/>
+            </a:schemeClr>
+          </a:lnRef>
+          <a:fillRef idx="1">
+            <a:schemeClr val="accent1"/>
+          </a:fillRef>
+          <a:effectRef idx="0">
+            <a:schemeClr val="accent1"/>
+          </a:effectRef>
+          <a:fontRef idx="minor">
+            <a:schemeClr val="lt1"/>
+          </a:fontRef>
+        </p:style>
+        <p:txBody>
+          <a:bodyPr rtlCol="0" anchor="ctr"/>
+          <a:lstStyle/>
+          <a:p>
+            <a:pPr algn="ctr"/>
+            <a:r>
+              <a:rPr lang="en-US" sz="1000" dirty="0"/>
+              <a:t>com.tlw8253.exception</a:t>
+            </a:r>
+          </a:p>
+          <a:p>
+            <a:pPr algn="ctr"/>
+            <a:r>
+              <a:rPr lang="en-US" sz="1400" dirty="0" err="1"/>
+              <a:t>BadParameterException</a:t>
+            </a:r>
+            <a:endParaRPr lang="en-US" sz="1400" dirty="0"/>
+          </a:p>
+        </p:txBody>
+      </p:sp>
+      <p:cxnSp>
+        <p:nvCxnSpPr>
+          <p:cNvPr id="37" name="Straight Arrow Connector 36"/>
+          <p:cNvCxnSpPr>
+            <a:cxnSpLocks/>
+            <a:stCxn id="29" idx="1"/>
+            <a:endCxn id="35" idx="3"/>
+          </p:cNvCxnSpPr>
+          <p:nvPr/>
+        </p:nvCxnSpPr>
+        <p:spPr>
+          <a:xfrm flipH="1" flipV="1">
+            <a:off x="2948058" y="2621557"/>
+            <a:ext cx="1769870" cy="1925823"/>
+          </a:xfrm>
+          <a:prstGeom prst="straightConnector1">
+            <a:avLst/>
+          </a:prstGeom>
+          <a:ln>
+            <a:tailEnd type="triangle"/>
+          </a:ln>
+        </p:spPr>
+        <p:style>
+          <a:lnRef idx="1">
+            <a:schemeClr val="accent1"/>
+          </a:lnRef>
+          <a:fillRef idx="0">
+            <a:schemeClr val="accent1"/>
+          </a:fillRef>
+          <a:effectRef idx="0">
+            <a:schemeClr val="accent1"/>
+          </a:effectRef>
+          <a:fontRef idx="minor">
+            <a:schemeClr val="tx1"/>
+          </a:fontRef>
+        </p:style>
+      </p:cxnSp>
+      <p:sp>
+        <p:nvSpPr>
+          <p:cNvPr id="38" name="TextBox 37">
+            <a:extLst>
+              <a:ext uri="{FF2B5EF4-FFF2-40B4-BE49-F238E27FC236}">
+                <a16:creationId xmlns="" xmlns:a16="http://schemas.microsoft.com/office/drawing/2014/main" id="{E0BBD6C8-C8F2-40C5-AA64-85961A11ADC2}"/>
+              </a:ext>
+            </a:extLst>
+          </p:cNvPr>
+          <p:cNvSpPr txBox="1"/>
+          <p:nvPr/>
+        </p:nvSpPr>
+        <p:spPr>
+          <a:xfrm>
+            <a:off x="3673623" y="3721656"/>
+            <a:ext cx="728932" cy="276999"/>
+          </a:xfrm>
+          <a:prstGeom prst="rect">
+            <a:avLst/>
+          </a:prstGeom>
+          <a:noFill/>
+        </p:spPr>
+        <p:txBody>
+          <a:bodyPr wrap="square" rtlCol="0">
+            <a:spAutoFit/>
+          </a:bodyPr>
+          <a:lstStyle/>
+          <a:p>
+            <a:r>
+              <a:rPr lang="en-US" sz="1200" dirty="0"/>
+              <a:t>throws</a:t>
+            </a:r>
+          </a:p>
+        </p:txBody>
+      </p:sp>
+      <p:sp>
+        <p:nvSpPr>
+          <p:cNvPr id="39" name="Rectangle 38"/>
+          <p:cNvSpPr/>
+          <p:nvPr/>
+        </p:nvSpPr>
+        <p:spPr>
+          <a:xfrm>
+            <a:off x="4550736" y="360554"/>
+            <a:ext cx="1822194" cy="991056"/>
+          </a:xfrm>
+          <a:prstGeom prst="rect">
+            <a:avLst/>
+          </a:prstGeom>
+          <a:solidFill>
+            <a:schemeClr val="accent6"/>
+          </a:solidFill>
+        </p:spPr>
+        <p:style>
+          <a:lnRef idx="2">
+            <a:schemeClr val="accent1">
+              <a:shade val="50000"/>
+            </a:schemeClr>
+          </a:lnRef>
+          <a:fillRef idx="1">
+            <a:schemeClr val="accent1"/>
+          </a:fillRef>
+          <a:effectRef idx="0">
+            <a:schemeClr val="accent1"/>
+          </a:effectRef>
+          <a:fontRef idx="minor">
+            <a:schemeClr val="lt1"/>
+          </a:fontRef>
+        </p:style>
+        <p:txBody>
+          <a:bodyPr rtlCol="0" anchor="ctr"/>
+          <a:lstStyle/>
+          <a:p>
+            <a:pPr algn="ctr"/>
+            <a:r>
+              <a:rPr lang="en-US" sz="1000" dirty="0"/>
+              <a:t>com.tlw8253.utility</a:t>
+            </a:r>
+          </a:p>
+          <a:p>
+            <a:pPr algn="ctr"/>
+            <a:r>
+              <a:rPr lang="en-US" dirty="0"/>
+              <a:t>Hibernate</a:t>
+            </a:r>
+          </a:p>
+          <a:p>
+            <a:pPr algn="ctr"/>
+            <a:r>
+              <a:rPr lang="en-US" sz="1200" dirty="0" err="1"/>
+              <a:t>SessionFactorySingleton</a:t>
+            </a:r>
+            <a:endParaRPr lang="en-US" sz="1200" dirty="0"/>
+          </a:p>
+        </p:txBody>
+      </p:sp>
+      <p:cxnSp>
+        <p:nvCxnSpPr>
+          <p:cNvPr id="41" name="Straight Arrow Connector 40"/>
+          <p:cNvCxnSpPr>
+            <a:cxnSpLocks/>
+            <a:stCxn id="20" idx="0"/>
+            <a:endCxn id="39" idx="2"/>
+          </p:cNvCxnSpPr>
+          <p:nvPr/>
+        </p:nvCxnSpPr>
+        <p:spPr>
+          <a:xfrm flipH="1" flipV="1">
+            <a:off x="5461833" y="1351610"/>
+            <a:ext cx="1632" cy="620749"/>
+          </a:xfrm>
+          <a:prstGeom prst="straightConnector1">
+            <a:avLst/>
+          </a:prstGeom>
+          <a:ln>
+            <a:tailEnd type="triangle"/>
+          </a:ln>
+        </p:spPr>
+        <p:style>
+          <a:lnRef idx="1">
+            <a:schemeClr val="accent1"/>
+          </a:lnRef>
+          <a:fillRef idx="0">
+            <a:schemeClr val="accent1"/>
+          </a:fillRef>
+          <a:effectRef idx="0">
+            <a:schemeClr val="accent1"/>
+          </a:effectRef>
+          <a:fontRef idx="minor">
+            <a:schemeClr val="tx1"/>
+          </a:fontRef>
+        </p:style>
+      </p:cxnSp>
+      <p:cxnSp>
+        <p:nvCxnSpPr>
+          <p:cNvPr id="43" name="Straight Arrow Connector 42"/>
+          <p:cNvCxnSpPr>
+            <a:cxnSpLocks/>
+            <a:stCxn id="39" idx="3"/>
+            <a:endCxn id="25" idx="2"/>
+          </p:cNvCxnSpPr>
+          <p:nvPr/>
+        </p:nvCxnSpPr>
+        <p:spPr>
+          <a:xfrm flipV="1">
+            <a:off x="6372930" y="667600"/>
+            <a:ext cx="1027557" cy="188482"/>
+          </a:xfrm>
+          <a:prstGeom prst="straightConnector1">
+            <a:avLst/>
+          </a:prstGeom>
+          <a:ln>
+            <a:tailEnd type="triangle"/>
+          </a:ln>
+        </p:spPr>
+        <p:style>
+          <a:lnRef idx="1">
+            <a:schemeClr val="accent1"/>
+          </a:lnRef>
+          <a:fillRef idx="0">
+            <a:schemeClr val="accent1"/>
+          </a:fillRef>
+          <a:effectRef idx="0">
+            <a:schemeClr val="accent1"/>
+          </a:effectRef>
+          <a:fontRef idx="minor">
+            <a:schemeClr val="tx1"/>
+          </a:fontRef>
+        </p:style>
+      </p:cxnSp>
+      <p:sp>
+        <p:nvSpPr>
+          <p:cNvPr id="44" name="TextBox 43">
+            <a:extLst>
+              <a:ext uri="{FF2B5EF4-FFF2-40B4-BE49-F238E27FC236}">
+                <a16:creationId xmlns="" xmlns:a16="http://schemas.microsoft.com/office/drawing/2014/main" id="{E0BBD6C8-C8F2-40C5-AA64-85961A11ADC2}"/>
+              </a:ext>
+            </a:extLst>
+          </p:cNvPr>
+          <p:cNvSpPr txBox="1"/>
+          <p:nvPr/>
+        </p:nvSpPr>
+        <p:spPr>
+          <a:xfrm>
+            <a:off x="5450658" y="1491310"/>
+            <a:ext cx="728932" cy="276999"/>
+          </a:xfrm>
+          <a:prstGeom prst="rect">
+            <a:avLst/>
+          </a:prstGeom>
+          <a:noFill/>
+        </p:spPr>
+        <p:txBody>
+          <a:bodyPr wrap="square" rtlCol="0">
+            <a:spAutoFit/>
+          </a:bodyPr>
+          <a:lstStyle/>
+          <a:p>
+            <a:r>
+              <a:rPr lang="en-US" sz="1200" dirty="0"/>
+              <a:t>uses</a:t>
+            </a:r>
+          </a:p>
+        </p:txBody>
+      </p:sp>
+      <p:sp>
+        <p:nvSpPr>
+          <p:cNvPr id="45" name="TextBox 44">
+            <a:extLst>
+              <a:ext uri="{FF2B5EF4-FFF2-40B4-BE49-F238E27FC236}">
+                <a16:creationId xmlns="" xmlns:a16="http://schemas.microsoft.com/office/drawing/2014/main" id="{E0BBD6C8-C8F2-40C5-AA64-85961A11ADC2}"/>
+              </a:ext>
+            </a:extLst>
+          </p:cNvPr>
+          <p:cNvSpPr txBox="1"/>
+          <p:nvPr/>
+        </p:nvSpPr>
+        <p:spPr>
+          <a:xfrm>
+            <a:off x="6457552" y="622132"/>
+            <a:ext cx="864099" cy="646331"/>
+          </a:xfrm>
+          <a:prstGeom prst="rect">
+            <a:avLst/>
+          </a:prstGeom>
+          <a:noFill/>
+        </p:spPr>
+        <p:txBody>
+          <a:bodyPr wrap="square" rtlCol="0">
+            <a:spAutoFit/>
+          </a:bodyPr>
+          <a:lstStyle/>
+          <a:p>
+            <a:r>
+              <a:rPr lang="en-US" sz="1200" dirty="0"/>
+              <a:t>connects</a:t>
+            </a:r>
+          </a:p>
+          <a:p>
+            <a:r>
+              <a:rPr lang="en-US" sz="1200" dirty="0"/>
+              <a:t>creates</a:t>
+            </a:r>
+          </a:p>
+          <a:p>
+            <a:r>
+              <a:rPr lang="en-US" sz="1200" dirty="0"/>
+              <a:t>updates</a:t>
+            </a:r>
+          </a:p>
+        </p:txBody>
+      </p:sp>
+      <p:sp>
+        <p:nvSpPr>
+          <p:cNvPr id="26" name="TextBox 25">
+            <a:extLst>
+              <a:ext uri="{FF2B5EF4-FFF2-40B4-BE49-F238E27FC236}">
+                <a16:creationId xmlns="" xmlns:a16="http://schemas.microsoft.com/office/drawing/2014/main" id="{6C45E26E-8FEE-4439-A34B-789237C9C62C}"/>
+              </a:ext>
+            </a:extLst>
+          </p:cNvPr>
+          <p:cNvSpPr txBox="1"/>
+          <p:nvPr/>
+        </p:nvSpPr>
+        <p:spPr>
+          <a:xfrm>
+            <a:off x="0" y="30549"/>
+            <a:ext cx="4944934" cy="369332"/>
+          </a:xfrm>
+          <a:prstGeom prst="rect">
+            <a:avLst/>
+          </a:prstGeom>
+          <a:noFill/>
+        </p:spPr>
+        <p:txBody>
+          <a:bodyPr wrap="square" rtlCol="0">
+            <a:spAutoFit/>
+          </a:bodyPr>
+          <a:lstStyle/>
+          <a:p>
+            <a:r>
+              <a:rPr lang="en-US" dirty="0" smtClean="0"/>
+              <a:t>AMT Project </a:t>
+            </a:r>
+            <a:r>
+              <a:rPr lang="en-US" dirty="0"/>
+              <a:t>Generic&lt;T&gt; Process Flow Model</a:t>
+            </a:r>
+          </a:p>
+        </p:txBody>
+      </p:sp>
+      <p:sp>
+        <p:nvSpPr>
+          <p:cNvPr id="31" name="Rectangle 30">
+            <a:extLst>
+              <a:ext uri="{FF2B5EF4-FFF2-40B4-BE49-F238E27FC236}">
+                <a16:creationId xmlns="" xmlns:a16="http://schemas.microsoft.com/office/drawing/2014/main" id="{6D396BFC-10E0-4935-903B-EDC457BD1755}"/>
+              </a:ext>
+            </a:extLst>
+          </p:cNvPr>
+          <p:cNvSpPr/>
+          <p:nvPr/>
+        </p:nvSpPr>
+        <p:spPr>
+          <a:xfrm>
+            <a:off x="897901" y="3410601"/>
+            <a:ext cx="1621682" cy="657053"/>
+          </a:xfrm>
+          <a:prstGeom prst="rect">
+            <a:avLst/>
+          </a:prstGeom>
+          <a:solidFill>
+            <a:schemeClr val="accent6"/>
+          </a:solidFill>
+        </p:spPr>
+        <p:style>
+          <a:lnRef idx="2">
+            <a:schemeClr val="accent1">
+              <a:shade val="50000"/>
+            </a:schemeClr>
+          </a:lnRef>
+          <a:fillRef idx="1">
+            <a:schemeClr val="accent1"/>
+          </a:fillRef>
+          <a:effectRef idx="0">
+            <a:schemeClr val="accent1"/>
+          </a:effectRef>
+          <a:fontRef idx="minor">
+            <a:schemeClr val="lt1"/>
+          </a:fontRef>
+        </p:style>
+        <p:txBody>
+          <a:bodyPr rtlCol="0" anchor="ctr"/>
+          <a:lstStyle/>
+          <a:p>
+            <a:pPr algn="ctr"/>
+            <a:r>
+              <a:rPr lang="en-US" sz="1000" dirty="0"/>
+              <a:t>com.tlw8253.exception</a:t>
+            </a:r>
+          </a:p>
+          <a:p>
+            <a:pPr algn="ctr"/>
+            <a:r>
+              <a:rPr lang="en-US" sz="1400" dirty="0" err="1"/>
+              <a:t>DatabaseException</a:t>
+            </a:r>
+            <a:endParaRPr lang="en-US" sz="1400" dirty="0"/>
+          </a:p>
+        </p:txBody>
+      </p:sp>
+      <p:sp>
+        <p:nvSpPr>
+          <p:cNvPr id="32" name="Rectangle 31">
+            <a:extLst>
+              <a:ext uri="{FF2B5EF4-FFF2-40B4-BE49-F238E27FC236}">
+                <a16:creationId xmlns="" xmlns:a16="http://schemas.microsoft.com/office/drawing/2014/main" id="{02A645C8-F11F-438D-92DC-F6FCCA5ECFB8}"/>
+              </a:ext>
+            </a:extLst>
+          </p:cNvPr>
+          <p:cNvSpPr/>
+          <p:nvPr/>
+        </p:nvSpPr>
+        <p:spPr>
+          <a:xfrm>
+            <a:off x="1302075" y="4606565"/>
+            <a:ext cx="2048896" cy="657053"/>
+          </a:xfrm>
+          <a:prstGeom prst="rect">
+            <a:avLst/>
+          </a:prstGeom>
+          <a:solidFill>
+            <a:schemeClr val="accent6"/>
+          </a:solidFill>
+        </p:spPr>
+        <p:style>
+          <a:lnRef idx="2">
+            <a:schemeClr val="accent1">
+              <a:shade val="50000"/>
+            </a:schemeClr>
+          </a:lnRef>
+          <a:fillRef idx="1">
+            <a:schemeClr val="accent1"/>
+          </a:fillRef>
+          <a:effectRef idx="0">
+            <a:schemeClr val="accent1"/>
+          </a:effectRef>
+          <a:fontRef idx="minor">
+            <a:schemeClr val="lt1"/>
+          </a:fontRef>
+        </p:style>
+        <p:txBody>
+          <a:bodyPr rtlCol="0" anchor="ctr"/>
+          <a:lstStyle/>
+          <a:p>
+            <a:pPr algn="ctr"/>
+            <a:r>
+              <a:rPr lang="en-US" sz="1000" dirty="0"/>
+              <a:t>com.tlw8253.exception</a:t>
+            </a:r>
+          </a:p>
+          <a:p>
+            <a:pPr algn="ctr"/>
+            <a:r>
+              <a:rPr lang="en-US" sz="1300" dirty="0" err="1"/>
+              <a:t>RecordNotFoundException</a:t>
+            </a:r>
+            <a:endParaRPr lang="en-US" sz="1300" dirty="0"/>
+          </a:p>
+        </p:txBody>
+      </p:sp>
+      <p:cxnSp>
+        <p:nvCxnSpPr>
+          <p:cNvPr id="12" name="Straight Arrow Connector 11">
+            <a:extLst>
+              <a:ext uri="{FF2B5EF4-FFF2-40B4-BE49-F238E27FC236}">
+                <a16:creationId xmlns="" xmlns:a16="http://schemas.microsoft.com/office/drawing/2014/main" id="{FF2076CA-F897-4293-B6CD-7408EB452156}"/>
+              </a:ext>
+            </a:extLst>
+          </p:cNvPr>
+          <p:cNvCxnSpPr>
+            <a:cxnSpLocks/>
+            <a:stCxn id="29" idx="1"/>
+            <a:endCxn id="31" idx="3"/>
+          </p:cNvCxnSpPr>
+          <p:nvPr/>
+        </p:nvCxnSpPr>
+        <p:spPr>
+          <a:xfrm flipH="1" flipV="1">
+            <a:off x="2519583" y="3739128"/>
+            <a:ext cx="2198345" cy="808252"/>
+          </a:xfrm>
+          <a:prstGeom prst="straightConnector1">
+            <a:avLst/>
+          </a:prstGeom>
+          <a:ln>
+            <a:tailEnd type="triangle"/>
+          </a:ln>
+        </p:spPr>
+        <p:style>
+          <a:lnRef idx="1">
+            <a:schemeClr val="accent1"/>
+          </a:lnRef>
+          <a:fillRef idx="0">
+            <a:schemeClr val="accent1"/>
+          </a:fillRef>
+          <a:effectRef idx="0">
+            <a:schemeClr val="accent1"/>
+          </a:effectRef>
+          <a:fontRef idx="minor">
+            <a:schemeClr val="tx1"/>
+          </a:fontRef>
+        </p:style>
+      </p:cxnSp>
+      <p:cxnSp>
+        <p:nvCxnSpPr>
+          <p:cNvPr id="14" name="Straight Arrow Connector 13">
+            <a:extLst>
+              <a:ext uri="{FF2B5EF4-FFF2-40B4-BE49-F238E27FC236}">
+                <a16:creationId xmlns="" xmlns:a16="http://schemas.microsoft.com/office/drawing/2014/main" id="{5C625B7B-4A1E-46C5-9082-4FEC89B30DA9}"/>
+              </a:ext>
+            </a:extLst>
+          </p:cNvPr>
+          <p:cNvCxnSpPr>
+            <a:cxnSpLocks/>
+            <a:stCxn id="29" idx="1"/>
+            <a:endCxn id="32" idx="0"/>
+          </p:cNvCxnSpPr>
+          <p:nvPr/>
+        </p:nvCxnSpPr>
+        <p:spPr>
+          <a:xfrm flipH="1">
+            <a:off x="2326523" y="4547380"/>
+            <a:ext cx="2391405" cy="59185"/>
+          </a:xfrm>
+          <a:prstGeom prst="straightConnector1">
+            <a:avLst/>
+          </a:prstGeom>
+          <a:ln>
+            <a:tailEnd type="triangle"/>
+          </a:ln>
+        </p:spPr>
+        <p:style>
+          <a:lnRef idx="1">
+            <a:schemeClr val="accent1"/>
+          </a:lnRef>
+          <a:fillRef idx="0">
+            <a:schemeClr val="accent1"/>
+          </a:fillRef>
+          <a:effectRef idx="0">
+            <a:schemeClr val="accent1"/>
+          </a:effectRef>
+          <a:fontRef idx="minor">
+            <a:schemeClr val="tx1"/>
+          </a:fontRef>
+        </p:style>
+      </p:cxnSp>
+      <p:cxnSp>
+        <p:nvCxnSpPr>
+          <p:cNvPr id="65" name="Straight Arrow Connector 64">
+            <a:extLst>
+              <a:ext uri="{FF2B5EF4-FFF2-40B4-BE49-F238E27FC236}">
+                <a16:creationId xmlns="" xmlns:a16="http://schemas.microsoft.com/office/drawing/2014/main" id="{C1C9B843-1D11-4D9F-8CBF-AE00E90AA070}"/>
+              </a:ext>
+            </a:extLst>
+          </p:cNvPr>
+          <p:cNvCxnSpPr>
+            <a:stCxn id="25" idx="2"/>
+            <a:endCxn id="20" idx="3"/>
+          </p:cNvCxnSpPr>
+          <p:nvPr/>
+        </p:nvCxnSpPr>
+        <p:spPr>
+          <a:xfrm flipH="1">
+            <a:off x="6258426" y="667600"/>
+            <a:ext cx="1142061" cy="1800287"/>
+          </a:xfrm>
+          <a:prstGeom prst="straightConnector1">
+            <a:avLst/>
+          </a:prstGeom>
+          <a:ln>
+            <a:tailEnd type="triangle"/>
+          </a:ln>
+        </p:spPr>
+        <p:style>
+          <a:lnRef idx="1">
+            <a:schemeClr val="accent1"/>
+          </a:lnRef>
+          <a:fillRef idx="0">
+            <a:schemeClr val="accent1"/>
+          </a:fillRef>
+          <a:effectRef idx="0">
+            <a:schemeClr val="accent1"/>
+          </a:effectRef>
+          <a:fontRef idx="minor">
+            <a:schemeClr val="tx1"/>
+          </a:fontRef>
+        </p:style>
+      </p:cxnSp>
+      <p:sp>
+        <p:nvSpPr>
+          <p:cNvPr id="66" name="TextBox 65">
+            <a:extLst>
+              <a:ext uri="{FF2B5EF4-FFF2-40B4-BE49-F238E27FC236}">
+                <a16:creationId xmlns="" xmlns:a16="http://schemas.microsoft.com/office/drawing/2014/main" id="{5E4B2700-0522-40EF-B035-166AA1C17D76}"/>
+              </a:ext>
+            </a:extLst>
+          </p:cNvPr>
+          <p:cNvSpPr txBox="1"/>
+          <p:nvPr/>
+        </p:nvSpPr>
+        <p:spPr>
+          <a:xfrm>
+            <a:off x="7618534" y="1640699"/>
+            <a:ext cx="728932" cy="276999"/>
+          </a:xfrm>
+          <a:prstGeom prst="rect">
+            <a:avLst/>
+          </a:prstGeom>
+          <a:noFill/>
+        </p:spPr>
+        <p:txBody>
+          <a:bodyPr wrap="square" rtlCol="0">
+            <a:spAutoFit/>
+          </a:bodyPr>
+          <a:lstStyle/>
+          <a:p>
+            <a:r>
+              <a:rPr lang="en-US" sz="1200" dirty="0"/>
+              <a:t>returns</a:t>
+            </a:r>
+          </a:p>
+        </p:txBody>
+      </p:sp>
+      <p:sp>
+        <p:nvSpPr>
+          <p:cNvPr id="46" name="Rectangle 45"/>
+          <p:cNvSpPr/>
+          <p:nvPr/>
+        </p:nvSpPr>
+        <p:spPr>
+          <a:xfrm>
+            <a:off x="7361772" y="4678197"/>
+            <a:ext cx="1678916" cy="991056"/>
+          </a:xfrm>
+          <a:prstGeom prst="rect">
+            <a:avLst/>
+          </a:prstGeom>
+          <a:solidFill>
+            <a:schemeClr val="accent6"/>
+          </a:solidFill>
+        </p:spPr>
+        <p:style>
+          <a:lnRef idx="2">
+            <a:schemeClr val="accent1">
+              <a:shade val="50000"/>
+            </a:schemeClr>
+          </a:lnRef>
+          <a:fillRef idx="1">
+            <a:schemeClr val="accent1"/>
+          </a:fillRef>
+          <a:effectRef idx="0">
+            <a:schemeClr val="accent1"/>
+          </a:effectRef>
+          <a:fontRef idx="minor">
+            <a:schemeClr val="lt1"/>
+          </a:fontRef>
+        </p:style>
+        <p:txBody>
+          <a:bodyPr rtlCol="0" anchor="ctr"/>
+          <a:lstStyle/>
+          <a:p>
+            <a:pPr algn="ctr"/>
+            <a:r>
+              <a:rPr lang="en-US" sz="1000" dirty="0"/>
+              <a:t>com.tlw8253.controller</a:t>
+            </a:r>
+          </a:p>
+          <a:p>
+            <a:pPr algn="ctr"/>
+            <a:r>
+              <a:rPr lang="en-US" dirty="0"/>
+              <a:t>&lt;T&gt;Controller</a:t>
+            </a:r>
+          </a:p>
+        </p:txBody>
+      </p:sp>
+      <p:cxnSp>
+        <p:nvCxnSpPr>
+          <p:cNvPr id="47" name="Straight Arrow Connector 46"/>
+          <p:cNvCxnSpPr>
+            <a:stCxn id="46" idx="1"/>
+            <a:endCxn id="29" idx="3"/>
+          </p:cNvCxnSpPr>
+          <p:nvPr/>
+        </p:nvCxnSpPr>
+        <p:spPr>
+          <a:xfrm flipH="1" flipV="1">
+            <a:off x="6212725" y="4547380"/>
+            <a:ext cx="1149047" cy="626345"/>
+          </a:xfrm>
+          <a:prstGeom prst="straightConnector1">
+            <a:avLst/>
+          </a:prstGeom>
+          <a:ln>
+            <a:tailEnd type="triangle"/>
+          </a:ln>
+        </p:spPr>
+        <p:style>
+          <a:lnRef idx="1">
+            <a:schemeClr val="accent1"/>
+          </a:lnRef>
+          <a:fillRef idx="0">
+            <a:schemeClr val="accent1"/>
+          </a:fillRef>
+          <a:effectRef idx="0">
+            <a:schemeClr val="accent1"/>
+          </a:effectRef>
+          <a:fontRef idx="minor">
+            <a:schemeClr val="tx1"/>
+          </a:fontRef>
+        </p:style>
+      </p:cxnSp>
+      <p:sp>
+        <p:nvSpPr>
+          <p:cNvPr id="48" name="TextBox 47">
+            <a:extLst>
+              <a:ext uri="{FF2B5EF4-FFF2-40B4-BE49-F238E27FC236}">
+                <a16:creationId xmlns="" xmlns:a16="http://schemas.microsoft.com/office/drawing/2014/main" id="{E0BBD6C8-C8F2-40C5-AA64-85961A11ADC2}"/>
+              </a:ext>
+            </a:extLst>
+          </p:cNvPr>
+          <p:cNvSpPr txBox="1"/>
+          <p:nvPr/>
+        </p:nvSpPr>
+        <p:spPr>
+          <a:xfrm>
+            <a:off x="6444271" y="4320994"/>
+            <a:ext cx="728932" cy="276999"/>
+          </a:xfrm>
+          <a:prstGeom prst="rect">
+            <a:avLst/>
+          </a:prstGeom>
+          <a:noFill/>
+        </p:spPr>
+        <p:txBody>
+          <a:bodyPr wrap="square" rtlCol="0">
+            <a:spAutoFit/>
+          </a:bodyPr>
+          <a:lstStyle/>
+          <a:p>
+            <a:r>
+              <a:rPr lang="en-US" sz="1200" dirty="0"/>
+              <a:t>controls</a:t>
+            </a:r>
+          </a:p>
+        </p:txBody>
+      </p:sp>
+      <p:sp>
+        <p:nvSpPr>
+          <p:cNvPr id="52" name="Rectangle 51">
+            <a:extLst>
+              <a:ext uri="{FF2B5EF4-FFF2-40B4-BE49-F238E27FC236}">
+                <a16:creationId xmlns="" xmlns:a16="http://schemas.microsoft.com/office/drawing/2014/main" id="{21B869D6-66CB-4B38-975F-B7FEB6AA9B13}"/>
+              </a:ext>
+            </a:extLst>
+          </p:cNvPr>
+          <p:cNvSpPr/>
+          <p:nvPr/>
+        </p:nvSpPr>
+        <p:spPr>
+          <a:xfrm>
+            <a:off x="9186924" y="4643673"/>
+            <a:ext cx="2844400" cy="224286"/>
+          </a:xfrm>
+          <a:prstGeom prst="rect">
+            <a:avLst/>
+          </a:prstGeom>
+        </p:spPr>
+        <p:style>
+          <a:lnRef idx="2">
+            <a:schemeClr val="accent3">
+              <a:shade val="50000"/>
+            </a:schemeClr>
+          </a:lnRef>
+          <a:fillRef idx="1">
+            <a:schemeClr val="accent3"/>
+          </a:fillRef>
+          <a:effectRef idx="0">
+            <a:schemeClr val="accent3"/>
+          </a:effectRef>
+          <a:fontRef idx="minor">
+            <a:schemeClr val="lt1"/>
+          </a:fontRef>
+        </p:style>
+        <p:txBody>
+          <a:bodyPr rtlCol="0" anchor="ctr"/>
+          <a:lstStyle/>
+          <a:p>
+            <a:pPr algn="ctr"/>
+            <a:r>
+              <a:rPr lang="en-US" dirty="0"/>
+              <a:t>HTTP Request / Response</a:t>
+            </a:r>
+          </a:p>
+        </p:txBody>
+      </p:sp>
+      <p:cxnSp>
+        <p:nvCxnSpPr>
+          <p:cNvPr id="51" name="Straight Arrow Connector 50"/>
+          <p:cNvCxnSpPr>
+            <a:cxnSpLocks/>
+            <a:stCxn id="46" idx="3"/>
+            <a:endCxn id="52" idx="2"/>
+          </p:cNvCxnSpPr>
+          <p:nvPr/>
+        </p:nvCxnSpPr>
+        <p:spPr>
+          <a:xfrm flipV="1">
+            <a:off x="9040688" y="4867959"/>
+            <a:ext cx="1568436" cy="305766"/>
+          </a:xfrm>
+          <a:prstGeom prst="straightConnector1">
+            <a:avLst/>
+          </a:prstGeom>
+          <a:ln>
+            <a:tailEnd type="triangle"/>
+          </a:ln>
+        </p:spPr>
+        <p:style>
+          <a:lnRef idx="1">
+            <a:schemeClr val="accent1"/>
+          </a:lnRef>
+          <a:fillRef idx="0">
+            <a:schemeClr val="accent1"/>
+          </a:fillRef>
+          <a:effectRef idx="0">
+            <a:schemeClr val="accent1"/>
+          </a:effectRef>
+          <a:fontRef idx="minor">
+            <a:schemeClr val="tx1"/>
+          </a:fontRef>
+        </p:style>
+      </p:cxnSp>
+      <p:cxnSp>
+        <p:nvCxnSpPr>
+          <p:cNvPr id="55" name="Straight Arrow Connector 54"/>
+          <p:cNvCxnSpPr>
+            <a:cxnSpLocks/>
+            <a:stCxn id="52" idx="2"/>
+            <a:endCxn id="46" idx="3"/>
+          </p:cNvCxnSpPr>
+          <p:nvPr/>
+        </p:nvCxnSpPr>
+        <p:spPr>
+          <a:xfrm flipH="1">
+            <a:off x="9040688" y="4867959"/>
+            <a:ext cx="1568436" cy="305766"/>
+          </a:xfrm>
+          <a:prstGeom prst="straightConnector1">
+            <a:avLst/>
+          </a:prstGeom>
+          <a:ln>
+            <a:tailEnd type="triangle"/>
+          </a:ln>
+        </p:spPr>
+        <p:style>
+          <a:lnRef idx="1">
+            <a:schemeClr val="accent1"/>
+          </a:lnRef>
+          <a:fillRef idx="0">
+            <a:schemeClr val="accent1"/>
+          </a:fillRef>
+          <a:effectRef idx="0">
+            <a:schemeClr val="accent1"/>
+          </a:effectRef>
+          <a:fontRef idx="minor">
+            <a:schemeClr val="tx1"/>
+          </a:fontRef>
+        </p:style>
+      </p:cxnSp>
+      <p:sp>
+        <p:nvSpPr>
+          <p:cNvPr id="58" name="TextBox 57">
+            <a:extLst>
+              <a:ext uri="{FF2B5EF4-FFF2-40B4-BE49-F238E27FC236}">
+                <a16:creationId xmlns="" xmlns:a16="http://schemas.microsoft.com/office/drawing/2014/main" id="{E0BBD6C8-C8F2-40C5-AA64-85961A11ADC2}"/>
+              </a:ext>
+            </a:extLst>
+          </p:cNvPr>
+          <p:cNvSpPr txBox="1"/>
+          <p:nvPr/>
+        </p:nvSpPr>
+        <p:spPr>
+          <a:xfrm>
+            <a:off x="9572847" y="5006032"/>
+            <a:ext cx="843694" cy="276999"/>
+          </a:xfrm>
+          <a:prstGeom prst="rect">
+            <a:avLst/>
+          </a:prstGeom>
+          <a:noFill/>
+        </p:spPr>
+        <p:txBody>
+          <a:bodyPr wrap="square" rtlCol="0">
+            <a:spAutoFit/>
+          </a:bodyPr>
+          <a:lstStyle/>
+          <a:p>
+            <a:r>
+              <a:rPr lang="en-US" sz="1200" dirty="0"/>
+              <a:t>processes</a:t>
+            </a:r>
+          </a:p>
+        </p:txBody>
+      </p:sp>
+      <p:cxnSp>
+        <p:nvCxnSpPr>
+          <p:cNvPr id="91" name="Straight Arrow Connector 90"/>
+          <p:cNvCxnSpPr>
+            <a:cxnSpLocks/>
+            <a:stCxn id="29" idx="3"/>
+            <a:endCxn id="15" idx="1"/>
+          </p:cNvCxnSpPr>
+          <p:nvPr/>
+        </p:nvCxnSpPr>
+        <p:spPr>
+          <a:xfrm flipV="1">
+            <a:off x="6212725" y="3304776"/>
+            <a:ext cx="1221138" cy="1242604"/>
+          </a:xfrm>
+          <a:prstGeom prst="straightConnector1">
+            <a:avLst/>
+          </a:prstGeom>
+          <a:ln>
+            <a:tailEnd type="triangle"/>
+          </a:ln>
+        </p:spPr>
+        <p:style>
+          <a:lnRef idx="1">
+            <a:schemeClr val="accent1"/>
+          </a:lnRef>
+          <a:fillRef idx="0">
+            <a:schemeClr val="accent1"/>
+          </a:fillRef>
+          <a:effectRef idx="0">
+            <a:schemeClr val="accent1"/>
+          </a:effectRef>
+          <a:fontRef idx="minor">
+            <a:schemeClr val="tx1"/>
+          </a:fontRef>
+        </p:style>
+      </p:cxnSp>
+      <p:cxnSp>
+        <p:nvCxnSpPr>
+          <p:cNvPr id="93" name="Straight Arrow Connector 92"/>
+          <p:cNvCxnSpPr>
+            <a:stCxn id="46" idx="0"/>
+            <a:endCxn id="15" idx="2"/>
+          </p:cNvCxnSpPr>
+          <p:nvPr/>
+        </p:nvCxnSpPr>
+        <p:spPr>
+          <a:xfrm flipH="1" flipV="1">
+            <a:off x="8181262" y="3800304"/>
+            <a:ext cx="19968" cy="877893"/>
+          </a:xfrm>
+          <a:prstGeom prst="straightConnector1">
+            <a:avLst/>
+          </a:prstGeom>
+          <a:ln>
+            <a:tailEnd type="triangle"/>
+          </a:ln>
+        </p:spPr>
+        <p:style>
+          <a:lnRef idx="1">
+            <a:schemeClr val="accent1"/>
+          </a:lnRef>
+          <a:fillRef idx="0">
+            <a:schemeClr val="accent1"/>
+          </a:fillRef>
+          <a:effectRef idx="0">
+            <a:schemeClr val="accent1"/>
+          </a:effectRef>
+          <a:fontRef idx="minor">
+            <a:schemeClr val="tx1"/>
+          </a:fontRef>
+        </p:style>
+      </p:cxnSp>
+      <p:sp>
+        <p:nvSpPr>
+          <p:cNvPr id="94" name="TextBox 93">
+            <a:extLst>
+              <a:ext uri="{FF2B5EF4-FFF2-40B4-BE49-F238E27FC236}">
+                <a16:creationId xmlns="" xmlns:a16="http://schemas.microsoft.com/office/drawing/2014/main" id="{E0BBD6C8-C8F2-40C5-AA64-85961A11ADC2}"/>
+              </a:ext>
+            </a:extLst>
+          </p:cNvPr>
+          <p:cNvSpPr txBox="1"/>
+          <p:nvPr/>
+        </p:nvSpPr>
+        <p:spPr>
+          <a:xfrm>
+            <a:off x="8161295" y="4358304"/>
+            <a:ext cx="490999" cy="276999"/>
+          </a:xfrm>
+          <a:prstGeom prst="rect">
+            <a:avLst/>
+          </a:prstGeom>
+          <a:noFill/>
+        </p:spPr>
+        <p:txBody>
+          <a:bodyPr wrap="square" rtlCol="0">
+            <a:spAutoFit/>
+          </a:bodyPr>
+          <a:lstStyle/>
+          <a:p>
+            <a:r>
+              <a:rPr lang="en-US" sz="1200" dirty="0"/>
+              <a:t>uses</a:t>
+            </a:r>
+          </a:p>
+        </p:txBody>
+      </p:sp>
+      <p:sp>
+        <p:nvSpPr>
+          <p:cNvPr id="95" name="TextBox 94">
+            <a:extLst>
+              <a:ext uri="{FF2B5EF4-FFF2-40B4-BE49-F238E27FC236}">
+                <a16:creationId xmlns="" xmlns:a16="http://schemas.microsoft.com/office/drawing/2014/main" id="{E0BBD6C8-C8F2-40C5-AA64-85961A11ADC2}"/>
+              </a:ext>
+            </a:extLst>
+          </p:cNvPr>
+          <p:cNvSpPr txBox="1"/>
+          <p:nvPr/>
+        </p:nvSpPr>
+        <p:spPr>
+          <a:xfrm>
+            <a:off x="6505919" y="3378345"/>
+            <a:ext cx="728932" cy="276999"/>
+          </a:xfrm>
+          <a:prstGeom prst="rect">
+            <a:avLst/>
+          </a:prstGeom>
+          <a:noFill/>
+        </p:spPr>
+        <p:txBody>
+          <a:bodyPr wrap="square" rtlCol="0">
+            <a:spAutoFit/>
+          </a:bodyPr>
+          <a:lstStyle/>
+          <a:p>
+            <a:r>
+              <a:rPr lang="en-US" sz="1200" dirty="0"/>
+              <a:t>uses</a:t>
+            </a:r>
+          </a:p>
+        </p:txBody>
+      </p:sp>
+      <p:sp>
+        <p:nvSpPr>
+          <p:cNvPr id="49" name="Rectangle 48">
+            <a:extLst>
+              <a:ext uri="{FF2B5EF4-FFF2-40B4-BE49-F238E27FC236}">
+                <a16:creationId xmlns="" xmlns:a16="http://schemas.microsoft.com/office/drawing/2014/main" id="{02A645C8-F11F-438D-92DC-F6FCCA5ECFB8}"/>
+              </a:ext>
+            </a:extLst>
+          </p:cNvPr>
+          <p:cNvSpPr/>
+          <p:nvPr/>
+        </p:nvSpPr>
+        <p:spPr>
+          <a:xfrm>
+            <a:off x="1582107" y="5802529"/>
+            <a:ext cx="2212030" cy="657053"/>
+          </a:xfrm>
+          <a:prstGeom prst="rect">
+            <a:avLst/>
+          </a:prstGeom>
+          <a:solidFill>
+            <a:schemeClr val="accent6"/>
+          </a:solidFill>
+        </p:spPr>
+        <p:style>
+          <a:lnRef idx="2">
+            <a:schemeClr val="accent1">
+              <a:shade val="50000"/>
+            </a:schemeClr>
+          </a:lnRef>
+          <a:fillRef idx="1">
+            <a:schemeClr val="accent1"/>
+          </a:fillRef>
+          <a:effectRef idx="0">
+            <a:schemeClr val="accent1"/>
+          </a:effectRef>
+          <a:fontRef idx="minor">
+            <a:schemeClr val="lt1"/>
+          </a:fontRef>
+        </p:style>
+        <p:txBody>
+          <a:bodyPr rtlCol="0" anchor="ctr"/>
+          <a:lstStyle/>
+          <a:p>
+            <a:pPr algn="ctr"/>
+            <a:r>
+              <a:rPr lang="en-US" sz="1000" dirty="0"/>
+              <a:t>com.tlw8253.exception</a:t>
+            </a:r>
+          </a:p>
+          <a:p>
+            <a:pPr algn="ctr"/>
+            <a:r>
+              <a:rPr lang="en-US" sz="1200" dirty="0" err="1"/>
+              <a:t>AuthenticationFailureException</a:t>
+            </a:r>
+            <a:endParaRPr lang="en-US" sz="1200" dirty="0"/>
+          </a:p>
+        </p:txBody>
+      </p:sp>
+      <p:cxnSp>
+        <p:nvCxnSpPr>
+          <p:cNvPr id="6" name="Straight Arrow Connector 5"/>
+          <p:cNvCxnSpPr>
+            <a:cxnSpLocks/>
+            <a:stCxn id="29" idx="1"/>
+            <a:endCxn id="49" idx="3"/>
+          </p:cNvCxnSpPr>
+          <p:nvPr/>
+        </p:nvCxnSpPr>
+        <p:spPr>
+          <a:xfrm flipH="1">
+            <a:off x="3794137" y="4547380"/>
+            <a:ext cx="923791" cy="1583676"/>
+          </a:xfrm>
+          <a:prstGeom prst="straightConnector1">
+            <a:avLst/>
+          </a:prstGeom>
+          <a:ln>
+            <a:tailEnd type="triangle"/>
+          </a:ln>
+        </p:spPr>
+        <p:style>
+          <a:lnRef idx="1">
+            <a:schemeClr val="accent1"/>
+          </a:lnRef>
+          <a:fillRef idx="0">
+            <a:schemeClr val="accent1"/>
+          </a:fillRef>
+          <a:effectRef idx="0">
+            <a:schemeClr val="accent1"/>
+          </a:effectRef>
+          <a:fontRef idx="minor">
+            <a:schemeClr val="tx1"/>
+          </a:fontRef>
+        </p:style>
+      </p:cxnSp>
+      <p:sp>
+        <p:nvSpPr>
+          <p:cNvPr id="57" name="Rectangle 56">
+            <a:extLst>
+              <a:ext uri="{FF2B5EF4-FFF2-40B4-BE49-F238E27FC236}">
+                <a16:creationId xmlns="" xmlns:a16="http://schemas.microsoft.com/office/drawing/2014/main" id="{93FBA679-F71B-47BD-BE29-21E7C2262CEB}"/>
+              </a:ext>
+            </a:extLst>
+          </p:cNvPr>
+          <p:cNvSpPr/>
+          <p:nvPr/>
+        </p:nvSpPr>
+        <p:spPr>
+          <a:xfrm>
+            <a:off x="10307000" y="1812861"/>
+            <a:ext cx="1494797" cy="991056"/>
+          </a:xfrm>
+          <a:prstGeom prst="rect">
+            <a:avLst/>
+          </a:prstGeom>
+          <a:solidFill>
+            <a:schemeClr val="accent2"/>
+          </a:solidFill>
+        </p:spPr>
+        <p:style>
+          <a:lnRef idx="2">
+            <a:schemeClr val="accent1">
+              <a:shade val="50000"/>
+            </a:schemeClr>
+          </a:lnRef>
+          <a:fillRef idx="1">
+            <a:schemeClr val="accent1"/>
+          </a:fillRef>
+          <a:effectRef idx="0">
+            <a:schemeClr val="accent1"/>
+          </a:effectRef>
+          <a:fontRef idx="minor">
+            <a:schemeClr val="lt1"/>
+          </a:fontRef>
+        </p:style>
+        <p:txBody>
+          <a:bodyPr rtlCol="0" anchor="ctr"/>
+          <a:lstStyle/>
+          <a:p>
+            <a:pPr algn="ctr"/>
+            <a:r>
+              <a:rPr lang="en-US" sz="1000" dirty="0"/>
+              <a:t>com.tlw8253.dto</a:t>
+            </a:r>
+          </a:p>
+          <a:p>
+            <a:pPr algn="ctr"/>
+            <a:r>
+              <a:rPr lang="en-US" sz="1200" dirty="0"/>
+              <a:t>Data Transfer Object</a:t>
+            </a:r>
+          </a:p>
+          <a:p>
+            <a:pPr algn="ctr"/>
+            <a:r>
+              <a:rPr lang="en-US" dirty="0"/>
+              <a:t>DTO</a:t>
+            </a:r>
+          </a:p>
+          <a:p>
+            <a:pPr algn="ctr"/>
+            <a:r>
+              <a:rPr lang="en-US" sz="1200" dirty="0" err="1"/>
+              <a:t>AddOrEditDTO</a:t>
+            </a:r>
+            <a:endParaRPr lang="en-US" sz="1200" dirty="0"/>
+          </a:p>
+        </p:txBody>
+      </p:sp>
+      <p:cxnSp>
+        <p:nvCxnSpPr>
+          <p:cNvPr id="16" name="Straight Arrow Connector 15"/>
+          <p:cNvCxnSpPr>
+            <a:stCxn id="15" idx="3"/>
+            <a:endCxn id="57" idx="1"/>
+          </p:cNvCxnSpPr>
+          <p:nvPr/>
+        </p:nvCxnSpPr>
+        <p:spPr>
+          <a:xfrm flipV="1">
+            <a:off x="8928660" y="2308389"/>
+            <a:ext cx="1378340" cy="996387"/>
+          </a:xfrm>
+          <a:prstGeom prst="straightConnector1">
+            <a:avLst/>
+          </a:prstGeom>
+          <a:ln>
+            <a:tailEnd type="triangle"/>
+          </a:ln>
+        </p:spPr>
+        <p:style>
+          <a:lnRef idx="1">
+            <a:schemeClr val="accent1"/>
+          </a:lnRef>
+          <a:fillRef idx="0">
+            <a:schemeClr val="accent1"/>
+          </a:fillRef>
+          <a:effectRef idx="0">
+            <a:schemeClr val="accent1"/>
+          </a:effectRef>
+          <a:fontRef idx="minor">
+            <a:schemeClr val="tx1"/>
+          </a:fontRef>
+        </p:style>
+      </p:cxnSp>
+      <p:sp>
+        <p:nvSpPr>
+          <p:cNvPr id="59" name="TextBox 58">
+            <a:extLst>
+              <a:ext uri="{FF2B5EF4-FFF2-40B4-BE49-F238E27FC236}">
+                <a16:creationId xmlns="" xmlns:a16="http://schemas.microsoft.com/office/drawing/2014/main" id="{5E4B2700-0522-40EF-B035-166AA1C17D76}"/>
+              </a:ext>
+            </a:extLst>
+          </p:cNvPr>
+          <p:cNvSpPr txBox="1"/>
+          <p:nvPr/>
+        </p:nvSpPr>
+        <p:spPr>
+          <a:xfrm>
+            <a:off x="9077448" y="2969828"/>
+            <a:ext cx="728932" cy="276999"/>
+          </a:xfrm>
+          <a:prstGeom prst="rect">
+            <a:avLst/>
+          </a:prstGeom>
+          <a:noFill/>
+        </p:spPr>
+        <p:txBody>
+          <a:bodyPr wrap="square" rtlCol="0">
+            <a:spAutoFit/>
+          </a:bodyPr>
+          <a:lstStyle/>
+          <a:p>
+            <a:r>
+              <a:rPr lang="en-US" sz="1200" dirty="0"/>
+              <a:t>extends</a:t>
+            </a:r>
+          </a:p>
+        </p:txBody>
+      </p:sp>
+    </p:spTree>
+    <p:extLst>
+      <p:ext uri="{BB962C8B-B14F-4D97-AF65-F5344CB8AC3E}">
+        <p14:creationId xmlns:p14="http://schemas.microsoft.com/office/powerpoint/2010/main" val="512867154"/>
+      </p:ext>
+    </p:extLst>
+  </p:cSld>
+  <p:clrMapOvr>
+    <a:masterClrMapping/>
+  </p:clrMapOvr>
+</p:sld>
+</file>
+
+<file path=ppt/slides/slide8.xml><?xml version="1.0" encoding="utf-8"?>
+<p:sld xmlns:a="http://schemas.openxmlformats.org/drawingml/2006/main" xmlns:r="http://schemas.openxmlformats.org/officeDocument/2006/relationships" xmlns:p="http://schemas.openxmlformats.org/presentationml/2006/main">
+  <p:cSld>
+    <p:spTree>
+      <p:nvGrpSpPr>
+        <p:cNvPr id="1" name=""/>
+        <p:cNvGrpSpPr/>
+        <p:nvPr/>
+      </p:nvGrpSpPr>
+      <p:grpSpPr>
+        <a:xfrm>
+          <a:off x="0" y="0"/>
+          <a:ext cx="0" cy="0"/>
+          <a:chOff x="0" y="0"/>
+          <a:chExt cx="0" cy="0"/>
+        </a:xfrm>
+      </p:grpSpPr>
+      <p:sp>
+        <p:nvSpPr>
+          <p:cNvPr id="3" name="Subtitle 2"/>
+          <p:cNvSpPr>
+            <a:spLocks noGrp="1"/>
+          </p:cNvSpPr>
+          <p:nvPr>
+            <p:ph type="subTitle" idx="1"/>
+          </p:nvPr>
+        </p:nvSpPr>
+        <p:spPr>
+          <a:xfrm>
+            <a:off x="954820" y="819149"/>
+            <a:ext cx="9144000" cy="5888275"/>
+          </a:xfrm>
+          <a:solidFill>
+            <a:schemeClr val="bg1">
+              <a:lumMod val="50000"/>
+            </a:schemeClr>
+          </a:solidFill>
+        </p:spPr>
+        <p:txBody>
+          <a:bodyPr>
+            <a:normAutofit fontScale="92500" lnSpcReduction="20000"/>
+          </a:bodyPr>
+          <a:lstStyle/>
+          <a:p>
+            <a:pPr marL="342900" indent="-342900" algn="l">
+              <a:buFont typeface="Arial" panose="020B0604020202020204" pitchFamily="34" charset="0"/>
+              <a:buChar char="•"/>
+            </a:pPr>
+            <a:r>
+              <a:rPr lang="en-US" dirty="0"/>
+              <a:t>Technologies requirements all implemented</a:t>
+            </a:r>
+          </a:p>
+          <a:p>
+            <a:pPr marL="342900" indent="-342900" algn="l">
+              <a:buFont typeface="Arial" panose="020B0604020202020204" pitchFamily="34" charset="0"/>
+              <a:buChar char="•"/>
+            </a:pPr>
+            <a:r>
+              <a:rPr lang="en-US" dirty="0"/>
+              <a:t>Other general requirements met or exceeded</a:t>
+            </a:r>
+          </a:p>
+          <a:p>
+            <a:pPr marL="800100" lvl="1" indent="-342900" algn="l">
+              <a:buFont typeface="Arial" panose="020B0604020202020204" pitchFamily="34" charset="0"/>
+              <a:buChar char="•"/>
+            </a:pPr>
+            <a:r>
+              <a:rPr lang="en-US" dirty="0"/>
+              <a:t>3 layered architecture</a:t>
+            </a:r>
+          </a:p>
+          <a:p>
+            <a:pPr marL="800100" lvl="1" indent="-342900" algn="l">
+              <a:buFont typeface="Arial" panose="020B0604020202020204" pitchFamily="34" charset="0"/>
+              <a:buChar char="•"/>
+            </a:pPr>
+            <a:r>
+              <a:rPr lang="en-US" dirty="0"/>
+              <a:t>Hibernate “create” for creating the schema </a:t>
+            </a:r>
+          </a:p>
+          <a:p>
+            <a:pPr marL="800100" lvl="1" indent="-342900" algn="l">
+              <a:buFont typeface="Arial" panose="020B0604020202020204" pitchFamily="34" charset="0"/>
+              <a:buChar char="•"/>
+            </a:pPr>
+            <a:r>
+              <a:rPr lang="en-US" dirty="0"/>
+              <a:t>Hibernate HQL performing object data loads, record create and updates</a:t>
+            </a:r>
+          </a:p>
+          <a:p>
+            <a:pPr marL="800100" lvl="1" indent="-342900" algn="l">
+              <a:buFont typeface="Arial" panose="020B0604020202020204" pitchFamily="34" charset="0"/>
+              <a:buChar char="•"/>
+            </a:pPr>
+            <a:r>
+              <a:rPr lang="en-US" dirty="0"/>
+              <a:t>Utilize the Controller, Service, DTO, DAO design pattern</a:t>
+            </a:r>
+          </a:p>
+          <a:p>
+            <a:pPr marL="800100" lvl="1" indent="-342900" algn="l">
+              <a:buFont typeface="Arial" panose="020B0604020202020204" pitchFamily="34" charset="0"/>
+              <a:buChar char="•"/>
+            </a:pPr>
+            <a:r>
+              <a:rPr lang="en-US" dirty="0" err="1"/>
+              <a:t>MariaDB</a:t>
+            </a:r>
+            <a:r>
+              <a:rPr lang="en-US" dirty="0"/>
+              <a:t> </a:t>
+            </a:r>
+            <a:endParaRPr lang="en-US" dirty="0" smtClean="0"/>
+          </a:p>
+          <a:p>
+            <a:pPr marL="800100" lvl="1" indent="-342900" algn="l">
+              <a:buFont typeface="Arial" panose="020B0604020202020204" pitchFamily="34" charset="0"/>
+              <a:buChar char="•"/>
+            </a:pPr>
+            <a:r>
+              <a:rPr lang="en-US" dirty="0" smtClean="0"/>
+              <a:t>Logging </a:t>
+            </a:r>
+            <a:r>
+              <a:rPr lang="en-US" dirty="0"/>
+              <a:t>accomplished using </a:t>
+            </a:r>
+            <a:r>
+              <a:rPr lang="en-US" dirty="0" err="1"/>
+              <a:t>Logback</a:t>
+            </a:r>
+            <a:endParaRPr lang="en-US" dirty="0"/>
+          </a:p>
+          <a:p>
+            <a:pPr marL="800100" lvl="1" indent="-342900" algn="l">
+              <a:buFont typeface="Arial" panose="020B0604020202020204" pitchFamily="34" charset="0"/>
+              <a:buChar char="•"/>
+            </a:pPr>
+            <a:r>
+              <a:rPr lang="en-US" dirty="0"/>
+              <a:t>Login session control and validation</a:t>
+            </a:r>
+          </a:p>
+          <a:p>
+            <a:pPr marL="342900" indent="-342900" algn="l">
+              <a:buFont typeface="Arial" panose="020B0604020202020204" pitchFamily="34" charset="0"/>
+              <a:buChar char="•"/>
+            </a:pPr>
+            <a:r>
+              <a:rPr lang="en-US" dirty="0"/>
+              <a:t>HTTP Endpoints (</a:t>
+            </a:r>
+            <a:r>
+              <a:rPr lang="en-US" dirty="0" smtClean="0"/>
+              <a:t>Login, Employee and Customer)</a:t>
+            </a:r>
+            <a:endParaRPr lang="en-US" dirty="0"/>
+          </a:p>
+          <a:p>
+            <a:pPr marL="342900" indent="-342900" algn="l">
+              <a:buFont typeface="Arial" panose="020B0604020202020204" pitchFamily="34" charset="0"/>
+              <a:buChar char="•"/>
+            </a:pPr>
+            <a:r>
+              <a:rPr lang="en-US" dirty="0"/>
+              <a:t>Front-end</a:t>
+            </a:r>
+          </a:p>
+          <a:p>
+            <a:pPr marL="800100" lvl="1" indent="-342900" algn="l">
+              <a:buFont typeface="Arial" panose="020B0604020202020204" pitchFamily="34" charset="0"/>
+              <a:buChar char="•"/>
+            </a:pPr>
+            <a:r>
+              <a:rPr lang="en-US" dirty="0"/>
+              <a:t>Login, </a:t>
+            </a:r>
+            <a:r>
+              <a:rPr lang="en-US" dirty="0" smtClean="0"/>
+              <a:t>Employee, Customer, Catalog </a:t>
+            </a:r>
+            <a:r>
+              <a:rPr lang="en-US" dirty="0"/>
+              <a:t>interactive pages</a:t>
+            </a:r>
+          </a:p>
+          <a:p>
+            <a:pPr marL="342900" indent="-342900" algn="l">
+              <a:buFont typeface="Arial" panose="020B0604020202020204" pitchFamily="34" charset="0"/>
+              <a:buChar char="•"/>
+            </a:pPr>
+            <a:r>
+              <a:rPr lang="en-US" dirty="0"/>
+              <a:t>Other considerations</a:t>
+            </a:r>
+          </a:p>
+          <a:p>
+            <a:pPr marL="800100" lvl="1" indent="-342900" algn="l">
+              <a:buFont typeface="Arial" panose="020B0604020202020204" pitchFamily="34" charset="0"/>
+              <a:buChar char="•"/>
+            </a:pPr>
+            <a:r>
+              <a:rPr lang="en-US" dirty="0"/>
+              <a:t>Implementing </a:t>
+            </a:r>
+            <a:r>
+              <a:rPr lang="en-US" dirty="0" err="1"/>
+              <a:t>GenericDAO</a:t>
+            </a:r>
+            <a:r>
+              <a:rPr lang="en-US" dirty="0"/>
+              <a:t>&lt;T&gt;  model fully realized</a:t>
+            </a:r>
+          </a:p>
+          <a:p>
+            <a:pPr marL="800100" lvl="1" indent="-342900" algn="l">
+              <a:buFont typeface="Arial" panose="020B0604020202020204" pitchFamily="34" charset="0"/>
+              <a:buChar char="•"/>
+            </a:pPr>
+            <a:r>
+              <a:rPr lang="en-US" dirty="0"/>
+              <a:t>Extend Add/Edit DTO storing data generically in </a:t>
+            </a:r>
+            <a:r>
+              <a:rPr lang="en-US" dirty="0" err="1"/>
+              <a:t>HashMaps</a:t>
+            </a:r>
+            <a:endParaRPr lang="en-US" dirty="0"/>
+          </a:p>
+          <a:p>
+            <a:pPr marL="800100" lvl="1" indent="-342900" algn="l">
+              <a:buFont typeface="Arial" panose="020B0604020202020204" pitchFamily="34" charset="0"/>
+              <a:buChar char="•"/>
+            </a:pPr>
+            <a:r>
+              <a:rPr lang="en-US" dirty="0" smtClean="0"/>
+              <a:t>JUnit </a:t>
+            </a:r>
+            <a:r>
+              <a:rPr lang="en-US" dirty="0"/>
+              <a:t>and </a:t>
+            </a:r>
+            <a:r>
+              <a:rPr lang="en-US" dirty="0" err="1"/>
+              <a:t>Mockito</a:t>
+            </a:r>
+            <a:r>
+              <a:rPr lang="en-US" dirty="0"/>
+              <a:t> test cases</a:t>
+            </a:r>
+          </a:p>
+          <a:p>
+            <a:pPr marL="800100" lvl="1" indent="-342900" algn="l">
+              <a:buFont typeface="Arial" panose="020B0604020202020204" pitchFamily="34" charset="0"/>
+              <a:buChar char="•"/>
+            </a:pPr>
+            <a:r>
+              <a:rPr lang="en-US" dirty="0"/>
+              <a:t>Extensive utilization of internal driver tests</a:t>
+            </a:r>
+          </a:p>
+          <a:p>
+            <a:pPr marL="800100" lvl="1" indent="-342900" algn="l">
+              <a:buFont typeface="Arial" panose="020B0604020202020204" pitchFamily="34" charset="0"/>
+              <a:buChar char="•"/>
+            </a:pPr>
+            <a:r>
+              <a:rPr lang="en-US" dirty="0"/>
+              <a:t>Extensive Logging through package logging levels</a:t>
+            </a:r>
+          </a:p>
+          <a:p>
+            <a:pPr marL="800100" lvl="1" indent="-342900" algn="l">
+              <a:buFont typeface="Arial" panose="020B0604020202020204" pitchFamily="34" charset="0"/>
+              <a:buChar char="•"/>
+            </a:pPr>
+            <a:r>
+              <a:rPr lang="en-US" dirty="0"/>
+              <a:t>Postman utilize for some initial endpoint tests</a:t>
+            </a:r>
+          </a:p>
+          <a:p>
+            <a:pPr marL="800100" lvl="1" indent="-342900" algn="l">
+              <a:buFont typeface="Arial" panose="020B0604020202020204" pitchFamily="34" charset="0"/>
+              <a:buChar char="•"/>
+            </a:pPr>
+            <a:r>
+              <a:rPr lang="en-US" dirty="0"/>
+              <a:t>Internal test drivers and Admin driver</a:t>
+            </a:r>
+          </a:p>
+          <a:p>
+            <a:pPr marL="342900" indent="-342900" algn="l">
+              <a:buFont typeface="Arial" panose="020B0604020202020204" pitchFamily="34" charset="0"/>
+              <a:buChar char="•"/>
+            </a:pPr>
+            <a:endParaRPr lang="en-US" dirty="0"/>
+          </a:p>
+          <a:p>
+            <a:pPr marL="800100" lvl="1" indent="-342900" algn="l">
+              <a:buFont typeface="Arial" panose="020B0604020202020204" pitchFamily="34" charset="0"/>
+              <a:buChar char="•"/>
+            </a:pPr>
+            <a:endParaRPr lang="en-US" dirty="0"/>
+          </a:p>
+          <a:p>
+            <a:pPr marL="342900" indent="-342900" algn="l">
+              <a:buFont typeface="Arial" panose="020B0604020202020204" pitchFamily="34" charset="0"/>
+              <a:buChar char="•"/>
+            </a:pPr>
+            <a:endParaRPr lang="en-US" dirty="0"/>
+          </a:p>
+        </p:txBody>
+      </p:sp>
+      <p:sp>
+        <p:nvSpPr>
+          <p:cNvPr id="5" name="Title 1"/>
+          <p:cNvSpPr>
+            <a:spLocks noGrp="1"/>
+          </p:cNvSpPr>
+          <p:nvPr>
+            <p:ph type="ctrTitle"/>
+          </p:nvPr>
+        </p:nvSpPr>
+        <p:spPr>
+          <a:xfrm>
+            <a:off x="166088" y="120357"/>
+            <a:ext cx="10965500" cy="698793"/>
+          </a:xfrm>
+        </p:spPr>
+        <p:txBody>
+          <a:bodyPr>
+            <a:noAutofit/>
+          </a:bodyPr>
+          <a:lstStyle/>
+          <a:p>
+            <a:pPr algn="l"/>
+            <a:r>
+              <a:rPr lang="en-US" sz="3600" dirty="0"/>
+              <a:t>Aromatic Mountain Technologies (AMT) </a:t>
+            </a:r>
+            <a:r>
+              <a:rPr lang="en-US" sz="3600" dirty="0" smtClean="0"/>
+              <a:t>Summary </a:t>
+            </a:r>
+            <a:r>
+              <a:rPr lang="en-US" sz="3600" dirty="0" smtClean="0">
+                <a:solidFill>
+                  <a:srgbClr val="FF0000"/>
+                </a:solidFill>
+              </a:rPr>
+              <a:t>TBD</a:t>
+            </a:r>
+            <a:endParaRPr lang="en-US" sz="3600" dirty="0">
+              <a:solidFill>
+                <a:srgbClr val="FF0000"/>
+              </a:solidFill>
+            </a:endParaRPr>
+          </a:p>
+        </p:txBody>
+      </p:sp>
+      <p:sp>
+        <p:nvSpPr>
+          <p:cNvPr id="6" name="Title 1"/>
+          <p:cNvSpPr txBox="1">
+            <a:spLocks/>
+          </p:cNvSpPr>
+          <p:nvPr/>
+        </p:nvSpPr>
+        <p:spPr>
+          <a:xfrm>
+            <a:off x="166088" y="125832"/>
+            <a:ext cx="9755425" cy="698793"/>
+          </a:xfrm>
+          <a:prstGeom prst="rect">
+            <a:avLst/>
+          </a:prstGeom>
+        </p:spPr>
+        <p:txBody>
+          <a:bodyPr vert="horz" lIns="91440" tIns="45720" rIns="91440" bIns="45720" rtlCol="0" anchor="b">
+            <a:noAutofit/>
+          </a:bodyPr>
+          <a:lstStyle>
+            <a:lvl1pPr algn="ctr" defTabSz="914400" rtl="0" eaLnBrk="1" latinLnBrk="0" hangingPunct="1">
+              <a:lnSpc>
+                <a:spcPct val="90000"/>
+              </a:lnSpc>
+              <a:spcBef>
+                <a:spcPct val="0"/>
+              </a:spcBef>
+              <a:buNone/>
+              <a:defRPr sz="6000" kern="1200">
+                <a:solidFill>
+                  <a:schemeClr val="tx1"/>
+                </a:solidFill>
+                <a:latin typeface="+mj-lt"/>
+                <a:ea typeface="+mj-ea"/>
+                <a:cs typeface="+mj-cs"/>
+              </a:defRPr>
+            </a:lvl1pPr>
+          </a:lstStyle>
+          <a:p>
+            <a:pPr algn="l"/>
+            <a:endParaRPr lang="en-US" sz="4000" dirty="0"/>
+          </a:p>
+        </p:txBody>
+      </p:sp>
+    </p:spTree>
+    <p:extLst>
+      <p:ext uri="{BB962C8B-B14F-4D97-AF65-F5344CB8AC3E}">
+        <p14:creationId xmlns:p14="http://schemas.microsoft.com/office/powerpoint/2010/main" val="2070376304"/>
       </p:ext>
     </p:extLst>
   </p:cSld>

</xml_diff>